<commit_message>
Connectors with first poc example
</commit_message>
<xml_diff>
--- a/examples/UrbanTopologies.pptx
+++ b/examples/UrbanTopologies.pptx
@@ -5,10 +5,11 @@
     <p:sldMasterId id="2147483648" r:id="rId1"/>
   </p:sldMasterIdLst>
   <p:sldIdLst>
-    <p:sldId id="256" r:id="rId2"/>
-    <p:sldId id="259" r:id="rId3"/>
-    <p:sldId id="257" r:id="rId4"/>
-    <p:sldId id="258" r:id="rId5"/>
+    <p:sldId id="260" r:id="rId2"/>
+    <p:sldId id="256" r:id="rId3"/>
+    <p:sldId id="259" r:id="rId4"/>
+    <p:sldId id="257" r:id="rId5"/>
+    <p:sldId id="258" r:id="rId6"/>
   </p:sldIdLst>
   <p:sldSz cx="12192000" cy="6858000"/>
   <p:notesSz cx="6858000" cy="9144000"/>
@@ -262,7 +263,7 @@
           <a:p>
             <a:fld id="{F3EB2857-2321-4C4D-8D06-77DF79DF910F}" type="datetimeFigureOut">
               <a:rPr lang="de-DE" smtClean="0"/>
-              <a:t>03.01.2025</a:t>
+              <a:t>23.01.2025</a:t>
             </a:fld>
             <a:endParaRPr lang="de-DE"/>
           </a:p>
@@ -460,7 +461,7 @@
           <a:p>
             <a:fld id="{F3EB2857-2321-4C4D-8D06-77DF79DF910F}" type="datetimeFigureOut">
               <a:rPr lang="de-DE" smtClean="0"/>
-              <a:t>03.01.2025</a:t>
+              <a:t>23.01.2025</a:t>
             </a:fld>
             <a:endParaRPr lang="de-DE"/>
           </a:p>
@@ -668,7 +669,7 @@
           <a:p>
             <a:fld id="{F3EB2857-2321-4C4D-8D06-77DF79DF910F}" type="datetimeFigureOut">
               <a:rPr lang="de-DE" smtClean="0"/>
-              <a:t>03.01.2025</a:t>
+              <a:t>23.01.2025</a:t>
             </a:fld>
             <a:endParaRPr lang="de-DE"/>
           </a:p>
@@ -866,7 +867,7 @@
           <a:p>
             <a:fld id="{F3EB2857-2321-4C4D-8D06-77DF79DF910F}" type="datetimeFigureOut">
               <a:rPr lang="de-DE" smtClean="0"/>
-              <a:t>03.01.2025</a:t>
+              <a:t>23.01.2025</a:t>
             </a:fld>
             <a:endParaRPr lang="de-DE"/>
           </a:p>
@@ -1141,7 +1142,7 @@
           <a:p>
             <a:fld id="{F3EB2857-2321-4C4D-8D06-77DF79DF910F}" type="datetimeFigureOut">
               <a:rPr lang="de-DE" smtClean="0"/>
-              <a:t>03.01.2025</a:t>
+              <a:t>23.01.2025</a:t>
             </a:fld>
             <a:endParaRPr lang="de-DE"/>
           </a:p>
@@ -1406,7 +1407,7 @@
           <a:p>
             <a:fld id="{F3EB2857-2321-4C4D-8D06-77DF79DF910F}" type="datetimeFigureOut">
               <a:rPr lang="de-DE" smtClean="0"/>
-              <a:t>03.01.2025</a:t>
+              <a:t>23.01.2025</a:t>
             </a:fld>
             <a:endParaRPr lang="de-DE"/>
           </a:p>
@@ -1818,7 +1819,7 @@
           <a:p>
             <a:fld id="{F3EB2857-2321-4C4D-8D06-77DF79DF910F}" type="datetimeFigureOut">
               <a:rPr lang="de-DE" smtClean="0"/>
-              <a:t>03.01.2025</a:t>
+              <a:t>23.01.2025</a:t>
             </a:fld>
             <a:endParaRPr lang="de-DE"/>
           </a:p>
@@ -1959,7 +1960,7 @@
           <a:p>
             <a:fld id="{F3EB2857-2321-4C4D-8D06-77DF79DF910F}" type="datetimeFigureOut">
               <a:rPr lang="de-DE" smtClean="0"/>
-              <a:t>03.01.2025</a:t>
+              <a:t>23.01.2025</a:t>
             </a:fld>
             <a:endParaRPr lang="de-DE"/>
           </a:p>
@@ -2072,7 +2073,7 @@
           <a:p>
             <a:fld id="{F3EB2857-2321-4C4D-8D06-77DF79DF910F}" type="datetimeFigureOut">
               <a:rPr lang="de-DE" smtClean="0"/>
-              <a:t>03.01.2025</a:t>
+              <a:t>23.01.2025</a:t>
             </a:fld>
             <a:endParaRPr lang="de-DE"/>
           </a:p>
@@ -2383,7 +2384,7 @@
           <a:p>
             <a:fld id="{F3EB2857-2321-4C4D-8D06-77DF79DF910F}" type="datetimeFigureOut">
               <a:rPr lang="de-DE" smtClean="0"/>
-              <a:t>03.01.2025</a:t>
+              <a:t>23.01.2025</a:t>
             </a:fld>
             <a:endParaRPr lang="de-DE"/>
           </a:p>
@@ -2671,7 +2672,7 @@
           <a:p>
             <a:fld id="{F3EB2857-2321-4C4D-8D06-77DF79DF910F}" type="datetimeFigureOut">
               <a:rPr lang="de-DE" smtClean="0"/>
-              <a:t>03.01.2025</a:t>
+              <a:t>23.01.2025</a:t>
             </a:fld>
             <a:endParaRPr lang="de-DE"/>
           </a:p>
@@ -2912,7 +2913,7 @@
           <a:p>
             <a:fld id="{F3EB2857-2321-4C4D-8D06-77DF79DF910F}" type="datetimeFigureOut">
               <a:rPr lang="de-DE" smtClean="0"/>
-              <a:t>03.01.2025</a:t>
+              <a:t>23.01.2025</a:t>
             </a:fld>
             <a:endParaRPr lang="de-DE"/>
           </a:p>
@@ -3313,6 +3314,1501 @@
 </file>
 
 <file path=ppt/slides/slide1.xml><?xml version="1.0" encoding="utf-8"?>
+<p:sld xmlns:a="http://schemas.openxmlformats.org/drawingml/2006/main" xmlns:r="http://schemas.openxmlformats.org/officeDocument/2006/relationships" xmlns:p="http://schemas.openxmlformats.org/presentationml/2006/main">
+  <p:cSld>
+    <p:spTree>
+      <p:nvGrpSpPr>
+        <p:cNvPr id="1" name=""/>
+        <p:cNvGrpSpPr/>
+        <p:nvPr/>
+      </p:nvGrpSpPr>
+      <p:grpSpPr>
+        <a:xfrm>
+          <a:off x="0" y="0"/>
+          <a:ext cx="0" cy="0"/>
+          <a:chOff x="0" y="0"/>
+          <a:chExt cx="0" cy="0"/>
+        </a:xfrm>
+      </p:grpSpPr>
+      <p:grpSp>
+        <p:nvGrpSpPr>
+          <p:cNvPr id="41" name="Gruppieren 40">
+            <a:extLst>
+              <a:ext uri="{FF2B5EF4-FFF2-40B4-BE49-F238E27FC236}">
+                <a16:creationId xmlns:a16="http://schemas.microsoft.com/office/drawing/2014/main" id="{31AB3BC7-437E-6DE0-3F8E-DF22E5E56390}"/>
+              </a:ext>
+            </a:extLst>
+          </p:cNvPr>
+          <p:cNvGrpSpPr/>
+          <p:nvPr/>
+        </p:nvGrpSpPr>
+        <p:grpSpPr>
+          <a:xfrm flipH="1">
+            <a:off x="2775114" y="527105"/>
+            <a:ext cx="6245794" cy="6444005"/>
+            <a:chOff x="2775114" y="527105"/>
+            <a:chExt cx="6245794" cy="6444005"/>
+          </a:xfrm>
+        </p:grpSpPr>
+        <p:grpSp>
+          <p:nvGrpSpPr>
+            <p:cNvPr id="4" name="Gruppieren 3">
+              <a:extLst>
+                <a:ext uri="{FF2B5EF4-FFF2-40B4-BE49-F238E27FC236}">
+                  <a16:creationId xmlns:a16="http://schemas.microsoft.com/office/drawing/2014/main" id="{14A94263-C653-C5F0-75D5-2038A9DE1C4C}"/>
+                </a:ext>
+              </a:extLst>
+            </p:cNvPr>
+            <p:cNvGrpSpPr/>
+            <p:nvPr/>
+          </p:nvGrpSpPr>
+          <p:grpSpPr>
+            <a:xfrm flipV="1">
+              <a:off x="2775114" y="527105"/>
+              <a:ext cx="6245794" cy="498178"/>
+              <a:chOff x="739141" y="3284008"/>
+              <a:chExt cx="3635585" cy="289983"/>
+            </a:xfrm>
+          </p:grpSpPr>
+          <p:grpSp>
+            <p:nvGrpSpPr>
+              <p:cNvPr id="5" name="Gruppieren 4">
+                <a:extLst>
+                  <a:ext uri="{FF2B5EF4-FFF2-40B4-BE49-F238E27FC236}">
+                    <a16:creationId xmlns:a16="http://schemas.microsoft.com/office/drawing/2014/main" id="{DA5CD380-D702-A562-09E3-3FB62C432490}"/>
+                  </a:ext>
+                </a:extLst>
+              </p:cNvPr>
+              <p:cNvGrpSpPr/>
+              <p:nvPr/>
+            </p:nvGrpSpPr>
+            <p:grpSpPr>
+              <a:xfrm>
+                <a:off x="762001" y="3284008"/>
+                <a:ext cx="3589866" cy="289983"/>
+                <a:chOff x="2032000" y="2006599"/>
+                <a:chExt cx="6096000" cy="1117600"/>
+              </a:xfrm>
+            </p:grpSpPr>
+            <p:sp>
+              <p:nvSpPr>
+                <p:cNvPr id="12" name="Rechteck 11">
+                  <a:extLst>
+                    <a:ext uri="{FF2B5EF4-FFF2-40B4-BE49-F238E27FC236}">
+                      <a16:creationId xmlns:a16="http://schemas.microsoft.com/office/drawing/2014/main" id="{970363D4-A51D-6B58-4CD9-98A940700264}"/>
+                    </a:ext>
+                  </a:extLst>
+                </p:cNvPr>
+                <p:cNvSpPr/>
+                <p:nvPr/>
+              </p:nvSpPr>
+              <p:spPr>
+                <a:xfrm>
+                  <a:off x="2032000" y="2006599"/>
+                  <a:ext cx="6096000" cy="1117598"/>
+                </a:xfrm>
+                <a:prstGeom prst="rect">
+                  <a:avLst/>
+                </a:prstGeom>
+                <a:solidFill>
+                  <a:srgbClr val="D0CECE"/>
+                </a:solidFill>
+                <a:ln w="19050">
+                  <a:solidFill>
+                    <a:schemeClr val="tx1"/>
+                  </a:solidFill>
+                  <a:prstDash val="solid"/>
+                </a:ln>
+              </p:spPr>
+              <p:style>
+                <a:lnRef idx="2">
+                  <a:schemeClr val="accent1">
+                    <a:shade val="15000"/>
+                  </a:schemeClr>
+                </a:lnRef>
+                <a:fillRef idx="1">
+                  <a:schemeClr val="accent1"/>
+                </a:fillRef>
+                <a:effectRef idx="0">
+                  <a:schemeClr val="accent1"/>
+                </a:effectRef>
+                <a:fontRef idx="minor">
+                  <a:schemeClr val="lt1"/>
+                </a:fontRef>
+              </p:style>
+              <p:txBody>
+                <a:bodyPr rtlCol="0" anchor="ctr"/>
+                <a:lstStyle/>
+                <a:p>
+                  <a:pPr algn="ctr"/>
+                  <a:endParaRPr lang="de-DE"/>
+                </a:p>
+              </p:txBody>
+            </p:sp>
+            <p:sp>
+              <p:nvSpPr>
+                <p:cNvPr id="13" name="Rechteck 12">
+                  <a:extLst>
+                    <a:ext uri="{FF2B5EF4-FFF2-40B4-BE49-F238E27FC236}">
+                      <a16:creationId xmlns:a16="http://schemas.microsoft.com/office/drawing/2014/main" id="{AAE284A4-7745-EE4E-4D6F-DDA2DD58C1E4}"/>
+                    </a:ext>
+                  </a:extLst>
+                </p:cNvPr>
+                <p:cNvSpPr/>
+                <p:nvPr/>
+              </p:nvSpPr>
+              <p:spPr>
+                <a:xfrm>
+                  <a:off x="2032000" y="2006600"/>
+                  <a:ext cx="6096000" cy="372533"/>
+                </a:xfrm>
+                <a:prstGeom prst="rect">
+                  <a:avLst/>
+                </a:prstGeom>
+                <a:noFill/>
+                <a:ln>
+                  <a:solidFill>
+                    <a:schemeClr val="tx1"/>
+                  </a:solidFill>
+                  <a:prstDash val="lgDash"/>
+                </a:ln>
+              </p:spPr>
+              <p:style>
+                <a:lnRef idx="2">
+                  <a:schemeClr val="accent1">
+                    <a:shade val="15000"/>
+                  </a:schemeClr>
+                </a:lnRef>
+                <a:fillRef idx="1">
+                  <a:schemeClr val="accent1"/>
+                </a:fillRef>
+                <a:effectRef idx="0">
+                  <a:schemeClr val="accent1"/>
+                </a:effectRef>
+                <a:fontRef idx="minor">
+                  <a:schemeClr val="lt1"/>
+                </a:fontRef>
+              </p:style>
+              <p:txBody>
+                <a:bodyPr rtlCol="0" anchor="ctr"/>
+                <a:lstStyle/>
+                <a:p>
+                  <a:pPr algn="ctr"/>
+                  <a:endParaRPr lang="de-DE"/>
+                </a:p>
+              </p:txBody>
+            </p:sp>
+            <p:sp>
+              <p:nvSpPr>
+                <p:cNvPr id="14" name="Rechteck 13">
+                  <a:extLst>
+                    <a:ext uri="{FF2B5EF4-FFF2-40B4-BE49-F238E27FC236}">
+                      <a16:creationId xmlns:a16="http://schemas.microsoft.com/office/drawing/2014/main" id="{4BD847E6-EB25-A6B8-C63A-70DE9B9F99E6}"/>
+                    </a:ext>
+                  </a:extLst>
+                </p:cNvPr>
+                <p:cNvSpPr/>
+                <p:nvPr/>
+              </p:nvSpPr>
+              <p:spPr>
+                <a:xfrm>
+                  <a:off x="2032000" y="2379133"/>
+                  <a:ext cx="6096000" cy="372533"/>
+                </a:xfrm>
+                <a:prstGeom prst="rect">
+                  <a:avLst/>
+                </a:prstGeom>
+                <a:noFill/>
+                <a:ln>
+                  <a:noFill/>
+                  <a:prstDash val="lgDash"/>
+                </a:ln>
+              </p:spPr>
+              <p:style>
+                <a:lnRef idx="2">
+                  <a:schemeClr val="accent1">
+                    <a:shade val="15000"/>
+                  </a:schemeClr>
+                </a:lnRef>
+                <a:fillRef idx="1">
+                  <a:schemeClr val="accent1"/>
+                </a:fillRef>
+                <a:effectRef idx="0">
+                  <a:schemeClr val="accent1"/>
+                </a:effectRef>
+                <a:fontRef idx="minor">
+                  <a:schemeClr val="lt1"/>
+                </a:fontRef>
+              </p:style>
+              <p:txBody>
+                <a:bodyPr rtlCol="0" anchor="ctr"/>
+                <a:lstStyle/>
+                <a:p>
+                  <a:pPr algn="ctr"/>
+                  <a:endParaRPr lang="de-DE"/>
+                </a:p>
+              </p:txBody>
+            </p:sp>
+            <p:sp>
+              <p:nvSpPr>
+                <p:cNvPr id="15" name="Rechteck 14">
+                  <a:extLst>
+                    <a:ext uri="{FF2B5EF4-FFF2-40B4-BE49-F238E27FC236}">
+                      <a16:creationId xmlns:a16="http://schemas.microsoft.com/office/drawing/2014/main" id="{D6C0B900-B43F-7664-AF03-698D8DC77D2A}"/>
+                    </a:ext>
+                  </a:extLst>
+                </p:cNvPr>
+                <p:cNvSpPr/>
+                <p:nvPr/>
+              </p:nvSpPr>
+              <p:spPr>
+                <a:xfrm>
+                  <a:off x="2032000" y="2751666"/>
+                  <a:ext cx="6096000" cy="372533"/>
+                </a:xfrm>
+                <a:prstGeom prst="rect">
+                  <a:avLst/>
+                </a:prstGeom>
+                <a:noFill/>
+                <a:ln>
+                  <a:solidFill>
+                    <a:schemeClr val="tx1"/>
+                  </a:solidFill>
+                  <a:prstDash val="lgDash"/>
+                </a:ln>
+              </p:spPr>
+              <p:style>
+                <a:lnRef idx="2">
+                  <a:schemeClr val="accent1">
+                    <a:shade val="15000"/>
+                  </a:schemeClr>
+                </a:lnRef>
+                <a:fillRef idx="1">
+                  <a:schemeClr val="accent1"/>
+                </a:fillRef>
+                <a:effectRef idx="0">
+                  <a:schemeClr val="accent1"/>
+                </a:effectRef>
+                <a:fontRef idx="minor">
+                  <a:schemeClr val="lt1"/>
+                </a:fontRef>
+              </p:style>
+              <p:txBody>
+                <a:bodyPr rtlCol="0" anchor="ctr"/>
+                <a:lstStyle/>
+                <a:p>
+                  <a:pPr algn="ctr"/>
+                  <a:endParaRPr lang="de-DE"/>
+                </a:p>
+              </p:txBody>
+            </p:sp>
+          </p:grpSp>
+          <p:sp>
+            <p:nvSpPr>
+              <p:cNvPr id="7" name="Ellipse 6">
+                <a:extLst>
+                  <a:ext uri="{FF2B5EF4-FFF2-40B4-BE49-F238E27FC236}">
+                    <a16:creationId xmlns:a16="http://schemas.microsoft.com/office/drawing/2014/main" id="{F4C81BDD-9D17-1E8E-65A9-C9FF2626A888}"/>
+                  </a:ext>
+                </a:extLst>
+              </p:cNvPr>
+              <p:cNvSpPr/>
+              <p:nvPr/>
+            </p:nvSpPr>
+            <p:spPr>
+              <a:xfrm>
+                <a:off x="4329007" y="3406139"/>
+                <a:ext cx="45719" cy="45719"/>
+              </a:xfrm>
+              <a:prstGeom prst="ellipse">
+                <a:avLst/>
+              </a:prstGeom>
+            </p:spPr>
+            <p:style>
+              <a:lnRef idx="2">
+                <a:schemeClr val="accent1">
+                  <a:shade val="15000"/>
+                </a:schemeClr>
+              </a:lnRef>
+              <a:fillRef idx="1">
+                <a:schemeClr val="accent1"/>
+              </a:fillRef>
+              <a:effectRef idx="0">
+                <a:schemeClr val="accent1"/>
+              </a:effectRef>
+              <a:fontRef idx="minor">
+                <a:schemeClr val="lt1"/>
+              </a:fontRef>
+            </p:style>
+            <p:txBody>
+              <a:bodyPr rtlCol="0" anchor="ctr"/>
+              <a:lstStyle/>
+              <a:p>
+                <a:pPr algn="ctr"/>
+                <a:endParaRPr lang="de-DE"/>
+              </a:p>
+            </p:txBody>
+          </p:sp>
+          <p:sp>
+            <p:nvSpPr>
+              <p:cNvPr id="10" name="Ellipse 9">
+                <a:extLst>
+                  <a:ext uri="{FF2B5EF4-FFF2-40B4-BE49-F238E27FC236}">
+                    <a16:creationId xmlns:a16="http://schemas.microsoft.com/office/drawing/2014/main" id="{F540E815-19FE-DF98-90BF-50EDA63F67D0}"/>
+                  </a:ext>
+                </a:extLst>
+              </p:cNvPr>
+              <p:cNvSpPr/>
+              <p:nvPr/>
+            </p:nvSpPr>
+            <p:spPr>
+              <a:xfrm>
+                <a:off x="739141" y="3407921"/>
+                <a:ext cx="45719" cy="45719"/>
+              </a:xfrm>
+              <a:prstGeom prst="ellipse">
+                <a:avLst/>
+              </a:prstGeom>
+              <a:solidFill>
+                <a:schemeClr val="accent2"/>
+              </a:solidFill>
+            </p:spPr>
+            <p:style>
+              <a:lnRef idx="2">
+                <a:schemeClr val="accent1">
+                  <a:shade val="15000"/>
+                </a:schemeClr>
+              </a:lnRef>
+              <a:fillRef idx="1">
+                <a:schemeClr val="accent1"/>
+              </a:fillRef>
+              <a:effectRef idx="0">
+                <a:schemeClr val="accent1"/>
+              </a:effectRef>
+              <a:fontRef idx="minor">
+                <a:schemeClr val="lt1"/>
+              </a:fontRef>
+            </p:style>
+            <p:txBody>
+              <a:bodyPr rtlCol="0" anchor="ctr"/>
+              <a:lstStyle/>
+              <a:p>
+                <a:pPr algn="ctr"/>
+                <a:endParaRPr lang="de-DE"/>
+              </a:p>
+            </p:txBody>
+          </p:sp>
+        </p:grpSp>
+        <p:grpSp>
+          <p:nvGrpSpPr>
+            <p:cNvPr id="24" name="Gruppieren 23">
+              <a:extLst>
+                <a:ext uri="{FF2B5EF4-FFF2-40B4-BE49-F238E27FC236}">
+                  <a16:creationId xmlns:a16="http://schemas.microsoft.com/office/drawing/2014/main" id="{6D16CB4E-B326-4823-2369-90D004D47DD8}"/>
+                </a:ext>
+              </a:extLst>
+            </p:cNvPr>
+            <p:cNvGrpSpPr/>
+            <p:nvPr/>
+          </p:nvGrpSpPr>
+          <p:grpSpPr>
+            <a:xfrm rot="-7200000" flipV="1">
+              <a:off x="993145" y="3599123"/>
+              <a:ext cx="6245794" cy="498179"/>
+              <a:chOff x="739141" y="3284010"/>
+              <a:chExt cx="3635585" cy="289984"/>
+            </a:xfrm>
+          </p:grpSpPr>
+          <p:grpSp>
+            <p:nvGrpSpPr>
+              <p:cNvPr id="25" name="Gruppieren 24">
+                <a:extLst>
+                  <a:ext uri="{FF2B5EF4-FFF2-40B4-BE49-F238E27FC236}">
+                    <a16:creationId xmlns:a16="http://schemas.microsoft.com/office/drawing/2014/main" id="{C76F025B-20E4-CDA5-7D57-35E58F222714}"/>
+                  </a:ext>
+                </a:extLst>
+              </p:cNvPr>
+              <p:cNvGrpSpPr/>
+              <p:nvPr/>
+            </p:nvGrpSpPr>
+            <p:grpSpPr>
+              <a:xfrm>
+                <a:off x="762001" y="3284010"/>
+                <a:ext cx="3589866" cy="289984"/>
+                <a:chOff x="2032000" y="2006599"/>
+                <a:chExt cx="6096000" cy="1117600"/>
+              </a:xfrm>
+            </p:grpSpPr>
+            <p:sp>
+              <p:nvSpPr>
+                <p:cNvPr id="28" name="Rechteck 27">
+                  <a:extLst>
+                    <a:ext uri="{FF2B5EF4-FFF2-40B4-BE49-F238E27FC236}">
+                      <a16:creationId xmlns:a16="http://schemas.microsoft.com/office/drawing/2014/main" id="{51D40C88-FDF6-ABAE-3123-99AD71C63F4B}"/>
+                    </a:ext>
+                  </a:extLst>
+                </p:cNvPr>
+                <p:cNvSpPr/>
+                <p:nvPr/>
+              </p:nvSpPr>
+              <p:spPr>
+                <a:xfrm>
+                  <a:off x="2032000" y="2006599"/>
+                  <a:ext cx="6096000" cy="1117598"/>
+                </a:xfrm>
+                <a:prstGeom prst="rect">
+                  <a:avLst/>
+                </a:prstGeom>
+                <a:solidFill>
+                  <a:schemeClr val="accent2"/>
+                </a:solidFill>
+                <a:ln w="19050">
+                  <a:solidFill>
+                    <a:schemeClr val="tx1"/>
+                  </a:solidFill>
+                  <a:prstDash val="solid"/>
+                </a:ln>
+              </p:spPr>
+              <p:style>
+                <a:lnRef idx="2">
+                  <a:schemeClr val="accent1">
+                    <a:shade val="15000"/>
+                  </a:schemeClr>
+                </a:lnRef>
+                <a:fillRef idx="1">
+                  <a:schemeClr val="accent1"/>
+                </a:fillRef>
+                <a:effectRef idx="0">
+                  <a:schemeClr val="accent1"/>
+                </a:effectRef>
+                <a:fontRef idx="minor">
+                  <a:schemeClr val="lt1"/>
+                </a:fontRef>
+              </p:style>
+              <p:txBody>
+                <a:bodyPr rtlCol="0" anchor="ctr"/>
+                <a:lstStyle/>
+                <a:p>
+                  <a:pPr algn="ctr"/>
+                  <a:endParaRPr lang="de-DE"/>
+                </a:p>
+              </p:txBody>
+            </p:sp>
+            <p:sp>
+              <p:nvSpPr>
+                <p:cNvPr id="29" name="Rechteck 28">
+                  <a:extLst>
+                    <a:ext uri="{FF2B5EF4-FFF2-40B4-BE49-F238E27FC236}">
+                      <a16:creationId xmlns:a16="http://schemas.microsoft.com/office/drawing/2014/main" id="{83DA582A-6471-3592-9526-A959965F7127}"/>
+                    </a:ext>
+                  </a:extLst>
+                </p:cNvPr>
+                <p:cNvSpPr/>
+                <p:nvPr/>
+              </p:nvSpPr>
+              <p:spPr>
+                <a:xfrm>
+                  <a:off x="2032000" y="2006600"/>
+                  <a:ext cx="6096000" cy="372533"/>
+                </a:xfrm>
+                <a:prstGeom prst="rect">
+                  <a:avLst/>
+                </a:prstGeom>
+                <a:noFill/>
+                <a:ln>
+                  <a:solidFill>
+                    <a:schemeClr val="tx1"/>
+                  </a:solidFill>
+                  <a:prstDash val="lgDash"/>
+                </a:ln>
+              </p:spPr>
+              <p:style>
+                <a:lnRef idx="2">
+                  <a:schemeClr val="accent1">
+                    <a:shade val="15000"/>
+                  </a:schemeClr>
+                </a:lnRef>
+                <a:fillRef idx="1">
+                  <a:schemeClr val="accent1"/>
+                </a:fillRef>
+                <a:effectRef idx="0">
+                  <a:schemeClr val="accent1"/>
+                </a:effectRef>
+                <a:fontRef idx="minor">
+                  <a:schemeClr val="lt1"/>
+                </a:fontRef>
+              </p:style>
+              <p:txBody>
+                <a:bodyPr rtlCol="0" anchor="ctr"/>
+                <a:lstStyle/>
+                <a:p>
+                  <a:pPr algn="ctr"/>
+                  <a:endParaRPr lang="de-DE"/>
+                </a:p>
+              </p:txBody>
+            </p:sp>
+            <p:sp>
+              <p:nvSpPr>
+                <p:cNvPr id="30" name="Rechteck 29">
+                  <a:extLst>
+                    <a:ext uri="{FF2B5EF4-FFF2-40B4-BE49-F238E27FC236}">
+                      <a16:creationId xmlns:a16="http://schemas.microsoft.com/office/drawing/2014/main" id="{05A9CC10-7A3A-0278-3C38-E1656F1D258B}"/>
+                    </a:ext>
+                  </a:extLst>
+                </p:cNvPr>
+                <p:cNvSpPr/>
+                <p:nvPr/>
+              </p:nvSpPr>
+              <p:spPr>
+                <a:xfrm>
+                  <a:off x="2032000" y="2379133"/>
+                  <a:ext cx="6096000" cy="372533"/>
+                </a:xfrm>
+                <a:prstGeom prst="rect">
+                  <a:avLst/>
+                </a:prstGeom>
+                <a:noFill/>
+                <a:ln>
+                  <a:noFill/>
+                  <a:prstDash val="lgDash"/>
+                </a:ln>
+              </p:spPr>
+              <p:style>
+                <a:lnRef idx="2">
+                  <a:schemeClr val="accent1">
+                    <a:shade val="15000"/>
+                  </a:schemeClr>
+                </a:lnRef>
+                <a:fillRef idx="1">
+                  <a:schemeClr val="accent1"/>
+                </a:fillRef>
+                <a:effectRef idx="0">
+                  <a:schemeClr val="accent1"/>
+                </a:effectRef>
+                <a:fontRef idx="minor">
+                  <a:schemeClr val="lt1"/>
+                </a:fontRef>
+              </p:style>
+              <p:txBody>
+                <a:bodyPr rtlCol="0" anchor="ctr"/>
+                <a:lstStyle/>
+                <a:p>
+                  <a:pPr algn="ctr"/>
+                  <a:endParaRPr lang="de-DE"/>
+                </a:p>
+              </p:txBody>
+            </p:sp>
+            <p:sp>
+              <p:nvSpPr>
+                <p:cNvPr id="31" name="Rechteck 30">
+                  <a:extLst>
+                    <a:ext uri="{FF2B5EF4-FFF2-40B4-BE49-F238E27FC236}">
+                      <a16:creationId xmlns:a16="http://schemas.microsoft.com/office/drawing/2014/main" id="{B92BE667-398A-834E-FB94-6B1056B30C02}"/>
+                    </a:ext>
+                  </a:extLst>
+                </p:cNvPr>
+                <p:cNvSpPr/>
+                <p:nvPr/>
+              </p:nvSpPr>
+              <p:spPr>
+                <a:xfrm>
+                  <a:off x="2032000" y="2751666"/>
+                  <a:ext cx="6096000" cy="372533"/>
+                </a:xfrm>
+                <a:prstGeom prst="rect">
+                  <a:avLst/>
+                </a:prstGeom>
+                <a:noFill/>
+                <a:ln>
+                  <a:solidFill>
+                    <a:schemeClr val="tx1"/>
+                  </a:solidFill>
+                  <a:prstDash val="lgDash"/>
+                </a:ln>
+              </p:spPr>
+              <p:style>
+                <a:lnRef idx="2">
+                  <a:schemeClr val="accent1">
+                    <a:shade val="15000"/>
+                  </a:schemeClr>
+                </a:lnRef>
+                <a:fillRef idx="1">
+                  <a:schemeClr val="accent1"/>
+                </a:fillRef>
+                <a:effectRef idx="0">
+                  <a:schemeClr val="accent1"/>
+                </a:effectRef>
+                <a:fontRef idx="minor">
+                  <a:schemeClr val="lt1"/>
+                </a:fontRef>
+              </p:style>
+              <p:txBody>
+                <a:bodyPr rtlCol="0" anchor="ctr"/>
+                <a:lstStyle/>
+                <a:p>
+                  <a:pPr algn="ctr"/>
+                  <a:endParaRPr lang="de-DE"/>
+                </a:p>
+              </p:txBody>
+            </p:sp>
+          </p:grpSp>
+          <p:sp>
+            <p:nvSpPr>
+              <p:cNvPr id="26" name="Ellipse 25">
+                <a:extLst>
+                  <a:ext uri="{FF2B5EF4-FFF2-40B4-BE49-F238E27FC236}">
+                    <a16:creationId xmlns:a16="http://schemas.microsoft.com/office/drawing/2014/main" id="{8270C00B-90E5-D0D7-049D-B6D3E824B6B4}"/>
+                  </a:ext>
+                </a:extLst>
+              </p:cNvPr>
+              <p:cNvSpPr/>
+              <p:nvPr/>
+            </p:nvSpPr>
+            <p:spPr>
+              <a:xfrm>
+                <a:off x="4329007" y="3406139"/>
+                <a:ext cx="45719" cy="45719"/>
+              </a:xfrm>
+              <a:prstGeom prst="ellipse">
+                <a:avLst/>
+              </a:prstGeom>
+            </p:spPr>
+            <p:style>
+              <a:lnRef idx="2">
+                <a:schemeClr val="accent1">
+                  <a:shade val="15000"/>
+                </a:schemeClr>
+              </a:lnRef>
+              <a:fillRef idx="1">
+                <a:schemeClr val="accent1"/>
+              </a:fillRef>
+              <a:effectRef idx="0">
+                <a:schemeClr val="accent1"/>
+              </a:effectRef>
+              <a:fontRef idx="minor">
+                <a:schemeClr val="lt1"/>
+              </a:fontRef>
+            </p:style>
+            <p:txBody>
+              <a:bodyPr rtlCol="0" anchor="ctr"/>
+              <a:lstStyle/>
+              <a:p>
+                <a:pPr algn="ctr"/>
+                <a:endParaRPr lang="de-DE"/>
+              </a:p>
+            </p:txBody>
+          </p:sp>
+          <p:sp>
+            <p:nvSpPr>
+              <p:cNvPr id="27" name="Ellipse 26">
+                <a:extLst>
+                  <a:ext uri="{FF2B5EF4-FFF2-40B4-BE49-F238E27FC236}">
+                    <a16:creationId xmlns:a16="http://schemas.microsoft.com/office/drawing/2014/main" id="{3E01B6BF-DC14-22E0-65A9-57ECDDB38A36}"/>
+                  </a:ext>
+                </a:extLst>
+              </p:cNvPr>
+              <p:cNvSpPr/>
+              <p:nvPr/>
+            </p:nvSpPr>
+            <p:spPr>
+              <a:xfrm>
+                <a:off x="739141" y="3407921"/>
+                <a:ext cx="45719" cy="45719"/>
+              </a:xfrm>
+              <a:prstGeom prst="ellipse">
+                <a:avLst/>
+              </a:prstGeom>
+              <a:solidFill>
+                <a:schemeClr val="accent2"/>
+              </a:solidFill>
+            </p:spPr>
+            <p:style>
+              <a:lnRef idx="2">
+                <a:schemeClr val="accent1">
+                  <a:shade val="15000"/>
+                </a:schemeClr>
+              </a:lnRef>
+              <a:fillRef idx="1">
+                <a:schemeClr val="accent1"/>
+              </a:fillRef>
+              <a:effectRef idx="0">
+                <a:schemeClr val="accent1"/>
+              </a:effectRef>
+              <a:fontRef idx="minor">
+                <a:schemeClr val="lt1"/>
+              </a:fontRef>
+            </p:style>
+            <p:txBody>
+              <a:bodyPr rtlCol="0" anchor="ctr"/>
+              <a:lstStyle/>
+              <a:p>
+                <a:pPr algn="ctr"/>
+                <a:endParaRPr lang="de-DE"/>
+              </a:p>
+            </p:txBody>
+          </p:sp>
+        </p:grpSp>
+        <p:grpSp>
+          <p:nvGrpSpPr>
+            <p:cNvPr id="32" name="Gruppieren 31">
+              <a:extLst>
+                <a:ext uri="{FF2B5EF4-FFF2-40B4-BE49-F238E27FC236}">
+                  <a16:creationId xmlns:a16="http://schemas.microsoft.com/office/drawing/2014/main" id="{C6EA868D-771F-317B-534C-8B6FB4D32F03}"/>
+                </a:ext>
+              </a:extLst>
+            </p:cNvPr>
+            <p:cNvGrpSpPr/>
+            <p:nvPr/>
+          </p:nvGrpSpPr>
+          <p:grpSpPr>
+            <a:xfrm rot="7200000" flipV="1">
+              <a:off x="4552280" y="3599124"/>
+              <a:ext cx="6245794" cy="498178"/>
+              <a:chOff x="739141" y="3284008"/>
+              <a:chExt cx="3635585" cy="289983"/>
+            </a:xfrm>
+          </p:grpSpPr>
+          <p:grpSp>
+            <p:nvGrpSpPr>
+              <p:cNvPr id="33" name="Gruppieren 32">
+                <a:extLst>
+                  <a:ext uri="{FF2B5EF4-FFF2-40B4-BE49-F238E27FC236}">
+                    <a16:creationId xmlns:a16="http://schemas.microsoft.com/office/drawing/2014/main" id="{B02AD1BB-ABB3-1F0F-6276-9788DB9ED89A}"/>
+                  </a:ext>
+                </a:extLst>
+              </p:cNvPr>
+              <p:cNvGrpSpPr/>
+              <p:nvPr/>
+            </p:nvGrpSpPr>
+            <p:grpSpPr>
+              <a:xfrm>
+                <a:off x="762001" y="3284008"/>
+                <a:ext cx="3589866" cy="289983"/>
+                <a:chOff x="2032000" y="2006599"/>
+                <a:chExt cx="6096000" cy="1117600"/>
+              </a:xfrm>
+            </p:grpSpPr>
+            <p:sp>
+              <p:nvSpPr>
+                <p:cNvPr id="36" name="Rechteck 35">
+                  <a:extLst>
+                    <a:ext uri="{FF2B5EF4-FFF2-40B4-BE49-F238E27FC236}">
+                      <a16:creationId xmlns:a16="http://schemas.microsoft.com/office/drawing/2014/main" id="{7C10BD79-CA20-265D-542C-9B3DCD3F3788}"/>
+                    </a:ext>
+                  </a:extLst>
+                </p:cNvPr>
+                <p:cNvSpPr/>
+                <p:nvPr/>
+              </p:nvSpPr>
+              <p:spPr>
+                <a:xfrm>
+                  <a:off x="2032000" y="2006599"/>
+                  <a:ext cx="6096000" cy="1117598"/>
+                </a:xfrm>
+                <a:prstGeom prst="rect">
+                  <a:avLst/>
+                </a:prstGeom>
+                <a:solidFill>
+                  <a:srgbClr val="D0CECE"/>
+                </a:solidFill>
+                <a:ln w="19050">
+                  <a:solidFill>
+                    <a:schemeClr val="tx1"/>
+                  </a:solidFill>
+                  <a:prstDash val="solid"/>
+                </a:ln>
+              </p:spPr>
+              <p:style>
+                <a:lnRef idx="2">
+                  <a:schemeClr val="accent1">
+                    <a:shade val="15000"/>
+                  </a:schemeClr>
+                </a:lnRef>
+                <a:fillRef idx="1">
+                  <a:schemeClr val="accent1"/>
+                </a:fillRef>
+                <a:effectRef idx="0">
+                  <a:schemeClr val="accent1"/>
+                </a:effectRef>
+                <a:fontRef idx="minor">
+                  <a:schemeClr val="lt1"/>
+                </a:fontRef>
+              </p:style>
+              <p:txBody>
+                <a:bodyPr rtlCol="0" anchor="ctr"/>
+                <a:lstStyle/>
+                <a:p>
+                  <a:pPr algn="ctr"/>
+                  <a:endParaRPr lang="de-DE"/>
+                </a:p>
+              </p:txBody>
+            </p:sp>
+            <p:sp>
+              <p:nvSpPr>
+                <p:cNvPr id="37" name="Rechteck 36">
+                  <a:extLst>
+                    <a:ext uri="{FF2B5EF4-FFF2-40B4-BE49-F238E27FC236}">
+                      <a16:creationId xmlns:a16="http://schemas.microsoft.com/office/drawing/2014/main" id="{7068D4D7-76BD-1C98-1BF2-16E22DEA560D}"/>
+                    </a:ext>
+                  </a:extLst>
+                </p:cNvPr>
+                <p:cNvSpPr/>
+                <p:nvPr/>
+              </p:nvSpPr>
+              <p:spPr>
+                <a:xfrm>
+                  <a:off x="2032000" y="2006600"/>
+                  <a:ext cx="6096000" cy="372533"/>
+                </a:xfrm>
+                <a:prstGeom prst="rect">
+                  <a:avLst/>
+                </a:prstGeom>
+                <a:noFill/>
+                <a:ln>
+                  <a:solidFill>
+                    <a:schemeClr val="tx1"/>
+                  </a:solidFill>
+                  <a:prstDash val="lgDash"/>
+                </a:ln>
+              </p:spPr>
+              <p:style>
+                <a:lnRef idx="2">
+                  <a:schemeClr val="accent1">
+                    <a:shade val="15000"/>
+                  </a:schemeClr>
+                </a:lnRef>
+                <a:fillRef idx="1">
+                  <a:schemeClr val="accent1"/>
+                </a:fillRef>
+                <a:effectRef idx="0">
+                  <a:schemeClr val="accent1"/>
+                </a:effectRef>
+                <a:fontRef idx="minor">
+                  <a:schemeClr val="lt1"/>
+                </a:fontRef>
+              </p:style>
+              <p:txBody>
+                <a:bodyPr rtlCol="0" anchor="ctr"/>
+                <a:lstStyle/>
+                <a:p>
+                  <a:pPr algn="ctr"/>
+                  <a:endParaRPr lang="de-DE"/>
+                </a:p>
+              </p:txBody>
+            </p:sp>
+            <p:sp>
+              <p:nvSpPr>
+                <p:cNvPr id="38" name="Rechteck 37">
+                  <a:extLst>
+                    <a:ext uri="{FF2B5EF4-FFF2-40B4-BE49-F238E27FC236}">
+                      <a16:creationId xmlns:a16="http://schemas.microsoft.com/office/drawing/2014/main" id="{6F2F4474-39A4-EE08-3A70-112AD6C91D39}"/>
+                    </a:ext>
+                  </a:extLst>
+                </p:cNvPr>
+                <p:cNvSpPr/>
+                <p:nvPr/>
+              </p:nvSpPr>
+              <p:spPr>
+                <a:xfrm>
+                  <a:off x="2032000" y="2379133"/>
+                  <a:ext cx="6096000" cy="372533"/>
+                </a:xfrm>
+                <a:prstGeom prst="rect">
+                  <a:avLst/>
+                </a:prstGeom>
+                <a:noFill/>
+                <a:ln>
+                  <a:noFill/>
+                  <a:prstDash val="lgDash"/>
+                </a:ln>
+              </p:spPr>
+              <p:style>
+                <a:lnRef idx="2">
+                  <a:schemeClr val="accent1">
+                    <a:shade val="15000"/>
+                  </a:schemeClr>
+                </a:lnRef>
+                <a:fillRef idx="1">
+                  <a:schemeClr val="accent1"/>
+                </a:fillRef>
+                <a:effectRef idx="0">
+                  <a:schemeClr val="accent1"/>
+                </a:effectRef>
+                <a:fontRef idx="minor">
+                  <a:schemeClr val="lt1"/>
+                </a:fontRef>
+              </p:style>
+              <p:txBody>
+                <a:bodyPr rtlCol="0" anchor="ctr"/>
+                <a:lstStyle/>
+                <a:p>
+                  <a:pPr algn="ctr"/>
+                  <a:endParaRPr lang="de-DE"/>
+                </a:p>
+              </p:txBody>
+            </p:sp>
+            <p:sp>
+              <p:nvSpPr>
+                <p:cNvPr id="39" name="Rechteck 38">
+                  <a:extLst>
+                    <a:ext uri="{FF2B5EF4-FFF2-40B4-BE49-F238E27FC236}">
+                      <a16:creationId xmlns:a16="http://schemas.microsoft.com/office/drawing/2014/main" id="{EDBCB785-17D9-7069-FEEE-731EB71DE722}"/>
+                    </a:ext>
+                  </a:extLst>
+                </p:cNvPr>
+                <p:cNvSpPr/>
+                <p:nvPr/>
+              </p:nvSpPr>
+              <p:spPr>
+                <a:xfrm>
+                  <a:off x="2032000" y="2751666"/>
+                  <a:ext cx="6096000" cy="372533"/>
+                </a:xfrm>
+                <a:prstGeom prst="rect">
+                  <a:avLst/>
+                </a:prstGeom>
+                <a:noFill/>
+                <a:ln>
+                  <a:solidFill>
+                    <a:schemeClr val="tx1"/>
+                  </a:solidFill>
+                  <a:prstDash val="lgDash"/>
+                </a:ln>
+              </p:spPr>
+              <p:style>
+                <a:lnRef idx="2">
+                  <a:schemeClr val="accent1">
+                    <a:shade val="15000"/>
+                  </a:schemeClr>
+                </a:lnRef>
+                <a:fillRef idx="1">
+                  <a:schemeClr val="accent1"/>
+                </a:fillRef>
+                <a:effectRef idx="0">
+                  <a:schemeClr val="accent1"/>
+                </a:effectRef>
+                <a:fontRef idx="minor">
+                  <a:schemeClr val="lt1"/>
+                </a:fontRef>
+              </p:style>
+              <p:txBody>
+                <a:bodyPr rtlCol="0" anchor="ctr"/>
+                <a:lstStyle/>
+                <a:p>
+                  <a:pPr algn="ctr"/>
+                  <a:endParaRPr lang="de-DE"/>
+                </a:p>
+              </p:txBody>
+            </p:sp>
+          </p:grpSp>
+          <p:sp>
+            <p:nvSpPr>
+              <p:cNvPr id="34" name="Ellipse 33">
+                <a:extLst>
+                  <a:ext uri="{FF2B5EF4-FFF2-40B4-BE49-F238E27FC236}">
+                    <a16:creationId xmlns:a16="http://schemas.microsoft.com/office/drawing/2014/main" id="{E74BA855-EB3E-0D64-4552-ED34E216BEA3}"/>
+                  </a:ext>
+                </a:extLst>
+              </p:cNvPr>
+              <p:cNvSpPr/>
+              <p:nvPr/>
+            </p:nvSpPr>
+            <p:spPr>
+              <a:xfrm>
+                <a:off x="4329007" y="3406139"/>
+                <a:ext cx="45719" cy="45719"/>
+              </a:xfrm>
+              <a:prstGeom prst="ellipse">
+                <a:avLst/>
+              </a:prstGeom>
+            </p:spPr>
+            <p:style>
+              <a:lnRef idx="2">
+                <a:schemeClr val="accent1">
+                  <a:shade val="15000"/>
+                </a:schemeClr>
+              </a:lnRef>
+              <a:fillRef idx="1">
+                <a:schemeClr val="accent1"/>
+              </a:fillRef>
+              <a:effectRef idx="0">
+                <a:schemeClr val="accent1"/>
+              </a:effectRef>
+              <a:fontRef idx="minor">
+                <a:schemeClr val="lt1"/>
+              </a:fontRef>
+            </p:style>
+            <p:txBody>
+              <a:bodyPr rtlCol="0" anchor="ctr"/>
+              <a:lstStyle/>
+              <a:p>
+                <a:pPr algn="ctr"/>
+                <a:endParaRPr lang="de-DE"/>
+              </a:p>
+            </p:txBody>
+          </p:sp>
+          <p:sp>
+            <p:nvSpPr>
+              <p:cNvPr id="35" name="Ellipse 34">
+                <a:extLst>
+                  <a:ext uri="{FF2B5EF4-FFF2-40B4-BE49-F238E27FC236}">
+                    <a16:creationId xmlns:a16="http://schemas.microsoft.com/office/drawing/2014/main" id="{8996260B-9A20-AC49-B99E-E883F1E8F7D5}"/>
+                  </a:ext>
+                </a:extLst>
+              </p:cNvPr>
+              <p:cNvSpPr/>
+              <p:nvPr/>
+            </p:nvSpPr>
+            <p:spPr>
+              <a:xfrm>
+                <a:off x="739141" y="3407921"/>
+                <a:ext cx="45719" cy="45719"/>
+              </a:xfrm>
+              <a:prstGeom prst="ellipse">
+                <a:avLst/>
+              </a:prstGeom>
+              <a:solidFill>
+                <a:schemeClr val="accent2"/>
+              </a:solidFill>
+            </p:spPr>
+            <p:style>
+              <a:lnRef idx="2">
+                <a:schemeClr val="accent1">
+                  <a:shade val="15000"/>
+                </a:schemeClr>
+              </a:lnRef>
+              <a:fillRef idx="1">
+                <a:schemeClr val="accent1"/>
+              </a:fillRef>
+              <a:effectRef idx="0">
+                <a:schemeClr val="accent1"/>
+              </a:effectRef>
+              <a:fontRef idx="minor">
+                <a:schemeClr val="lt1"/>
+              </a:fontRef>
+            </p:style>
+            <p:txBody>
+              <a:bodyPr rtlCol="0" anchor="ctr"/>
+              <a:lstStyle/>
+              <a:p>
+                <a:pPr algn="ctr"/>
+                <a:endParaRPr lang="de-DE"/>
+              </a:p>
+            </p:txBody>
+          </p:sp>
+        </p:grpSp>
+      </p:grpSp>
+      <p:sp>
+        <p:nvSpPr>
+          <p:cNvPr id="40" name="Rechteck 39">
+            <a:extLst>
+              <a:ext uri="{FF2B5EF4-FFF2-40B4-BE49-F238E27FC236}">
+                <a16:creationId xmlns:a16="http://schemas.microsoft.com/office/drawing/2014/main" id="{C68CE133-30CD-70A3-AEDE-45A7BEC4E293}"/>
+              </a:ext>
+            </a:extLst>
+          </p:cNvPr>
+          <p:cNvSpPr/>
+          <p:nvPr/>
+        </p:nvSpPr>
+        <p:spPr>
+          <a:xfrm>
+            <a:off x="4968203" y="574445"/>
+            <a:ext cx="158750" cy="69850"/>
+          </a:xfrm>
+          <a:prstGeom prst="rect">
+            <a:avLst/>
+          </a:prstGeom>
+          <a:solidFill>
+            <a:srgbClr val="FF0000"/>
+          </a:solidFill>
+        </p:spPr>
+        <p:style>
+          <a:lnRef idx="2">
+            <a:schemeClr val="accent1">
+              <a:shade val="15000"/>
+            </a:schemeClr>
+          </a:lnRef>
+          <a:fillRef idx="1">
+            <a:schemeClr val="accent1"/>
+          </a:fillRef>
+          <a:effectRef idx="0">
+            <a:schemeClr val="accent1"/>
+          </a:effectRef>
+          <a:fontRef idx="minor">
+            <a:schemeClr val="lt1"/>
+          </a:fontRef>
+        </p:style>
+        <p:txBody>
+          <a:bodyPr lIns="0" tIns="0" rIns="0" bIns="0" rtlCol="0" anchor="ctr"/>
+          <a:lstStyle/>
+          <a:p>
+            <a:pPr algn="ctr"/>
+            <a:r>
+              <a:rPr lang="de-DE" sz="300" dirty="0"/>
+              <a:t>EGO</a:t>
+            </a:r>
+          </a:p>
+        </p:txBody>
+      </p:sp>
+      <p:cxnSp>
+        <p:nvCxnSpPr>
+          <p:cNvPr id="43" name="Gerader Verbinder 42">
+            <a:extLst>
+              <a:ext uri="{FF2B5EF4-FFF2-40B4-BE49-F238E27FC236}">
+                <a16:creationId xmlns:a16="http://schemas.microsoft.com/office/drawing/2014/main" id="{380D8C24-0C56-B14A-C783-F810417D5744}"/>
+              </a:ext>
+            </a:extLst>
+          </p:cNvPr>
+          <p:cNvCxnSpPr>
+            <a:stCxn id="26" idx="6"/>
+          </p:cNvCxnSpPr>
+          <p:nvPr/>
+        </p:nvCxnSpPr>
+        <p:spPr>
+          <a:xfrm flipV="1">
+            <a:off x="9241430" y="644295"/>
+            <a:ext cx="271664" cy="499412"/>
+          </a:xfrm>
+          <a:prstGeom prst="line">
+            <a:avLst/>
+          </a:prstGeom>
+          <a:ln>
+            <a:prstDash val="lgDash"/>
+          </a:ln>
+        </p:spPr>
+        <p:style>
+          <a:lnRef idx="1">
+            <a:schemeClr val="accent1"/>
+          </a:lnRef>
+          <a:fillRef idx="0">
+            <a:schemeClr val="accent1"/>
+          </a:fillRef>
+          <a:effectRef idx="0">
+            <a:schemeClr val="accent1"/>
+          </a:effectRef>
+          <a:fontRef idx="minor">
+            <a:schemeClr val="tx1"/>
+          </a:fontRef>
+        </p:style>
+      </p:cxnSp>
+      <p:cxnSp>
+        <p:nvCxnSpPr>
+          <p:cNvPr id="45" name="Gerader Verbinder 44">
+            <a:extLst>
+              <a:ext uri="{FF2B5EF4-FFF2-40B4-BE49-F238E27FC236}">
+                <a16:creationId xmlns:a16="http://schemas.microsoft.com/office/drawing/2014/main" id="{1A42400B-3FFB-6E7D-5ACF-5E78CAE16C23}"/>
+              </a:ext>
+            </a:extLst>
+          </p:cNvPr>
+          <p:cNvCxnSpPr>
+            <a:cxnSpLocks/>
+            <a:stCxn id="10" idx="2"/>
+          </p:cNvCxnSpPr>
+          <p:nvPr/>
+        </p:nvCxnSpPr>
+        <p:spPr>
+          <a:xfrm>
+            <a:off x="9020908" y="773134"/>
+            <a:ext cx="575530" cy="0"/>
+          </a:xfrm>
+          <a:prstGeom prst="line">
+            <a:avLst/>
+          </a:prstGeom>
+          <a:ln>
+            <a:prstDash val="lgDash"/>
+          </a:ln>
+        </p:spPr>
+        <p:style>
+          <a:lnRef idx="1">
+            <a:schemeClr val="accent1"/>
+          </a:lnRef>
+          <a:fillRef idx="0">
+            <a:schemeClr val="accent1"/>
+          </a:fillRef>
+          <a:effectRef idx="0">
+            <a:schemeClr val="accent1"/>
+          </a:effectRef>
+          <a:fontRef idx="minor">
+            <a:schemeClr val="tx1"/>
+          </a:fontRef>
+        </p:style>
+      </p:cxnSp>
+      <mc:AlternateContent xmlns:mc="http://schemas.openxmlformats.org/markup-compatibility/2006">
+        <mc:Choice xmlns:a14="http://schemas.microsoft.com/office/drawing/2010/main" Requires="a14">
+          <p:sp>
+            <p:nvSpPr>
+              <p:cNvPr id="47" name="Textfeld 46">
+                <a:extLst>
+                  <a:ext uri="{FF2B5EF4-FFF2-40B4-BE49-F238E27FC236}">
+                    <a16:creationId xmlns:a16="http://schemas.microsoft.com/office/drawing/2014/main" id="{5E0264B3-C6C4-310A-9B42-29EFDB19EA8B}"/>
+                  </a:ext>
+                </a:extLst>
+              </p:cNvPr>
+              <p:cNvSpPr txBox="1"/>
+              <p:nvPr/>
+            </p:nvSpPr>
+            <p:spPr>
+              <a:xfrm>
+                <a:off x="9574497" y="1053171"/>
+                <a:ext cx="413062" cy="463204"/>
+              </a:xfrm>
+              <a:prstGeom prst="rect">
+                <a:avLst/>
+              </a:prstGeom>
+              <a:noFill/>
+            </p:spPr>
+            <p:txBody>
+              <a:bodyPr wrap="none" lIns="0" tIns="0" rIns="0" bIns="0" rtlCol="0">
+                <a:spAutoFit/>
+              </a:bodyPr>
+              <a:lstStyle/>
+              <a:p>
+                <a14:m>
+                  <m:oMathPara xmlns:m="http://schemas.openxmlformats.org/officeDocument/2006/math">
+                    <m:oMathParaPr>
+                      <m:jc m:val="centerGroup"/>
+                    </m:oMathParaPr>
+                    <m:oMath xmlns:m="http://schemas.openxmlformats.org/officeDocument/2006/math">
+                      <m:d>
+                        <m:dPr>
+                          <m:ctrlPr>
+                            <a:rPr lang="de-DE" i="1" smtClean="0">
+                              <a:latin typeface="Cambria Math" panose="02040503050406030204" pitchFamily="18" charset="0"/>
+                            </a:rPr>
+                          </m:ctrlPr>
+                        </m:dPr>
+                        <m:e>
+                          <m:eqArr>
+                            <m:eqArrPr>
+                              <m:ctrlPr>
+                                <a:rPr lang="de-DE" i="1" smtClean="0">
+                                  <a:latin typeface="Cambria Math" panose="02040503050406030204" pitchFamily="18" charset="0"/>
+                                </a:rPr>
+                              </m:ctrlPr>
+                            </m:eqArrPr>
+                            <m:e>
+                              <m:r>
+                                <a:rPr lang="de-DE" b="0" i="1" smtClean="0">
+                                  <a:latin typeface="Cambria Math" panose="02040503050406030204" pitchFamily="18" charset="0"/>
+                                </a:rPr>
+                                <m:t>𝑥</m:t>
+                              </m:r>
+                            </m:e>
+                            <m:e>
+                              <m:r>
+                                <a:rPr lang="de-DE" b="0" i="1" smtClean="0">
+                                  <a:latin typeface="Cambria Math" panose="02040503050406030204" pitchFamily="18" charset="0"/>
+                                </a:rPr>
+                                <m:t>𝑦</m:t>
+                              </m:r>
+                            </m:e>
+                          </m:eqArr>
+                        </m:e>
+                      </m:d>
+                    </m:oMath>
+                  </m:oMathPara>
+                </a14:m>
+                <a:endParaRPr lang="de-DE" dirty="0"/>
+              </a:p>
+            </p:txBody>
+          </p:sp>
+        </mc:Choice>
+        <mc:Fallback>
+          <p:sp>
+            <p:nvSpPr>
+              <p:cNvPr id="47" name="Textfeld 46">
+                <a:extLst>
+                  <a:ext uri="{FF2B5EF4-FFF2-40B4-BE49-F238E27FC236}">
+                    <a16:creationId xmlns:a16="http://schemas.microsoft.com/office/drawing/2014/main" id="{5E0264B3-C6C4-310A-9B42-29EFDB19EA8B}"/>
+                  </a:ext>
+                </a:extLst>
+              </p:cNvPr>
+              <p:cNvSpPr txBox="1">
+                <a:spLocks noRot="1" noChangeAspect="1" noMove="1" noResize="1" noEditPoints="1" noAdjustHandles="1" noChangeArrowheads="1" noChangeShapeType="1" noTextEdit="1"/>
+              </p:cNvSpPr>
+              <p:nvPr/>
+            </p:nvSpPr>
+            <p:spPr>
+              <a:xfrm>
+                <a:off x="9574497" y="1053171"/>
+                <a:ext cx="413062" cy="463204"/>
+              </a:xfrm>
+              <a:prstGeom prst="rect">
+                <a:avLst/>
+              </a:prstGeom>
+              <a:blipFill>
+                <a:blip r:embed="rId2"/>
+                <a:stretch>
+                  <a:fillRect/>
+                </a:stretch>
+              </a:blipFill>
+            </p:spPr>
+            <p:txBody>
+              <a:bodyPr/>
+              <a:lstStyle/>
+              <a:p>
+                <a:r>
+                  <a:rPr lang="de-DE">
+                    <a:noFill/>
+                  </a:rPr>
+                  <a:t> </a:t>
+                </a:r>
+              </a:p>
+            </p:txBody>
+          </p:sp>
+        </mc:Fallback>
+      </mc:AlternateContent>
+      <mc:AlternateContent xmlns:mc="http://schemas.openxmlformats.org/markup-compatibility/2006">
+        <mc:Choice xmlns:a14="http://schemas.microsoft.com/office/drawing/2010/main" Requires="a14">
+          <p:sp>
+            <p:nvSpPr>
+              <p:cNvPr id="48" name="Textfeld 47">
+                <a:extLst>
+                  <a:ext uri="{FF2B5EF4-FFF2-40B4-BE49-F238E27FC236}">
+                    <a16:creationId xmlns:a16="http://schemas.microsoft.com/office/drawing/2014/main" id="{EE791880-3182-B408-D2A4-CBC0CD6AA4AF}"/>
+                  </a:ext>
+                </a:extLst>
+              </p:cNvPr>
+              <p:cNvSpPr txBox="1"/>
+              <p:nvPr/>
+            </p:nvSpPr>
+            <p:spPr>
+              <a:xfrm>
+                <a:off x="6497700" y="6309438"/>
+                <a:ext cx="470193" cy="530273"/>
+              </a:xfrm>
+              <a:prstGeom prst="rect">
+                <a:avLst/>
+              </a:prstGeom>
+              <a:noFill/>
+            </p:spPr>
+            <p:txBody>
+              <a:bodyPr wrap="none" lIns="0" tIns="0" rIns="0" bIns="0" rtlCol="0">
+                <a:spAutoFit/>
+              </a:bodyPr>
+              <a:lstStyle/>
+              <a:p>
+                <a14:m>
+                  <m:oMathPara xmlns:m="http://schemas.openxmlformats.org/officeDocument/2006/math">
+                    <m:oMathParaPr>
+                      <m:jc m:val="centerGroup"/>
+                    </m:oMathParaPr>
+                    <m:oMath xmlns:m="http://schemas.openxmlformats.org/officeDocument/2006/math">
+                      <m:d>
+                        <m:dPr>
+                          <m:ctrlPr>
+                            <a:rPr lang="de-DE" i="1" smtClean="0">
+                              <a:latin typeface="Cambria Math" panose="02040503050406030204" pitchFamily="18" charset="0"/>
+                            </a:rPr>
+                          </m:ctrlPr>
+                        </m:dPr>
+                        <m:e>
+                          <m:eqArr>
+                            <m:eqArrPr>
+                              <m:ctrlPr>
+                                <a:rPr lang="de-DE" i="1" smtClean="0">
+                                  <a:latin typeface="Cambria Math" panose="02040503050406030204" pitchFamily="18" charset="0"/>
+                                </a:rPr>
+                              </m:ctrlPr>
+                            </m:eqArrPr>
+                            <m:e>
+                              <m:r>
+                                <a:rPr lang="de-DE" b="0" i="1" smtClean="0">
+                                  <a:latin typeface="Cambria Math" panose="02040503050406030204" pitchFamily="18" charset="0"/>
+                                </a:rPr>
+                                <m:t>𝑥</m:t>
+                              </m:r>
+                              <m:r>
+                                <a:rPr lang="de-DE" b="0" i="1" smtClean="0">
+                                  <a:latin typeface="Cambria Math" panose="02040503050406030204" pitchFamily="18" charset="0"/>
+                                </a:rPr>
+                                <m:t>′</m:t>
+                              </m:r>
+                            </m:e>
+                            <m:e>
+                              <m:r>
+                                <a:rPr lang="de-DE" b="0" i="1" smtClean="0">
+                                  <a:latin typeface="Cambria Math" panose="02040503050406030204" pitchFamily="18" charset="0"/>
+                                </a:rPr>
+                                <m:t>𝑦</m:t>
+                              </m:r>
+                              <m:r>
+                                <a:rPr lang="de-DE" b="0" i="1" smtClean="0">
+                                  <a:latin typeface="Cambria Math" panose="02040503050406030204" pitchFamily="18" charset="0"/>
+                                </a:rPr>
+                                <m:t>′</m:t>
+                              </m:r>
+                            </m:e>
+                          </m:eqArr>
+                        </m:e>
+                      </m:d>
+                    </m:oMath>
+                  </m:oMathPara>
+                </a14:m>
+                <a:endParaRPr lang="de-DE" dirty="0"/>
+              </a:p>
+            </p:txBody>
+          </p:sp>
+        </mc:Choice>
+        <mc:Fallback>
+          <p:sp>
+            <p:nvSpPr>
+              <p:cNvPr id="48" name="Textfeld 47">
+                <a:extLst>
+                  <a:ext uri="{FF2B5EF4-FFF2-40B4-BE49-F238E27FC236}">
+                    <a16:creationId xmlns:a16="http://schemas.microsoft.com/office/drawing/2014/main" id="{EE791880-3182-B408-D2A4-CBC0CD6AA4AF}"/>
+                  </a:ext>
+                </a:extLst>
+              </p:cNvPr>
+              <p:cNvSpPr txBox="1">
+                <a:spLocks noRot="1" noChangeAspect="1" noMove="1" noResize="1" noEditPoints="1" noAdjustHandles="1" noChangeArrowheads="1" noChangeShapeType="1" noTextEdit="1"/>
+              </p:cNvSpPr>
+              <p:nvPr/>
+            </p:nvSpPr>
+            <p:spPr>
+              <a:xfrm>
+                <a:off x="6497700" y="6309438"/>
+                <a:ext cx="470193" cy="530273"/>
+              </a:xfrm>
+              <a:prstGeom prst="rect">
+                <a:avLst/>
+              </a:prstGeom>
+              <a:blipFill>
+                <a:blip r:embed="rId3"/>
+                <a:stretch>
+                  <a:fillRect b="-1149"/>
+                </a:stretch>
+              </a:blipFill>
+            </p:spPr>
+            <p:txBody>
+              <a:bodyPr/>
+              <a:lstStyle/>
+              <a:p>
+                <a:r>
+                  <a:rPr lang="de-DE">
+                    <a:noFill/>
+                  </a:rPr>
+                  <a:t> </a:t>
+                </a:r>
+              </a:p>
+            </p:txBody>
+          </p:sp>
+        </mc:Fallback>
+      </mc:AlternateContent>
+    </p:spTree>
+    <p:extLst>
+      <p:ext uri="{BB962C8B-B14F-4D97-AF65-F5344CB8AC3E}">
+        <p14:creationId xmlns:p14="http://schemas.microsoft.com/office/powerpoint/2010/main" val="1082289119"/>
+      </p:ext>
+    </p:extLst>
+  </p:cSld>
+  <p:clrMapOvr>
+    <a:masterClrMapping/>
+  </p:clrMapOvr>
+</p:sld>
+</file>
+
+<file path=ppt/slides/slide2.xml><?xml version="1.0" encoding="utf-8"?>
 <p:sld xmlns:a="http://schemas.openxmlformats.org/drawingml/2006/main" xmlns:r="http://schemas.openxmlformats.org/officeDocument/2006/relationships" xmlns:p="http://schemas.openxmlformats.org/presentationml/2006/main">
   <p:cSld>
     <p:spTree>
@@ -8131,7 +9627,7 @@
 </p:sld>
 </file>
 
-<file path=ppt/slides/slide2.xml><?xml version="1.0" encoding="utf-8"?>
+<file path=ppt/slides/slide3.xml><?xml version="1.0" encoding="utf-8"?>
 <p:sld xmlns:a="http://schemas.openxmlformats.org/drawingml/2006/main" xmlns:r="http://schemas.openxmlformats.org/officeDocument/2006/relationships" xmlns:p="http://schemas.openxmlformats.org/presentationml/2006/main">
   <p:cSld>
     <p:spTree>
@@ -12519,7 +14015,7 @@
 </p:sld>
 </file>
 
-<file path=ppt/slides/slide3.xml><?xml version="1.0" encoding="utf-8"?>
+<file path=ppt/slides/slide4.xml><?xml version="1.0" encoding="utf-8"?>
 <p:sld xmlns:a="http://schemas.openxmlformats.org/drawingml/2006/main" xmlns:r="http://schemas.openxmlformats.org/officeDocument/2006/relationships" xmlns:p="http://schemas.openxmlformats.org/presentationml/2006/main">
   <p:cSld>
     <p:spTree>
@@ -17109,7 +18605,7 @@
 </p:sld>
 </file>
 
-<file path=ppt/slides/slide4.xml><?xml version="1.0" encoding="utf-8"?>
+<file path=ppt/slides/slide5.xml><?xml version="1.0" encoding="utf-8"?>
 <p:sld xmlns:a="http://schemas.openxmlformats.org/drawingml/2006/main" xmlns:r="http://schemas.openxmlformats.org/officeDocument/2006/relationships" xmlns:p="http://schemas.openxmlformats.org/presentationml/2006/main">
   <p:cSld>
     <p:spTree>

</xml_diff>

<commit_message>
Towards a norming of the road graph coordinates
</commit_message>
<xml_diff>
--- a/examples/UrbanTopologies.pptx
+++ b/examples/UrbanTopologies.pptx
@@ -5615,7 +5615,7 @@
             <p:spPr>
               <a:xfrm>
                 <a:off x="11430455" y="2259242"/>
-                <a:ext cx="774571" cy="461986"/>
+                <a:ext cx="774571" cy="467500"/>
               </a:xfrm>
               <a:prstGeom prst="rect">
                 <a:avLst/>
@@ -5657,7 +5657,7 @@
                               <a:rPr lang="de-DE" b="0" i="1" smtClean="0">
                                 <a:latin typeface="Cambria Math" panose="02040503050406030204" pitchFamily="18" charset="0"/>
                               </a:rPr>
-                              <m:t>93.3</m:t>
+                              <m:t>75</m:t>
                             </m:r>
                           </m:e>
                           <m:e>
@@ -5665,7 +5665,13 @@
                               <a:rPr lang="de-DE" b="0" i="1" smtClean="0">
                                 <a:latin typeface="Cambria Math" panose="02040503050406030204" pitchFamily="18" charset="0"/>
                               </a:rPr>
-                              <m:t>75</m:t>
+                              <m:t>4</m:t>
+                            </m:r>
+                            <m:r>
+                              <a:rPr lang="de-DE" i="1">
+                                <a:latin typeface="Cambria Math" panose="02040503050406030204" pitchFamily="18" charset="0"/>
+                              </a:rPr>
+                              <m:t>3.3</m:t>
                             </m:r>
                           </m:e>
                         </m:eqArr>
@@ -5696,7 +5702,7 @@
             <p:spPr>
               <a:xfrm>
                 <a:off x="11430455" y="2259242"/>
-                <a:ext cx="774571" cy="461986"/>
+                <a:ext cx="774571" cy="467500"/>
               </a:xfrm>
               <a:prstGeom prst="rect">
                 <a:avLst/>
@@ -5704,7 +5710,144 @@
               <a:blipFill>
                 <a:blip r:embed="rId16"/>
                 <a:stretch>
-                  <a:fillRect l="-18110" b="-12000"/>
+                  <a:fillRect l="-18110" b="-10526"/>
+                </a:stretch>
+              </a:blipFill>
+            </p:spPr>
+            <p:txBody>
+              <a:bodyPr/>
+              <a:lstStyle/>
+              <a:p>
+                <a:r>
+                  <a:rPr lang="de-DE">
+                    <a:noFill/>
+                  </a:rPr>
+                  <a:t> </a:t>
+                </a:r>
+              </a:p>
+            </p:txBody>
+          </p:sp>
+        </mc:Fallback>
+      </mc:AlternateContent>
+      <mc:AlternateContent xmlns:mc="http://schemas.openxmlformats.org/markup-compatibility/2006">
+        <mc:Choice xmlns:a14="http://schemas.microsoft.com/office/drawing/2010/main" Requires="a14">
+          <p:sp>
+            <p:nvSpPr>
+              <p:cNvPr id="32" name="Textfeld 31">
+                <a:extLst>
+                  <a:ext uri="{FF2B5EF4-FFF2-40B4-BE49-F238E27FC236}">
+                    <a16:creationId xmlns:a16="http://schemas.microsoft.com/office/drawing/2014/main" id="{F338E9CE-F498-EC8A-0DE5-5A7FA1DB70B4}"/>
+                  </a:ext>
+                </a:extLst>
+              </p:cNvPr>
+              <p:cNvSpPr txBox="1"/>
+              <p:nvPr/>
+            </p:nvSpPr>
+            <p:spPr>
+              <a:xfrm>
+                <a:off x="8247794" y="6028204"/>
+                <a:ext cx="774571" cy="467500"/>
+              </a:xfrm>
+              <a:prstGeom prst="rect">
+                <a:avLst/>
+              </a:prstGeom>
+              <a:noFill/>
+            </p:spPr>
+            <p:txBody>
+              <a:bodyPr wrap="none" lIns="0" tIns="0" rIns="0" bIns="0" rtlCol="0">
+                <a:spAutoFit/>
+              </a:bodyPr>
+              <a:lstStyle/>
+              <a:p>
+                <a:pPr algn="ctr"/>
+                <a:r>
+                  <a:rPr lang="de-DE" dirty="0"/>
+                  <a:t>=</a:t>
+                </a:r>
+                <a14:m>
+                  <m:oMath xmlns:m="http://schemas.openxmlformats.org/officeDocument/2006/math">
+                    <m:d>
+                      <m:dPr>
+                        <m:ctrlPr>
+                          <a:rPr lang="de-DE" i="1" smtClean="0">
+                            <a:latin typeface="Cambria Math" panose="02040503050406030204" pitchFamily="18" charset="0"/>
+                          </a:rPr>
+                        </m:ctrlPr>
+                      </m:dPr>
+                      <m:e>
+                        <m:eqArr>
+                          <m:eqArrPr>
+                            <m:ctrlPr>
+                              <a:rPr lang="de-DE" i="1" smtClean="0">
+                                <a:latin typeface="Cambria Math" panose="02040503050406030204" pitchFamily="18" charset="0"/>
+                              </a:rPr>
+                            </m:ctrlPr>
+                          </m:eqArrPr>
+                          <m:e>
+                            <m:r>
+                              <a:rPr lang="de-DE" b="0" i="1" smtClean="0">
+                                <a:latin typeface="Cambria Math" panose="02040503050406030204" pitchFamily="18" charset="0"/>
+                              </a:rPr>
+                              <m:t>50</m:t>
+                            </m:r>
+                          </m:e>
+                          <m:e>
+                            <m:r>
+                              <a:rPr lang="de-DE" b="0" i="1" smtClean="0">
+                                <a:latin typeface="Cambria Math" panose="02040503050406030204" pitchFamily="18" charset="0"/>
+                              </a:rPr>
+                              <m:t>86</m:t>
+                            </m:r>
+                            <m:r>
+                              <a:rPr lang="de-DE" i="1">
+                                <a:latin typeface="Cambria Math" panose="02040503050406030204" pitchFamily="18" charset="0"/>
+                              </a:rPr>
+                              <m:t>.</m:t>
+                            </m:r>
+                            <m:r>
+                              <a:rPr lang="de-DE" b="0" i="1" smtClean="0">
+                                <a:latin typeface="Cambria Math" panose="02040503050406030204" pitchFamily="18" charset="0"/>
+                              </a:rPr>
+                              <m:t>6</m:t>
+                            </m:r>
+                          </m:e>
+                        </m:eqArr>
+                      </m:e>
+                    </m:d>
+                  </m:oMath>
+                </a14:m>
+                <a:endParaRPr lang="de-DE" dirty="0"/>
+              </a:p>
+            </p:txBody>
+          </p:sp>
+        </mc:Choice>
+        <mc:Fallback>
+          <p:sp>
+            <p:nvSpPr>
+              <p:cNvPr id="32" name="Textfeld 31">
+                <a:extLst>
+                  <a:ext uri="{FF2B5EF4-FFF2-40B4-BE49-F238E27FC236}">
+                    <a16:creationId xmlns:a16="http://schemas.microsoft.com/office/drawing/2014/main" id="{F338E9CE-F498-EC8A-0DE5-5A7FA1DB70B4}"/>
+                  </a:ext>
+                </a:extLst>
+              </p:cNvPr>
+              <p:cNvSpPr txBox="1">
+                <a:spLocks noRot="1" noChangeAspect="1" noMove="1" noResize="1" noEditPoints="1" noAdjustHandles="1" noChangeArrowheads="1" noChangeShapeType="1" noTextEdit="1"/>
+              </p:cNvSpPr>
+              <p:nvPr/>
+            </p:nvSpPr>
+            <p:spPr>
+              <a:xfrm>
+                <a:off x="8247794" y="6028204"/>
+                <a:ext cx="774571" cy="467500"/>
+              </a:xfrm>
+              <a:prstGeom prst="rect">
+                <a:avLst/>
+              </a:prstGeom>
+              <a:blipFill>
+                <a:blip r:embed="rId17"/>
+                <a:stretch>
+                  <a:fillRect l="-18110" b="-9091"/>
                 </a:stretch>
               </a:blipFill>
             </p:spPr>

</xml_diff>

<commit_message>
Coordinate origin normalized to center point between left and right side of the road
</commit_message>
<xml_diff>
--- a/examples/UrbanTopologies.pptx
+++ b/examples/UrbanTopologies.pptx
@@ -5,12 +5,13 @@
     <p:sldMasterId id="2147483648" r:id="rId1"/>
   </p:sldMasterIdLst>
   <p:sldIdLst>
-    <p:sldId id="261" r:id="rId2"/>
-    <p:sldId id="260" r:id="rId3"/>
-    <p:sldId id="256" r:id="rId4"/>
-    <p:sldId id="259" r:id="rId5"/>
-    <p:sldId id="257" r:id="rId6"/>
-    <p:sldId id="258" r:id="rId7"/>
+    <p:sldId id="262" r:id="rId2"/>
+    <p:sldId id="261" r:id="rId3"/>
+    <p:sldId id="260" r:id="rId4"/>
+    <p:sldId id="256" r:id="rId5"/>
+    <p:sldId id="259" r:id="rId6"/>
+    <p:sldId id="257" r:id="rId7"/>
+    <p:sldId id="258" r:id="rId8"/>
   </p:sldIdLst>
   <p:sldSz cx="12192000" cy="6858000"/>
   <p:notesSz cx="6858000" cy="9144000"/>
@@ -3336,6 +3337,238 @@
           <p:cNvPr id="5" name="Grafik 4">
             <a:extLst>
               <a:ext uri="{FF2B5EF4-FFF2-40B4-BE49-F238E27FC236}">
+                <a16:creationId xmlns:a16="http://schemas.microsoft.com/office/drawing/2014/main" id="{96F0CB09-B08A-AC91-C2F1-7463C791D933}"/>
+              </a:ext>
+            </a:extLst>
+          </p:cNvPr>
+          <p:cNvPicPr>
+            <a:picLocks noChangeAspect="1"/>
+          </p:cNvPicPr>
+          <p:nvPr/>
+        </p:nvPicPr>
+        <p:blipFill>
+          <a:blip r:embed="rId2"/>
+          <a:stretch>
+            <a:fillRect/>
+          </a:stretch>
+        </p:blipFill>
+        <p:spPr>
+          <a:xfrm>
+            <a:off x="0" y="371475"/>
+            <a:ext cx="12192000" cy="6115050"/>
+          </a:xfrm>
+          <a:prstGeom prst="rect">
+            <a:avLst/>
+          </a:prstGeom>
+        </p:spPr>
+      </p:pic>
+      <p:cxnSp>
+        <p:nvCxnSpPr>
+          <p:cNvPr id="7" name="Gerader Verbinder 6">
+            <a:extLst>
+              <a:ext uri="{FF2B5EF4-FFF2-40B4-BE49-F238E27FC236}">
+                <a16:creationId xmlns:a16="http://schemas.microsoft.com/office/drawing/2014/main" id="{7AC74941-335F-5DF9-1D0C-83CD81A57E3C}"/>
+              </a:ext>
+            </a:extLst>
+          </p:cNvPr>
+          <p:cNvCxnSpPr>
+            <a:cxnSpLocks/>
+          </p:cNvCxnSpPr>
+          <p:nvPr/>
+        </p:nvCxnSpPr>
+        <p:spPr>
+          <a:xfrm>
+            <a:off x="1176867" y="355600"/>
+            <a:ext cx="3928533" cy="6798733"/>
+          </a:xfrm>
+          <a:prstGeom prst="line">
+            <a:avLst/>
+          </a:prstGeom>
+          <a:ln>
+            <a:solidFill>
+              <a:srgbClr val="FF0000"/>
+            </a:solidFill>
+          </a:ln>
+        </p:spPr>
+        <p:style>
+          <a:lnRef idx="1">
+            <a:schemeClr val="accent2"/>
+          </a:lnRef>
+          <a:fillRef idx="0">
+            <a:schemeClr val="accent2"/>
+          </a:fillRef>
+          <a:effectRef idx="0">
+            <a:schemeClr val="accent2"/>
+          </a:effectRef>
+          <a:fontRef idx="minor">
+            <a:schemeClr val="tx1"/>
+          </a:fontRef>
+        </p:style>
+      </p:cxnSp>
+      <p:cxnSp>
+        <p:nvCxnSpPr>
+          <p:cNvPr id="9" name="Gerader Verbinder 8">
+            <a:extLst>
+              <a:ext uri="{FF2B5EF4-FFF2-40B4-BE49-F238E27FC236}">
+                <a16:creationId xmlns:a16="http://schemas.microsoft.com/office/drawing/2014/main" id="{C2F8475E-F2CE-E1DB-C00A-063EC5F37CF1}"/>
+              </a:ext>
+            </a:extLst>
+          </p:cNvPr>
+          <p:cNvCxnSpPr>
+            <a:cxnSpLocks/>
+          </p:cNvCxnSpPr>
+          <p:nvPr/>
+        </p:nvCxnSpPr>
+        <p:spPr>
+          <a:xfrm flipH="1">
+            <a:off x="3014133" y="2125133"/>
+            <a:ext cx="6112934" cy="3496734"/>
+          </a:xfrm>
+          <a:prstGeom prst="line">
+            <a:avLst/>
+          </a:prstGeom>
+          <a:ln>
+            <a:solidFill>
+              <a:srgbClr val="FF0000"/>
+            </a:solidFill>
+          </a:ln>
+        </p:spPr>
+        <p:style>
+          <a:lnRef idx="1">
+            <a:schemeClr val="accent1"/>
+          </a:lnRef>
+          <a:fillRef idx="0">
+            <a:schemeClr val="accent1"/>
+          </a:fillRef>
+          <a:effectRef idx="0">
+            <a:schemeClr val="accent1"/>
+          </a:effectRef>
+          <a:fontRef idx="minor">
+            <a:schemeClr val="tx1"/>
+          </a:fontRef>
+        </p:style>
+      </p:cxnSp>
+      <p:cxnSp>
+        <p:nvCxnSpPr>
+          <p:cNvPr id="16" name="Gerader Verbinder 15">
+            <a:extLst>
+              <a:ext uri="{FF2B5EF4-FFF2-40B4-BE49-F238E27FC236}">
+                <a16:creationId xmlns:a16="http://schemas.microsoft.com/office/drawing/2014/main" id="{5DA34C1D-457F-1FFB-A2D0-AAC539F82A20}"/>
+              </a:ext>
+            </a:extLst>
+          </p:cNvPr>
+          <p:cNvCxnSpPr>
+            <a:cxnSpLocks/>
+          </p:cNvCxnSpPr>
+          <p:nvPr/>
+        </p:nvCxnSpPr>
+        <p:spPr>
+          <a:xfrm flipV="1">
+            <a:off x="541867" y="245533"/>
+            <a:ext cx="3556000" cy="6162410"/>
+          </a:xfrm>
+          <a:prstGeom prst="line">
+            <a:avLst/>
+          </a:prstGeom>
+          <a:ln>
+            <a:solidFill>
+              <a:srgbClr val="FF0000"/>
+            </a:solidFill>
+          </a:ln>
+        </p:spPr>
+        <p:style>
+          <a:lnRef idx="1">
+            <a:schemeClr val="accent2"/>
+          </a:lnRef>
+          <a:fillRef idx="0">
+            <a:schemeClr val="accent2"/>
+          </a:fillRef>
+          <a:effectRef idx="0">
+            <a:schemeClr val="accent2"/>
+          </a:effectRef>
+          <a:fontRef idx="minor">
+            <a:schemeClr val="tx1"/>
+          </a:fontRef>
+        </p:style>
+      </p:cxnSp>
+      <p:cxnSp>
+        <p:nvCxnSpPr>
+          <p:cNvPr id="20" name="Gerader Verbinder 19">
+            <a:extLst>
+              <a:ext uri="{FF2B5EF4-FFF2-40B4-BE49-F238E27FC236}">
+                <a16:creationId xmlns:a16="http://schemas.microsoft.com/office/drawing/2014/main" id="{BF2D70E9-E26A-9971-0D2F-ADCC0E8CE7CD}"/>
+              </a:ext>
+            </a:extLst>
+          </p:cNvPr>
+          <p:cNvCxnSpPr>
+            <a:cxnSpLocks/>
+          </p:cNvCxnSpPr>
+          <p:nvPr/>
+        </p:nvCxnSpPr>
+        <p:spPr>
+          <a:xfrm>
+            <a:off x="3420533" y="254000"/>
+            <a:ext cx="5842000" cy="3361267"/>
+          </a:xfrm>
+          <a:prstGeom prst="line">
+            <a:avLst/>
+          </a:prstGeom>
+          <a:ln>
+            <a:solidFill>
+              <a:srgbClr val="FF0000"/>
+            </a:solidFill>
+          </a:ln>
+        </p:spPr>
+        <p:style>
+          <a:lnRef idx="1">
+            <a:schemeClr val="accent2"/>
+          </a:lnRef>
+          <a:fillRef idx="0">
+            <a:schemeClr val="accent2"/>
+          </a:fillRef>
+          <a:effectRef idx="0">
+            <a:schemeClr val="accent2"/>
+          </a:effectRef>
+          <a:fontRef idx="minor">
+            <a:schemeClr val="tx1"/>
+          </a:fontRef>
+        </p:style>
+      </p:cxnSp>
+    </p:spTree>
+    <p:extLst>
+      <p:ext uri="{BB962C8B-B14F-4D97-AF65-F5344CB8AC3E}">
+        <p14:creationId xmlns:p14="http://schemas.microsoft.com/office/powerpoint/2010/main" val="1978020987"/>
+      </p:ext>
+    </p:extLst>
+  </p:cSld>
+  <p:clrMapOvr>
+    <a:masterClrMapping/>
+  </p:clrMapOvr>
+</p:sld>
+</file>
+
+<file path=ppt/slides/slide2.xml><?xml version="1.0" encoding="utf-8"?>
+<p:sld xmlns:a="http://schemas.openxmlformats.org/drawingml/2006/main" xmlns:r="http://schemas.openxmlformats.org/officeDocument/2006/relationships" xmlns:p="http://schemas.openxmlformats.org/presentationml/2006/main">
+  <p:cSld>
+    <p:spTree>
+      <p:nvGrpSpPr>
+        <p:cNvPr id="1" name=""/>
+        <p:cNvGrpSpPr/>
+        <p:nvPr/>
+      </p:nvGrpSpPr>
+      <p:grpSpPr>
+        <a:xfrm>
+          <a:off x="0" y="0"/>
+          <a:ext cx="0" cy="0"/>
+          <a:chOff x="0" y="0"/>
+          <a:chExt cx="0" cy="0"/>
+        </a:xfrm>
+      </p:grpSpPr>
+      <p:pic>
+        <p:nvPicPr>
+          <p:cNvPr id="5" name="Grafik 4">
+            <a:extLst>
+              <a:ext uri="{FF2B5EF4-FFF2-40B4-BE49-F238E27FC236}">
                 <a16:creationId xmlns:a16="http://schemas.microsoft.com/office/drawing/2014/main" id="{87AF1CA0-3DEA-BF75-7E14-05617B0C9716}"/>
               </a:ext>
             </a:extLst>
@@ -3417,8 +3650,8 @@
           </a:p>
         </p:txBody>
       </p:sp>
-      <mc:AlternateContent xmlns:mc="http://schemas.openxmlformats.org/markup-compatibility/2006">
-        <mc:Choice xmlns:a14="http://schemas.microsoft.com/office/drawing/2010/main" Requires="a14">
+      <mc:AlternateContent xmlns:mc="http://schemas.openxmlformats.org/markup-compatibility/2006" xmlns:a14="http://schemas.microsoft.com/office/drawing/2010/main">
+        <mc:Choice Requires="a14">
           <p:sp>
             <p:nvSpPr>
               <p:cNvPr id="8" name="Textfeld 7">
@@ -3466,7 +3699,7 @@
             </p:txBody>
           </p:sp>
         </mc:Choice>
-        <mc:Fallback>
+        <mc:Fallback xmlns="">
           <p:sp>
             <p:nvSpPr>
               <p:cNvPr id="8" name="Textfeld 7">
@@ -3615,8 +3848,8 @@
           </p:txBody>
         </p:sp>
       </p:grpSp>
-      <mc:AlternateContent xmlns:mc="http://schemas.openxmlformats.org/markup-compatibility/2006">
-        <mc:Choice xmlns:a14="http://schemas.microsoft.com/office/drawing/2010/main" Requires="a14">
+      <mc:AlternateContent xmlns:mc="http://schemas.openxmlformats.org/markup-compatibility/2006" xmlns:a14="http://schemas.microsoft.com/office/drawing/2010/main">
+        <mc:Choice Requires="a14">
           <p:sp>
             <p:nvSpPr>
               <p:cNvPr id="2" name="Textfeld 1">
@@ -3696,7 +3929,7 @@
             </p:txBody>
           </p:sp>
         </mc:Choice>
-        <mc:Fallback>
+        <mc:Fallback xmlns="">
           <p:sp>
             <p:nvSpPr>
               <p:cNvPr id="2" name="Textfeld 1">
@@ -3833,8 +4066,8 @@
           </a:p>
         </p:txBody>
       </p:sp>
-      <mc:AlternateContent xmlns:mc="http://schemas.openxmlformats.org/markup-compatibility/2006">
-        <mc:Choice xmlns:a14="http://schemas.microsoft.com/office/drawing/2010/main" Requires="a14">
+      <mc:AlternateContent xmlns:mc="http://schemas.openxmlformats.org/markup-compatibility/2006" xmlns:a14="http://schemas.microsoft.com/office/drawing/2010/main">
+        <mc:Choice Requires="a14">
           <p:sp>
             <p:nvSpPr>
               <p:cNvPr id="6" name="Textfeld 5">
@@ -3914,7 +4147,7 @@
             </p:txBody>
           </p:sp>
         </mc:Choice>
-        <mc:Fallback>
+        <mc:Fallback xmlns="">
           <p:sp>
             <p:nvSpPr>
               <p:cNvPr id="6" name="Textfeld 5">
@@ -4051,8 +4284,8 @@
           </a:p>
         </p:txBody>
       </p:sp>
-      <mc:AlternateContent xmlns:mc="http://schemas.openxmlformats.org/markup-compatibility/2006">
-        <mc:Choice xmlns:a14="http://schemas.microsoft.com/office/drawing/2010/main" Requires="a14">
+      <mc:AlternateContent xmlns:mc="http://schemas.openxmlformats.org/markup-compatibility/2006" xmlns:a14="http://schemas.microsoft.com/office/drawing/2010/main">
+        <mc:Choice Requires="a14">
           <p:sp>
             <p:nvSpPr>
               <p:cNvPr id="17" name="Textfeld 16">
@@ -4132,7 +4365,7 @@
             </p:txBody>
           </p:sp>
         </mc:Choice>
-        <mc:Fallback>
+        <mc:Fallback xmlns="">
           <p:sp>
             <p:nvSpPr>
               <p:cNvPr id="17" name="Textfeld 16">
@@ -4177,8 +4410,8 @@
           </p:sp>
         </mc:Fallback>
       </mc:AlternateContent>
-      <mc:AlternateContent xmlns:mc="http://schemas.openxmlformats.org/markup-compatibility/2006">
-        <mc:Choice xmlns:a14="http://schemas.microsoft.com/office/drawing/2010/main" Requires="a14">
+      <mc:AlternateContent xmlns:mc="http://schemas.openxmlformats.org/markup-compatibility/2006" xmlns:a14="http://schemas.microsoft.com/office/drawing/2010/main">
+        <mc:Choice Requires="a14">
           <p:sp>
             <p:nvSpPr>
               <p:cNvPr id="20" name="Textfeld 19">
@@ -4207,6 +4440,7 @@
               </a:bodyPr>
               <a:lstStyle/>
               <a:p>
+                <a:pPr/>
                 <a14:m>
                   <m:oMathPara xmlns:m="http://schemas.openxmlformats.org/officeDocument/2006/math">
                     <m:oMathParaPr>
@@ -4299,7 +4533,7 @@
             </p:txBody>
           </p:sp>
         </mc:Choice>
-        <mc:Fallback>
+        <mc:Fallback xmlns="">
           <p:sp>
             <p:nvSpPr>
               <p:cNvPr id="20" name="Textfeld 19">
@@ -4364,8 +4598,8 @@
             <a:chExt cx="1629698" cy="2611184"/>
           </a:xfrm>
         </p:grpSpPr>
-        <mc:AlternateContent xmlns:mc="http://schemas.openxmlformats.org/markup-compatibility/2006">
-          <mc:Choice xmlns:a14="http://schemas.microsoft.com/office/drawing/2010/main" Requires="a14">
+        <mc:AlternateContent xmlns:mc="http://schemas.openxmlformats.org/markup-compatibility/2006" xmlns:a14="http://schemas.microsoft.com/office/drawing/2010/main">
+          <mc:Choice Requires="a14">
             <p:sp>
               <p:nvSpPr>
                 <p:cNvPr id="16" name="Textfeld 15">
@@ -4421,7 +4655,7 @@
               </p:txBody>
             </p:sp>
           </mc:Choice>
-          <mc:Fallback>
+          <mc:Fallback xmlns="">
             <p:sp>
               <p:nvSpPr>
                 <p:cNvPr id="16" name="Textfeld 15">
@@ -4520,8 +4754,8 @@
             </a:p>
           </p:txBody>
         </p:sp>
-        <mc:AlternateContent xmlns:mc="http://schemas.openxmlformats.org/markup-compatibility/2006">
-          <mc:Choice xmlns:a14="http://schemas.microsoft.com/office/drawing/2010/main" Requires="a14">
+        <mc:AlternateContent xmlns:mc="http://schemas.openxmlformats.org/markup-compatibility/2006" xmlns:a14="http://schemas.microsoft.com/office/drawing/2010/main">
+          <mc:Choice Requires="a14">
             <p:sp>
               <p:nvSpPr>
                 <p:cNvPr id="19" name="Textfeld 18">
@@ -4569,7 +4803,7 @@
               </p:txBody>
             </p:sp>
           </mc:Choice>
-          <mc:Fallback>
+          <mc:Fallback xmlns="">
             <p:sp>
               <p:nvSpPr>
                 <p:cNvPr id="19" name="Textfeld 18">
@@ -4614,8 +4848,8 @@
             </p:sp>
           </mc:Fallback>
         </mc:AlternateContent>
-        <mc:AlternateContent xmlns:mc="http://schemas.openxmlformats.org/markup-compatibility/2006">
-          <mc:Choice xmlns:a14="http://schemas.microsoft.com/office/drawing/2010/main" Requires="a14">
+        <mc:AlternateContent xmlns:mc="http://schemas.openxmlformats.org/markup-compatibility/2006" xmlns:a14="http://schemas.microsoft.com/office/drawing/2010/main">
+          <mc:Choice Requires="a14">
             <p:sp>
               <p:nvSpPr>
                 <p:cNvPr id="21" name="Textfeld 20">
@@ -4644,6 +4878,7 @@
                 </a:bodyPr>
                 <a:lstStyle/>
                 <a:p>
+                  <a:pPr/>
                   <a14:m>
                     <m:oMathPara xmlns:m="http://schemas.openxmlformats.org/officeDocument/2006/math">
                       <m:oMathParaPr>
@@ -4664,7 +4899,7 @@
               </p:txBody>
             </p:sp>
           </mc:Choice>
-          <mc:Fallback>
+          <mc:Fallback xmlns="">
             <p:sp>
               <p:nvSpPr>
                 <p:cNvPr id="21" name="Textfeld 20">
@@ -4709,8 +4944,8 @@
             </p:sp>
           </mc:Fallback>
         </mc:AlternateContent>
-        <mc:AlternateContent xmlns:mc="http://schemas.openxmlformats.org/markup-compatibility/2006">
-          <mc:Choice xmlns:a14="http://schemas.microsoft.com/office/drawing/2010/main" Requires="a14">
+        <mc:AlternateContent xmlns:mc="http://schemas.openxmlformats.org/markup-compatibility/2006" xmlns:a14="http://schemas.microsoft.com/office/drawing/2010/main">
+          <mc:Choice Requires="a14">
             <p:sp>
               <p:nvSpPr>
                 <p:cNvPr id="22" name="Textfeld 21">
@@ -4739,6 +4974,7 @@
                 </a:bodyPr>
                 <a:lstStyle/>
                 <a:p>
+                  <a:pPr/>
                   <a14:m>
                     <m:oMathPara xmlns:m="http://schemas.openxmlformats.org/officeDocument/2006/math">
                       <m:oMathParaPr>
@@ -4759,7 +4995,7 @@
               </p:txBody>
             </p:sp>
           </mc:Choice>
-          <mc:Fallback>
+          <mc:Fallback xmlns="">
             <p:sp>
               <p:nvSpPr>
                 <p:cNvPr id="22" name="Textfeld 21">
@@ -4805,8 +5041,8 @@
           </mc:Fallback>
         </mc:AlternateContent>
       </p:grpSp>
-      <mc:AlternateContent xmlns:mc="http://schemas.openxmlformats.org/markup-compatibility/2006">
-        <mc:Choice xmlns:a14="http://schemas.microsoft.com/office/drawing/2010/main" Requires="a14">
+      <mc:AlternateContent xmlns:mc="http://schemas.openxmlformats.org/markup-compatibility/2006" xmlns:a14="http://schemas.microsoft.com/office/drawing/2010/main">
+        <mc:Choice Requires="a14">
           <p:sp>
             <p:nvSpPr>
               <p:cNvPr id="24" name="Textfeld 23">
@@ -4835,6 +5071,7 @@
               </a:bodyPr>
               <a:lstStyle/>
               <a:p>
+                <a:pPr/>
                 <a14:m>
                   <m:oMathPara xmlns:m="http://schemas.openxmlformats.org/officeDocument/2006/math">
                     <m:oMathParaPr>
@@ -4927,7 +5164,7 @@
             </p:txBody>
           </p:sp>
         </mc:Choice>
-        <mc:Fallback>
+        <mc:Fallback xmlns="">
           <p:sp>
             <p:nvSpPr>
               <p:cNvPr id="24" name="Textfeld 23">
@@ -4972,8 +5209,8 @@
           </p:sp>
         </mc:Fallback>
       </mc:AlternateContent>
-      <mc:AlternateContent xmlns:mc="http://schemas.openxmlformats.org/markup-compatibility/2006">
-        <mc:Choice xmlns:a14="http://schemas.microsoft.com/office/drawing/2010/main" Requires="a14">
+      <mc:AlternateContent xmlns:mc="http://schemas.openxmlformats.org/markup-compatibility/2006" xmlns:a14="http://schemas.microsoft.com/office/drawing/2010/main">
+        <mc:Choice Requires="a14">
           <p:sp>
             <p:nvSpPr>
               <p:cNvPr id="25" name="Textfeld 24">
@@ -5172,7 +5409,7 @@
             </p:txBody>
           </p:sp>
         </mc:Choice>
-        <mc:Fallback>
+        <mc:Fallback xmlns="">
           <p:sp>
             <p:nvSpPr>
               <p:cNvPr id="25" name="Textfeld 24">
@@ -5217,8 +5454,8 @@
           </p:sp>
         </mc:Fallback>
       </mc:AlternateContent>
-      <mc:AlternateContent xmlns:mc="http://schemas.openxmlformats.org/markup-compatibility/2006">
-        <mc:Choice xmlns:a14="http://schemas.microsoft.com/office/drawing/2010/main" Requires="a14">
+      <mc:AlternateContent xmlns:mc="http://schemas.openxmlformats.org/markup-compatibility/2006" xmlns:a14="http://schemas.microsoft.com/office/drawing/2010/main">
+        <mc:Choice Requires="a14">
           <p:sp>
             <p:nvSpPr>
               <p:cNvPr id="26" name="Textfeld 25">
@@ -5428,7 +5665,7 @@
             </p:txBody>
           </p:sp>
         </mc:Choice>
-        <mc:Fallback>
+        <mc:Fallback xmlns="">
           <p:sp>
             <p:nvSpPr>
               <p:cNvPr id="26" name="Textfeld 25">
@@ -5473,8 +5710,8 @@
           </p:sp>
         </mc:Fallback>
       </mc:AlternateContent>
-      <mc:AlternateContent xmlns:mc="http://schemas.openxmlformats.org/markup-compatibility/2006">
-        <mc:Choice xmlns:a14="http://schemas.microsoft.com/office/drawing/2010/main" Requires="a14">
+      <mc:AlternateContent xmlns:mc="http://schemas.openxmlformats.org/markup-compatibility/2006" xmlns:a14="http://schemas.microsoft.com/office/drawing/2010/main">
+        <mc:Choice Requires="a14">
           <p:sp>
             <p:nvSpPr>
               <p:cNvPr id="27" name="Textfeld 26">
@@ -5553,7 +5790,7 @@
             </p:txBody>
           </p:sp>
         </mc:Choice>
-        <mc:Fallback>
+        <mc:Fallback xmlns="">
           <p:sp>
             <p:nvSpPr>
               <p:cNvPr id="27" name="Textfeld 26">
@@ -5598,8 +5835,8 @@
           </p:sp>
         </mc:Fallback>
       </mc:AlternateContent>
-      <mc:AlternateContent xmlns:mc="http://schemas.openxmlformats.org/markup-compatibility/2006">
-        <mc:Choice xmlns:a14="http://schemas.microsoft.com/office/drawing/2010/main" Requires="a14">
+      <mc:AlternateContent xmlns:mc="http://schemas.openxmlformats.org/markup-compatibility/2006" xmlns:a14="http://schemas.microsoft.com/office/drawing/2010/main">
+        <mc:Choice Requires="a14">
           <p:sp>
             <p:nvSpPr>
               <p:cNvPr id="28" name="Textfeld 27">
@@ -5684,7 +5921,7 @@
             </p:txBody>
           </p:sp>
         </mc:Choice>
-        <mc:Fallback>
+        <mc:Fallback xmlns="">
           <p:sp>
             <p:nvSpPr>
               <p:cNvPr id="28" name="Textfeld 27">
@@ -5729,8 +5966,8 @@
           </p:sp>
         </mc:Fallback>
       </mc:AlternateContent>
-      <mc:AlternateContent xmlns:mc="http://schemas.openxmlformats.org/markup-compatibility/2006">
-        <mc:Choice xmlns:a14="http://schemas.microsoft.com/office/drawing/2010/main" Requires="a14">
+      <mc:AlternateContent xmlns:mc="http://schemas.openxmlformats.org/markup-compatibility/2006" xmlns:a14="http://schemas.microsoft.com/office/drawing/2010/main">
+        <mc:Choice Requires="a14">
           <p:sp>
             <p:nvSpPr>
               <p:cNvPr id="32" name="Textfeld 31">
@@ -5821,7 +6058,7 @@
             </p:txBody>
           </p:sp>
         </mc:Choice>
-        <mc:Fallback>
+        <mc:Fallback xmlns="">
           <p:sp>
             <p:nvSpPr>
               <p:cNvPr id="32" name="Textfeld 31">
@@ -5879,7 +6116,7 @@
 </p:sld>
 </file>
 
-<file path=ppt/slides/slide2.xml><?xml version="1.0" encoding="utf-8"?>
+<file path=ppt/slides/slide3.xml><?xml version="1.0" encoding="utf-8"?>
 <p:sld xmlns:a="http://schemas.openxmlformats.org/drawingml/2006/main" xmlns:r="http://schemas.openxmlformats.org/officeDocument/2006/relationships" xmlns:p="http://schemas.openxmlformats.org/presentationml/2006/main">
   <p:cSld>
     <p:spTree>
@@ -7376,7 +7613,7 @@
 </p:sld>
 </file>
 
-<file path=ppt/slides/slide3.xml><?xml version="1.0" encoding="utf-8"?>
+<file path=ppt/slides/slide4.xml><?xml version="1.0" encoding="utf-8"?>
 <p:sld xmlns:a="http://schemas.openxmlformats.org/drawingml/2006/main" xmlns:r="http://schemas.openxmlformats.org/officeDocument/2006/relationships" xmlns:p="http://schemas.openxmlformats.org/presentationml/2006/main">
   <p:cSld>
     <p:spTree>
@@ -12195,7 +12432,7 @@
 </p:sld>
 </file>
 
-<file path=ppt/slides/slide4.xml><?xml version="1.0" encoding="utf-8"?>
+<file path=ppt/slides/slide5.xml><?xml version="1.0" encoding="utf-8"?>
 <p:sld xmlns:a="http://schemas.openxmlformats.org/drawingml/2006/main" xmlns:r="http://schemas.openxmlformats.org/officeDocument/2006/relationships" xmlns:p="http://schemas.openxmlformats.org/presentationml/2006/main">
   <p:cSld>
     <p:spTree>
@@ -16583,7 +16820,7 @@
 </p:sld>
 </file>
 
-<file path=ppt/slides/slide5.xml><?xml version="1.0" encoding="utf-8"?>
+<file path=ppt/slides/slide6.xml><?xml version="1.0" encoding="utf-8"?>
 <p:sld xmlns:a="http://schemas.openxmlformats.org/drawingml/2006/main" xmlns:r="http://schemas.openxmlformats.org/officeDocument/2006/relationships" xmlns:p="http://schemas.openxmlformats.org/presentationml/2006/main">
   <p:cSld>
     <p:spTree>
@@ -21173,7 +21410,7 @@
 </p:sld>
 </file>
 
-<file path=ppt/slides/slide6.xml><?xml version="1.0" encoding="utf-8"?>
+<file path=ppt/slides/slide7.xml><?xml version="1.0" encoding="utf-8"?>
 <p:sld xmlns:a="http://schemas.openxmlformats.org/drawingml/2006/main" xmlns:r="http://schemas.openxmlformats.org/officeDocument/2006/relationships" xmlns:p="http://schemas.openxmlformats.org/presentationml/2006/main">
   <p:cSld>
     <p:spTree>

</xml_diff>

<commit_message>
Minor fix plus example of what still goes wrong
</commit_message>
<xml_diff>
--- a/examples/UrbanTopologies.pptx
+++ b/examples/UrbanTopologies.pptx
@@ -3534,6 +3534,98 @@
           </a:fontRef>
         </p:style>
       </p:cxnSp>
+      <p:sp>
+        <p:nvSpPr>
+          <p:cNvPr id="2" name="Ellipse 1">
+            <a:extLst>
+              <a:ext uri="{FF2B5EF4-FFF2-40B4-BE49-F238E27FC236}">
+                <a16:creationId xmlns:a16="http://schemas.microsoft.com/office/drawing/2014/main" id="{3453D390-BEB9-3047-BB2A-4F6A2F673D86}"/>
+              </a:ext>
+            </a:extLst>
+          </p:cNvPr>
+          <p:cNvSpPr/>
+          <p:nvPr/>
+        </p:nvSpPr>
+        <p:spPr>
+          <a:xfrm>
+            <a:off x="6312877" y="1846384"/>
+            <a:ext cx="369278" cy="369278"/>
+          </a:xfrm>
+          <a:prstGeom prst="ellipse">
+            <a:avLst/>
+          </a:prstGeom>
+        </p:spPr>
+        <p:style>
+          <a:lnRef idx="2">
+            <a:schemeClr val="accent1">
+              <a:shade val="15000"/>
+            </a:schemeClr>
+          </a:lnRef>
+          <a:fillRef idx="1">
+            <a:schemeClr val="accent1"/>
+          </a:fillRef>
+          <a:effectRef idx="0">
+            <a:schemeClr val="accent1"/>
+          </a:effectRef>
+          <a:fontRef idx="minor">
+            <a:schemeClr val="lt1"/>
+          </a:fontRef>
+        </p:style>
+        <p:txBody>
+          <a:bodyPr rtlCol="0" anchor="ctr"/>
+          <a:lstStyle/>
+          <a:p>
+            <a:pPr algn="ctr"/>
+            <a:endParaRPr lang="de-DE"/>
+          </a:p>
+        </p:txBody>
+      </p:sp>
+      <p:sp>
+        <p:nvSpPr>
+          <p:cNvPr id="3" name="Ellipse 2">
+            <a:extLst>
+              <a:ext uri="{FF2B5EF4-FFF2-40B4-BE49-F238E27FC236}">
+                <a16:creationId xmlns:a16="http://schemas.microsoft.com/office/drawing/2014/main" id="{93CCBFC3-118E-7F83-1114-6DCF2238279D}"/>
+              </a:ext>
+            </a:extLst>
+          </p:cNvPr>
+          <p:cNvSpPr/>
+          <p:nvPr/>
+        </p:nvSpPr>
+        <p:spPr>
+          <a:xfrm>
+            <a:off x="6550271" y="3305907"/>
+            <a:ext cx="369278" cy="369278"/>
+          </a:xfrm>
+          <a:prstGeom prst="ellipse">
+            <a:avLst/>
+          </a:prstGeom>
+        </p:spPr>
+        <p:style>
+          <a:lnRef idx="2">
+            <a:schemeClr val="accent1">
+              <a:shade val="15000"/>
+            </a:schemeClr>
+          </a:lnRef>
+          <a:fillRef idx="1">
+            <a:schemeClr val="accent1"/>
+          </a:fillRef>
+          <a:effectRef idx="0">
+            <a:schemeClr val="accent1"/>
+          </a:effectRef>
+          <a:fontRef idx="minor">
+            <a:schemeClr val="lt1"/>
+          </a:fontRef>
+        </p:style>
+        <p:txBody>
+          <a:bodyPr rtlCol="0" anchor="ctr"/>
+          <a:lstStyle/>
+          <a:p>
+            <a:pPr algn="ctr"/>
+            <a:endParaRPr lang="de-DE"/>
+          </a:p>
+        </p:txBody>
+      </p:sp>
     </p:spTree>
     <p:extLst>
       <p:ext uri="{BB962C8B-B14F-4D97-AF65-F5344CB8AC3E}">

</xml_diff>

<commit_message>
roundabout with exact coordinates
</commit_message>
<xml_diff>
--- a/examples/UrbanTopologies.pptx
+++ b/examples/UrbanTopologies.pptx
@@ -5,13 +5,15 @@
     <p:sldMasterId id="2147483648" r:id="rId1"/>
   </p:sldMasterIdLst>
   <p:sldIdLst>
-    <p:sldId id="262" r:id="rId2"/>
-    <p:sldId id="261" r:id="rId3"/>
-    <p:sldId id="260" r:id="rId4"/>
-    <p:sldId id="256" r:id="rId5"/>
-    <p:sldId id="259" r:id="rId6"/>
-    <p:sldId id="257" r:id="rId7"/>
-    <p:sldId id="258" r:id="rId8"/>
+    <p:sldId id="264" r:id="rId2"/>
+    <p:sldId id="263" r:id="rId3"/>
+    <p:sldId id="262" r:id="rId4"/>
+    <p:sldId id="261" r:id="rId5"/>
+    <p:sldId id="260" r:id="rId6"/>
+    <p:sldId id="256" r:id="rId7"/>
+    <p:sldId id="259" r:id="rId8"/>
+    <p:sldId id="257" r:id="rId9"/>
+    <p:sldId id="258" r:id="rId10"/>
   </p:sldIdLst>
   <p:sldSz cx="12192000" cy="6858000"/>
   <p:notesSz cx="6858000" cy="9144000"/>
@@ -265,7 +267,7 @@
           <a:p>
             <a:fld id="{F3EB2857-2321-4C4D-8D06-77DF79DF910F}" type="datetimeFigureOut">
               <a:rPr lang="de-DE" smtClean="0"/>
-              <a:t>27.01.2025</a:t>
+              <a:t>28.01.2025</a:t>
             </a:fld>
             <a:endParaRPr lang="de-DE"/>
           </a:p>
@@ -463,7 +465,7 @@
           <a:p>
             <a:fld id="{F3EB2857-2321-4C4D-8D06-77DF79DF910F}" type="datetimeFigureOut">
               <a:rPr lang="de-DE" smtClean="0"/>
-              <a:t>27.01.2025</a:t>
+              <a:t>28.01.2025</a:t>
             </a:fld>
             <a:endParaRPr lang="de-DE"/>
           </a:p>
@@ -671,7 +673,7 @@
           <a:p>
             <a:fld id="{F3EB2857-2321-4C4D-8D06-77DF79DF910F}" type="datetimeFigureOut">
               <a:rPr lang="de-DE" smtClean="0"/>
-              <a:t>27.01.2025</a:t>
+              <a:t>28.01.2025</a:t>
             </a:fld>
             <a:endParaRPr lang="de-DE"/>
           </a:p>
@@ -869,7 +871,7 @@
           <a:p>
             <a:fld id="{F3EB2857-2321-4C4D-8D06-77DF79DF910F}" type="datetimeFigureOut">
               <a:rPr lang="de-DE" smtClean="0"/>
-              <a:t>27.01.2025</a:t>
+              <a:t>28.01.2025</a:t>
             </a:fld>
             <a:endParaRPr lang="de-DE"/>
           </a:p>
@@ -1144,7 +1146,7 @@
           <a:p>
             <a:fld id="{F3EB2857-2321-4C4D-8D06-77DF79DF910F}" type="datetimeFigureOut">
               <a:rPr lang="de-DE" smtClean="0"/>
-              <a:t>27.01.2025</a:t>
+              <a:t>28.01.2025</a:t>
             </a:fld>
             <a:endParaRPr lang="de-DE"/>
           </a:p>
@@ -1409,7 +1411,7 @@
           <a:p>
             <a:fld id="{F3EB2857-2321-4C4D-8D06-77DF79DF910F}" type="datetimeFigureOut">
               <a:rPr lang="de-DE" smtClean="0"/>
-              <a:t>27.01.2025</a:t>
+              <a:t>28.01.2025</a:t>
             </a:fld>
             <a:endParaRPr lang="de-DE"/>
           </a:p>
@@ -1821,7 +1823,7 @@
           <a:p>
             <a:fld id="{F3EB2857-2321-4C4D-8D06-77DF79DF910F}" type="datetimeFigureOut">
               <a:rPr lang="de-DE" smtClean="0"/>
-              <a:t>27.01.2025</a:t>
+              <a:t>28.01.2025</a:t>
             </a:fld>
             <a:endParaRPr lang="de-DE"/>
           </a:p>
@@ -1962,7 +1964,7 @@
           <a:p>
             <a:fld id="{F3EB2857-2321-4C4D-8D06-77DF79DF910F}" type="datetimeFigureOut">
               <a:rPr lang="de-DE" smtClean="0"/>
-              <a:t>27.01.2025</a:t>
+              <a:t>28.01.2025</a:t>
             </a:fld>
             <a:endParaRPr lang="de-DE"/>
           </a:p>
@@ -2075,7 +2077,7 @@
           <a:p>
             <a:fld id="{F3EB2857-2321-4C4D-8D06-77DF79DF910F}" type="datetimeFigureOut">
               <a:rPr lang="de-DE" smtClean="0"/>
-              <a:t>27.01.2025</a:t>
+              <a:t>28.01.2025</a:t>
             </a:fld>
             <a:endParaRPr lang="de-DE"/>
           </a:p>
@@ -2386,7 +2388,7 @@
           <a:p>
             <a:fld id="{F3EB2857-2321-4C4D-8D06-77DF79DF910F}" type="datetimeFigureOut">
               <a:rPr lang="de-DE" smtClean="0"/>
-              <a:t>27.01.2025</a:t>
+              <a:t>28.01.2025</a:t>
             </a:fld>
             <a:endParaRPr lang="de-DE"/>
           </a:p>
@@ -2674,7 +2676,7 @@
           <a:p>
             <a:fld id="{F3EB2857-2321-4C4D-8D06-77DF79DF910F}" type="datetimeFigureOut">
               <a:rPr lang="de-DE" smtClean="0"/>
-              <a:t>27.01.2025</a:t>
+              <a:t>28.01.2025</a:t>
             </a:fld>
             <a:endParaRPr lang="de-DE"/>
           </a:p>
@@ -2915,7 +2917,7 @@
           <a:p>
             <a:fld id="{F3EB2857-2321-4C4D-8D06-77DF79DF910F}" type="datetimeFigureOut">
               <a:rPr lang="de-DE" smtClean="0"/>
-              <a:t>27.01.2025</a:t>
+              <a:t>28.01.2025</a:t>
             </a:fld>
             <a:endParaRPr lang="de-DE"/>
           </a:p>
@@ -3337,6 +3339,980 @@
           <p:cNvPr id="5" name="Grafik 4">
             <a:extLst>
               <a:ext uri="{FF2B5EF4-FFF2-40B4-BE49-F238E27FC236}">
+                <a16:creationId xmlns:a16="http://schemas.microsoft.com/office/drawing/2014/main" id="{0ED11B5D-616D-3CC9-EC3B-C7BFEAE9FFBF}"/>
+              </a:ext>
+            </a:extLst>
+          </p:cNvPr>
+          <p:cNvPicPr>
+            <a:picLocks noChangeAspect="1"/>
+          </p:cNvPicPr>
+          <p:nvPr/>
+        </p:nvPicPr>
+        <p:blipFill>
+          <a:blip r:embed="rId2"/>
+          <a:srcRect l="54534"/>
+          <a:stretch/>
+        </p:blipFill>
+        <p:spPr>
+          <a:xfrm>
+            <a:off x="4030495" y="325569"/>
+            <a:ext cx="3348918" cy="6031763"/>
+          </a:xfrm>
+          <a:prstGeom prst="rect">
+            <a:avLst/>
+          </a:prstGeom>
+        </p:spPr>
+      </p:pic>
+      <p:cxnSp>
+        <p:nvCxnSpPr>
+          <p:cNvPr id="7" name="Gerader Verbinder 6">
+            <a:extLst>
+              <a:ext uri="{FF2B5EF4-FFF2-40B4-BE49-F238E27FC236}">
+                <a16:creationId xmlns:a16="http://schemas.microsoft.com/office/drawing/2014/main" id="{9CB51137-CBD1-034F-3D1C-08C60ECDABFD}"/>
+              </a:ext>
+            </a:extLst>
+          </p:cNvPr>
+          <p:cNvCxnSpPr>
+            <a:cxnSpLocks/>
+          </p:cNvCxnSpPr>
+          <p:nvPr/>
+        </p:nvCxnSpPr>
+        <p:spPr>
+          <a:xfrm flipH="1" flipV="1">
+            <a:off x="4643338" y="0"/>
+            <a:ext cx="2266544" cy="3891064"/>
+          </a:xfrm>
+          <a:prstGeom prst="line">
+            <a:avLst/>
+          </a:prstGeom>
+        </p:spPr>
+        <p:style>
+          <a:lnRef idx="1">
+            <a:schemeClr val="accent1"/>
+          </a:lnRef>
+          <a:fillRef idx="0">
+            <a:schemeClr val="accent1"/>
+          </a:fillRef>
+          <a:effectRef idx="0">
+            <a:schemeClr val="accent1"/>
+          </a:effectRef>
+          <a:fontRef idx="minor">
+            <a:schemeClr val="tx1"/>
+          </a:fontRef>
+        </p:style>
+      </p:cxnSp>
+      <p:cxnSp>
+        <p:nvCxnSpPr>
+          <p:cNvPr id="10" name="Gerader Verbinder 9">
+            <a:extLst>
+              <a:ext uri="{FF2B5EF4-FFF2-40B4-BE49-F238E27FC236}">
+                <a16:creationId xmlns:a16="http://schemas.microsoft.com/office/drawing/2014/main" id="{78ADA1E2-A5FD-6E19-DDFF-B44C2922A72D}"/>
+              </a:ext>
+            </a:extLst>
+          </p:cNvPr>
+          <p:cNvCxnSpPr>
+            <a:cxnSpLocks/>
+          </p:cNvCxnSpPr>
+          <p:nvPr/>
+        </p:nvCxnSpPr>
+        <p:spPr>
+          <a:xfrm>
+            <a:off x="1939048" y="778213"/>
+            <a:ext cx="4630366" cy="0"/>
+          </a:xfrm>
+          <a:prstGeom prst="line">
+            <a:avLst/>
+          </a:prstGeom>
+        </p:spPr>
+        <p:style>
+          <a:lnRef idx="1">
+            <a:schemeClr val="accent1"/>
+          </a:lnRef>
+          <a:fillRef idx="0">
+            <a:schemeClr val="accent1"/>
+          </a:fillRef>
+          <a:effectRef idx="0">
+            <a:schemeClr val="accent1"/>
+          </a:effectRef>
+          <a:fontRef idx="minor">
+            <a:schemeClr val="tx1"/>
+          </a:fontRef>
+        </p:style>
+      </p:cxnSp>
+      <p:pic>
+        <p:nvPicPr>
+          <p:cNvPr id="13" name="Grafik 12">
+            <a:extLst>
+              <a:ext uri="{FF2B5EF4-FFF2-40B4-BE49-F238E27FC236}">
+                <a16:creationId xmlns:a16="http://schemas.microsoft.com/office/drawing/2014/main" id="{1CFD45C3-2C79-4412-9195-365734E764FD}"/>
+              </a:ext>
+            </a:extLst>
+          </p:cNvPr>
+          <p:cNvPicPr>
+            <a:picLocks noChangeAspect="1"/>
+          </p:cNvPicPr>
+          <p:nvPr/>
+        </p:nvPicPr>
+        <p:blipFill>
+          <a:blip r:embed="rId3"/>
+          <a:srcRect l="58538"/>
+          <a:stretch/>
+        </p:blipFill>
+        <p:spPr>
+          <a:xfrm>
+            <a:off x="398837" y="247748"/>
+            <a:ext cx="3129062" cy="6155638"/>
+          </a:xfrm>
+          <a:prstGeom prst="rect">
+            <a:avLst/>
+          </a:prstGeom>
+        </p:spPr>
+      </p:pic>
+      <p:cxnSp>
+        <p:nvCxnSpPr>
+          <p:cNvPr id="14" name="Gerader Verbinder 13">
+            <a:extLst>
+              <a:ext uri="{FF2B5EF4-FFF2-40B4-BE49-F238E27FC236}">
+                <a16:creationId xmlns:a16="http://schemas.microsoft.com/office/drawing/2014/main" id="{A2059AAC-3286-4896-B804-B88EF0998B37}"/>
+              </a:ext>
+            </a:extLst>
+          </p:cNvPr>
+          <p:cNvCxnSpPr>
+            <a:cxnSpLocks/>
+          </p:cNvCxnSpPr>
+          <p:nvPr/>
+        </p:nvCxnSpPr>
+        <p:spPr>
+          <a:xfrm flipH="1" flipV="1">
+            <a:off x="901433" y="0"/>
+            <a:ext cx="2266544" cy="3891064"/>
+          </a:xfrm>
+          <a:prstGeom prst="line">
+            <a:avLst/>
+          </a:prstGeom>
+        </p:spPr>
+        <p:style>
+          <a:lnRef idx="1">
+            <a:schemeClr val="accent1"/>
+          </a:lnRef>
+          <a:fillRef idx="0">
+            <a:schemeClr val="accent1"/>
+          </a:fillRef>
+          <a:effectRef idx="0">
+            <a:schemeClr val="accent1"/>
+          </a:effectRef>
+          <a:fontRef idx="minor">
+            <a:schemeClr val="tx1"/>
+          </a:fontRef>
+        </p:style>
+      </p:cxnSp>
+      <p:cxnSp>
+        <p:nvCxnSpPr>
+          <p:cNvPr id="15" name="Gerader Verbinder 14">
+            <a:extLst>
+              <a:ext uri="{FF2B5EF4-FFF2-40B4-BE49-F238E27FC236}">
+                <a16:creationId xmlns:a16="http://schemas.microsoft.com/office/drawing/2014/main" id="{6B29684E-992E-258F-F56B-5C08775B0F88}"/>
+              </a:ext>
+            </a:extLst>
+          </p:cNvPr>
+          <p:cNvCxnSpPr>
+            <a:cxnSpLocks/>
+          </p:cNvCxnSpPr>
+          <p:nvPr/>
+        </p:nvCxnSpPr>
+        <p:spPr>
+          <a:xfrm>
+            <a:off x="-1802857" y="778213"/>
+            <a:ext cx="4630366" cy="0"/>
+          </a:xfrm>
+          <a:prstGeom prst="line">
+            <a:avLst/>
+          </a:prstGeom>
+        </p:spPr>
+        <p:style>
+          <a:lnRef idx="1">
+            <a:schemeClr val="accent1"/>
+          </a:lnRef>
+          <a:fillRef idx="0">
+            <a:schemeClr val="accent1"/>
+          </a:fillRef>
+          <a:effectRef idx="0">
+            <a:schemeClr val="accent1"/>
+          </a:effectRef>
+          <a:fontRef idx="minor">
+            <a:schemeClr val="tx1"/>
+          </a:fontRef>
+        </p:style>
+      </p:cxnSp>
+      <p:pic>
+        <p:nvPicPr>
+          <p:cNvPr id="17" name="Grafik 16">
+            <a:extLst>
+              <a:ext uri="{FF2B5EF4-FFF2-40B4-BE49-F238E27FC236}">
+                <a16:creationId xmlns:a16="http://schemas.microsoft.com/office/drawing/2014/main" id="{E59068C7-C91A-5F66-19E8-D915BE9917B2}"/>
+              </a:ext>
+            </a:extLst>
+          </p:cNvPr>
+          <p:cNvPicPr>
+            <a:picLocks noChangeAspect="1"/>
+          </p:cNvPicPr>
+          <p:nvPr/>
+        </p:nvPicPr>
+        <p:blipFill>
+          <a:blip r:embed="rId4"/>
+          <a:srcRect l="43057"/>
+          <a:stretch/>
+        </p:blipFill>
+        <p:spPr>
+          <a:xfrm>
+            <a:off x="7782128" y="325569"/>
+            <a:ext cx="4254006" cy="6012705"/>
+          </a:xfrm>
+          <a:prstGeom prst="rect">
+            <a:avLst/>
+          </a:prstGeom>
+        </p:spPr>
+      </p:pic>
+      <p:cxnSp>
+        <p:nvCxnSpPr>
+          <p:cNvPr id="18" name="Gerader Verbinder 17">
+            <a:extLst>
+              <a:ext uri="{FF2B5EF4-FFF2-40B4-BE49-F238E27FC236}">
+                <a16:creationId xmlns:a16="http://schemas.microsoft.com/office/drawing/2014/main" id="{BF28690B-2B54-FE96-075C-848EAFA0F282}"/>
+              </a:ext>
+            </a:extLst>
+          </p:cNvPr>
+          <p:cNvCxnSpPr>
+            <a:cxnSpLocks/>
+          </p:cNvCxnSpPr>
+          <p:nvPr/>
+        </p:nvCxnSpPr>
+        <p:spPr>
+          <a:xfrm flipH="1" flipV="1">
+            <a:off x="9516895" y="0"/>
+            <a:ext cx="2266544" cy="3891064"/>
+          </a:xfrm>
+          <a:prstGeom prst="line">
+            <a:avLst/>
+          </a:prstGeom>
+        </p:spPr>
+        <p:style>
+          <a:lnRef idx="1">
+            <a:schemeClr val="accent1"/>
+          </a:lnRef>
+          <a:fillRef idx="0">
+            <a:schemeClr val="accent1"/>
+          </a:fillRef>
+          <a:effectRef idx="0">
+            <a:schemeClr val="accent1"/>
+          </a:effectRef>
+          <a:fontRef idx="minor">
+            <a:schemeClr val="tx1"/>
+          </a:fontRef>
+        </p:style>
+      </p:cxnSp>
+      <p:cxnSp>
+        <p:nvCxnSpPr>
+          <p:cNvPr id="19" name="Gerader Verbinder 18">
+            <a:extLst>
+              <a:ext uri="{FF2B5EF4-FFF2-40B4-BE49-F238E27FC236}">
+                <a16:creationId xmlns:a16="http://schemas.microsoft.com/office/drawing/2014/main" id="{3F0D123C-8560-BEE2-218F-94B00F11FDD0}"/>
+              </a:ext>
+            </a:extLst>
+          </p:cNvPr>
+          <p:cNvCxnSpPr>
+            <a:cxnSpLocks/>
+          </p:cNvCxnSpPr>
+          <p:nvPr/>
+        </p:nvCxnSpPr>
+        <p:spPr>
+          <a:xfrm>
+            <a:off x="6812605" y="778213"/>
+            <a:ext cx="4630366" cy="0"/>
+          </a:xfrm>
+          <a:prstGeom prst="line">
+            <a:avLst/>
+          </a:prstGeom>
+        </p:spPr>
+        <p:style>
+          <a:lnRef idx="1">
+            <a:schemeClr val="accent1"/>
+          </a:lnRef>
+          <a:fillRef idx="0">
+            <a:schemeClr val="accent1"/>
+          </a:fillRef>
+          <a:effectRef idx="0">
+            <a:schemeClr val="accent1"/>
+          </a:effectRef>
+          <a:fontRef idx="minor">
+            <a:schemeClr val="tx1"/>
+          </a:fontRef>
+        </p:style>
+      </p:cxnSp>
+      <p:sp>
+        <p:nvSpPr>
+          <p:cNvPr id="20" name="Textfeld 19">
+            <a:extLst>
+              <a:ext uri="{FF2B5EF4-FFF2-40B4-BE49-F238E27FC236}">
+                <a16:creationId xmlns:a16="http://schemas.microsoft.com/office/drawing/2014/main" id="{6602866F-D8CE-91C9-2E00-DF09ADBF9B2F}"/>
+              </a:ext>
+            </a:extLst>
+          </p:cNvPr>
+          <p:cNvSpPr txBox="1"/>
+          <p:nvPr/>
+        </p:nvSpPr>
+        <p:spPr>
+          <a:xfrm>
+            <a:off x="700391" y="2772383"/>
+            <a:ext cx="742511" cy="369332"/>
+          </a:xfrm>
+          <a:prstGeom prst="rect">
+            <a:avLst/>
+          </a:prstGeom>
+          <a:noFill/>
+        </p:spPr>
+        <p:txBody>
+          <a:bodyPr wrap="none" rtlCol="0">
+            <a:spAutoFit/>
+          </a:bodyPr>
+          <a:lstStyle/>
+          <a:p>
+            <a:r>
+              <a:rPr lang="de-DE" dirty="0">
+                <a:solidFill>
+                  <a:srgbClr val="FF0000"/>
+                </a:solidFill>
+              </a:rPr>
+              <a:t>10/10</a:t>
+            </a:r>
+          </a:p>
+        </p:txBody>
+      </p:sp>
+      <p:sp>
+        <p:nvSpPr>
+          <p:cNvPr id="21" name="Textfeld 20">
+            <a:extLst>
+              <a:ext uri="{FF2B5EF4-FFF2-40B4-BE49-F238E27FC236}">
+                <a16:creationId xmlns:a16="http://schemas.microsoft.com/office/drawing/2014/main" id="{6766F5E4-B6DE-CB03-5C72-9772B3684BBE}"/>
+              </a:ext>
+            </a:extLst>
+          </p:cNvPr>
+          <p:cNvSpPr txBox="1"/>
+          <p:nvPr/>
+        </p:nvSpPr>
+        <p:spPr>
+          <a:xfrm>
+            <a:off x="4520155" y="2772383"/>
+            <a:ext cx="800219" cy="369332"/>
+          </a:xfrm>
+          <a:prstGeom prst="rect">
+            <a:avLst/>
+          </a:prstGeom>
+          <a:noFill/>
+        </p:spPr>
+        <p:txBody>
+          <a:bodyPr wrap="none" rtlCol="0">
+            <a:spAutoFit/>
+          </a:bodyPr>
+          <a:lstStyle/>
+          <a:p>
+            <a:r>
+              <a:rPr lang="de-DE" dirty="0">
+                <a:solidFill>
+                  <a:srgbClr val="FF0000"/>
+                </a:solidFill>
+              </a:rPr>
+              <a:t>10/7.5</a:t>
+            </a:r>
+          </a:p>
+        </p:txBody>
+      </p:sp>
+      <p:sp>
+        <p:nvSpPr>
+          <p:cNvPr id="22" name="Textfeld 21">
+            <a:extLst>
+              <a:ext uri="{FF2B5EF4-FFF2-40B4-BE49-F238E27FC236}">
+                <a16:creationId xmlns:a16="http://schemas.microsoft.com/office/drawing/2014/main" id="{D6FE315A-6BED-5094-0A0A-6CC9B3DFCCFB}"/>
+              </a:ext>
+            </a:extLst>
+          </p:cNvPr>
+          <p:cNvSpPr txBox="1"/>
+          <p:nvPr/>
+        </p:nvSpPr>
+        <p:spPr>
+          <a:xfrm>
+            <a:off x="8026312" y="2772383"/>
+            <a:ext cx="625492" cy="369332"/>
+          </a:xfrm>
+          <a:prstGeom prst="rect">
+            <a:avLst/>
+          </a:prstGeom>
+          <a:noFill/>
+        </p:spPr>
+        <p:txBody>
+          <a:bodyPr wrap="none" rtlCol="0">
+            <a:spAutoFit/>
+          </a:bodyPr>
+          <a:lstStyle/>
+          <a:p>
+            <a:r>
+              <a:rPr lang="de-DE" dirty="0">
+                <a:solidFill>
+                  <a:srgbClr val="FF0000"/>
+                </a:solidFill>
+              </a:rPr>
+              <a:t>10/5</a:t>
+            </a:r>
+          </a:p>
+        </p:txBody>
+      </p:sp>
+    </p:spTree>
+    <p:extLst>
+      <p:ext uri="{BB962C8B-B14F-4D97-AF65-F5344CB8AC3E}">
+        <p14:creationId xmlns:p14="http://schemas.microsoft.com/office/powerpoint/2010/main" val="2381410804"/>
+      </p:ext>
+    </p:extLst>
+  </p:cSld>
+  <p:clrMapOvr>
+    <a:masterClrMapping/>
+  </p:clrMapOvr>
+</p:sld>
+</file>
+
+<file path=ppt/slides/slide2.xml><?xml version="1.0" encoding="utf-8"?>
+<p:sld xmlns:a="http://schemas.openxmlformats.org/drawingml/2006/main" xmlns:r="http://schemas.openxmlformats.org/officeDocument/2006/relationships" xmlns:p="http://schemas.openxmlformats.org/presentationml/2006/main">
+  <p:cSld>
+    <p:spTree>
+      <p:nvGrpSpPr>
+        <p:cNvPr id="1" name=""/>
+        <p:cNvGrpSpPr/>
+        <p:nvPr/>
+      </p:nvGrpSpPr>
+      <p:grpSpPr>
+        <a:xfrm>
+          <a:off x="0" y="0"/>
+          <a:ext cx="0" cy="0"/>
+          <a:chOff x="0" y="0"/>
+          <a:chExt cx="0" cy="0"/>
+        </a:xfrm>
+      </p:grpSpPr>
+      <p:pic>
+        <p:nvPicPr>
+          <p:cNvPr id="15" name="Grafik 14">
+            <a:extLst>
+              <a:ext uri="{FF2B5EF4-FFF2-40B4-BE49-F238E27FC236}">
+                <a16:creationId xmlns:a16="http://schemas.microsoft.com/office/drawing/2014/main" id="{585FE4F4-1AF1-A74E-8F2C-D592B442EB19}"/>
+              </a:ext>
+            </a:extLst>
+          </p:cNvPr>
+          <p:cNvPicPr>
+            <a:picLocks noChangeAspect="1"/>
+          </p:cNvPicPr>
+          <p:nvPr/>
+        </p:nvPicPr>
+        <p:blipFill>
+          <a:blip r:embed="rId2"/>
+          <a:srcRect l="41830" t="27435" r="4024" b="30121"/>
+          <a:stretch/>
+        </p:blipFill>
+        <p:spPr>
+          <a:xfrm>
+            <a:off x="4738687" y="3333750"/>
+            <a:ext cx="2714626" cy="752473"/>
+          </a:xfrm>
+          <a:prstGeom prst="rect">
+            <a:avLst/>
+          </a:prstGeom>
+        </p:spPr>
+      </p:pic>
+      <p:pic>
+        <p:nvPicPr>
+          <p:cNvPr id="5" name="Grafik 4">
+            <a:extLst>
+              <a:ext uri="{FF2B5EF4-FFF2-40B4-BE49-F238E27FC236}">
+                <a16:creationId xmlns:a16="http://schemas.microsoft.com/office/drawing/2014/main" id="{0DA6F576-00C5-D6E1-8965-C90871BA7266}"/>
+              </a:ext>
+            </a:extLst>
+          </p:cNvPr>
+          <p:cNvPicPr>
+            <a:picLocks noChangeAspect="1"/>
+          </p:cNvPicPr>
+          <p:nvPr/>
+        </p:nvPicPr>
+        <p:blipFill>
+          <a:blip r:embed="rId2"/>
+          <a:srcRect l="6493" t="48120" r="52660" b="9166"/>
+          <a:stretch/>
+        </p:blipFill>
+        <p:spPr>
+          <a:xfrm>
+            <a:off x="4738686" y="2581036"/>
+            <a:ext cx="2047876" cy="757237"/>
+          </a:xfrm>
+          <a:prstGeom prst="rect">
+            <a:avLst/>
+          </a:prstGeom>
+        </p:spPr>
+      </p:pic>
+      <p:cxnSp>
+        <p:nvCxnSpPr>
+          <p:cNvPr id="7" name="Gerader Verbinder 6">
+            <a:extLst>
+              <a:ext uri="{FF2B5EF4-FFF2-40B4-BE49-F238E27FC236}">
+                <a16:creationId xmlns:a16="http://schemas.microsoft.com/office/drawing/2014/main" id="{5BE0849D-8426-607A-B9B0-572129086F6D}"/>
+              </a:ext>
+            </a:extLst>
+          </p:cNvPr>
+          <p:cNvCxnSpPr>
+            <a:cxnSpLocks/>
+          </p:cNvCxnSpPr>
+          <p:nvPr/>
+        </p:nvCxnSpPr>
+        <p:spPr>
+          <a:xfrm>
+            <a:off x="4738688" y="3331370"/>
+            <a:ext cx="0" cy="759619"/>
+          </a:xfrm>
+          <a:prstGeom prst="line">
+            <a:avLst/>
+          </a:prstGeom>
+          <a:ln w="28575"/>
+        </p:spPr>
+        <p:style>
+          <a:lnRef idx="2">
+            <a:schemeClr val="accent1"/>
+          </a:lnRef>
+          <a:fillRef idx="0">
+            <a:schemeClr val="accent1"/>
+          </a:fillRef>
+          <a:effectRef idx="1">
+            <a:schemeClr val="accent1"/>
+          </a:effectRef>
+          <a:fontRef idx="minor">
+            <a:schemeClr val="tx1"/>
+          </a:fontRef>
+        </p:style>
+      </p:cxnSp>
+      <p:cxnSp>
+        <p:nvCxnSpPr>
+          <p:cNvPr id="12" name="Gerader Verbinder 11">
+            <a:extLst>
+              <a:ext uri="{FF2B5EF4-FFF2-40B4-BE49-F238E27FC236}">
+                <a16:creationId xmlns:a16="http://schemas.microsoft.com/office/drawing/2014/main" id="{0A191308-1CEA-B274-E991-12D25A64FC6C}"/>
+              </a:ext>
+            </a:extLst>
+          </p:cNvPr>
+          <p:cNvCxnSpPr>
+            <a:cxnSpLocks/>
+          </p:cNvCxnSpPr>
+          <p:nvPr/>
+        </p:nvCxnSpPr>
+        <p:spPr>
+          <a:xfrm>
+            <a:off x="4738688" y="3339863"/>
+            <a:ext cx="2047875" cy="0"/>
+          </a:xfrm>
+          <a:prstGeom prst="line">
+            <a:avLst/>
+          </a:prstGeom>
+          <a:ln w="28575">
+            <a:solidFill>
+              <a:srgbClr val="C00000"/>
+            </a:solidFill>
+          </a:ln>
+        </p:spPr>
+        <p:style>
+          <a:lnRef idx="2">
+            <a:schemeClr val="accent1"/>
+          </a:lnRef>
+          <a:fillRef idx="0">
+            <a:schemeClr val="accent1"/>
+          </a:fillRef>
+          <a:effectRef idx="1">
+            <a:schemeClr val="accent1"/>
+          </a:effectRef>
+          <a:fontRef idx="minor">
+            <a:schemeClr val="tx1"/>
+          </a:fontRef>
+        </p:style>
+      </p:cxnSp>
+      <p:cxnSp>
+        <p:nvCxnSpPr>
+          <p:cNvPr id="14" name="Gerader Verbinder 13">
+            <a:extLst>
+              <a:ext uri="{FF2B5EF4-FFF2-40B4-BE49-F238E27FC236}">
+                <a16:creationId xmlns:a16="http://schemas.microsoft.com/office/drawing/2014/main" id="{6D852304-45E0-B660-1225-8637C882656D}"/>
+              </a:ext>
+            </a:extLst>
+          </p:cNvPr>
+          <p:cNvCxnSpPr>
+            <a:cxnSpLocks/>
+          </p:cNvCxnSpPr>
+          <p:nvPr/>
+        </p:nvCxnSpPr>
+        <p:spPr>
+          <a:xfrm>
+            <a:off x="4738687" y="4135438"/>
+            <a:ext cx="2732400" cy="0"/>
+          </a:xfrm>
+          <a:prstGeom prst="line">
+            <a:avLst/>
+          </a:prstGeom>
+          <a:ln w="28575"/>
+        </p:spPr>
+        <p:style>
+          <a:lnRef idx="2">
+            <a:schemeClr val="accent1"/>
+          </a:lnRef>
+          <a:fillRef idx="0">
+            <a:schemeClr val="accent1"/>
+          </a:fillRef>
+          <a:effectRef idx="1">
+            <a:schemeClr val="accent1"/>
+          </a:effectRef>
+          <a:fontRef idx="minor">
+            <a:schemeClr val="tx1"/>
+          </a:fontRef>
+        </p:style>
+      </p:cxnSp>
+      <p:sp>
+        <p:nvSpPr>
+          <p:cNvPr id="2" name="Textfeld 1">
+            <a:extLst>
+              <a:ext uri="{FF2B5EF4-FFF2-40B4-BE49-F238E27FC236}">
+                <a16:creationId xmlns:a16="http://schemas.microsoft.com/office/drawing/2014/main" id="{7BD4530C-21F6-E16C-57BD-88CEF7C25B8B}"/>
+              </a:ext>
+            </a:extLst>
+          </p:cNvPr>
+          <p:cNvSpPr txBox="1"/>
+          <p:nvPr/>
+        </p:nvSpPr>
+        <p:spPr>
+          <a:xfrm>
+            <a:off x="5508389" y="2993549"/>
+            <a:ext cx="508473" cy="369332"/>
+          </a:xfrm>
+          <a:prstGeom prst="rect">
+            <a:avLst/>
+          </a:prstGeom>
+          <a:noFill/>
+        </p:spPr>
+        <p:txBody>
+          <a:bodyPr wrap="none" rtlCol="0">
+            <a:spAutoFit/>
+          </a:bodyPr>
+          <a:lstStyle/>
+          <a:p>
+            <a:r>
+              <a:rPr lang="de-DE" dirty="0">
+                <a:solidFill>
+                  <a:srgbClr val="C00000"/>
+                </a:solidFill>
+              </a:rPr>
+              <a:t>3/3</a:t>
+            </a:r>
+          </a:p>
+        </p:txBody>
+      </p:sp>
+      <p:sp>
+        <p:nvSpPr>
+          <p:cNvPr id="3" name="Textfeld 2">
+            <a:extLst>
+              <a:ext uri="{FF2B5EF4-FFF2-40B4-BE49-F238E27FC236}">
+                <a16:creationId xmlns:a16="http://schemas.microsoft.com/office/drawing/2014/main" id="{1D7D42B0-E410-69F1-DFBA-444A48FB69FF}"/>
+              </a:ext>
+            </a:extLst>
+          </p:cNvPr>
+          <p:cNvSpPr txBox="1"/>
+          <p:nvPr/>
+        </p:nvSpPr>
+        <p:spPr>
+          <a:xfrm>
+            <a:off x="5850650" y="4155359"/>
+            <a:ext cx="508473" cy="369332"/>
+          </a:xfrm>
+          <a:prstGeom prst="rect">
+            <a:avLst/>
+          </a:prstGeom>
+          <a:noFill/>
+        </p:spPr>
+        <p:txBody>
+          <a:bodyPr wrap="none" rtlCol="0">
+            <a:spAutoFit/>
+          </a:bodyPr>
+          <a:lstStyle/>
+          <a:p>
+            <a:r>
+              <a:rPr lang="de-DE" dirty="0">
+                <a:solidFill>
+                  <a:srgbClr val="0070C0"/>
+                </a:solidFill>
+              </a:rPr>
+              <a:t>4/3</a:t>
+            </a:r>
+          </a:p>
+        </p:txBody>
+      </p:sp>
+      <p:cxnSp>
+        <p:nvCxnSpPr>
+          <p:cNvPr id="4" name="Gerader Verbinder 3">
+            <a:extLst>
+              <a:ext uri="{FF2B5EF4-FFF2-40B4-BE49-F238E27FC236}">
+                <a16:creationId xmlns:a16="http://schemas.microsoft.com/office/drawing/2014/main" id="{5238D835-9C80-41EE-12B3-6D2D888DC572}"/>
+              </a:ext>
+            </a:extLst>
+          </p:cNvPr>
+          <p:cNvCxnSpPr>
+            <a:cxnSpLocks/>
+          </p:cNvCxnSpPr>
+          <p:nvPr/>
+        </p:nvCxnSpPr>
+        <p:spPr>
+          <a:xfrm>
+            <a:off x="4738686" y="2574131"/>
+            <a:ext cx="0" cy="759619"/>
+          </a:xfrm>
+          <a:prstGeom prst="line">
+            <a:avLst/>
+          </a:prstGeom>
+          <a:ln w="28575">
+            <a:solidFill>
+              <a:srgbClr val="C00000"/>
+            </a:solidFill>
+          </a:ln>
+        </p:spPr>
+        <p:style>
+          <a:lnRef idx="2">
+            <a:schemeClr val="accent1"/>
+          </a:lnRef>
+          <a:fillRef idx="0">
+            <a:schemeClr val="accent1"/>
+          </a:fillRef>
+          <a:effectRef idx="1">
+            <a:schemeClr val="accent1"/>
+          </a:effectRef>
+          <a:fontRef idx="minor">
+            <a:schemeClr val="tx1"/>
+          </a:fontRef>
+        </p:style>
+      </p:cxnSp>
+      <p:sp>
+        <p:nvSpPr>
+          <p:cNvPr id="6" name="Textfeld 5">
+            <a:extLst>
+              <a:ext uri="{FF2B5EF4-FFF2-40B4-BE49-F238E27FC236}">
+                <a16:creationId xmlns:a16="http://schemas.microsoft.com/office/drawing/2014/main" id="{B2C690E5-BD88-90E8-7733-E1103B17B661}"/>
+              </a:ext>
+            </a:extLst>
+          </p:cNvPr>
+          <p:cNvSpPr txBox="1"/>
+          <p:nvPr/>
+        </p:nvSpPr>
+        <p:spPr>
+          <a:xfrm>
+            <a:off x="4099599" y="2773920"/>
+            <a:ext cx="508473" cy="369332"/>
+          </a:xfrm>
+          <a:prstGeom prst="rect">
+            <a:avLst/>
+          </a:prstGeom>
+          <a:noFill/>
+        </p:spPr>
+        <p:txBody>
+          <a:bodyPr wrap="none" rtlCol="0">
+            <a:spAutoFit/>
+          </a:bodyPr>
+          <a:lstStyle/>
+          <a:p>
+            <a:r>
+              <a:rPr lang="de-DE" dirty="0">
+                <a:solidFill>
+                  <a:srgbClr val="C00000"/>
+                </a:solidFill>
+              </a:rPr>
+              <a:t>1/1</a:t>
+            </a:r>
+          </a:p>
+        </p:txBody>
+      </p:sp>
+      <p:sp>
+        <p:nvSpPr>
+          <p:cNvPr id="8" name="Textfeld 7">
+            <a:extLst>
+              <a:ext uri="{FF2B5EF4-FFF2-40B4-BE49-F238E27FC236}">
+                <a16:creationId xmlns:a16="http://schemas.microsoft.com/office/drawing/2014/main" id="{99405F13-2801-84D6-339F-1860CA52B329}"/>
+              </a:ext>
+            </a:extLst>
+          </p:cNvPr>
+          <p:cNvSpPr txBox="1"/>
+          <p:nvPr/>
+        </p:nvSpPr>
+        <p:spPr>
+          <a:xfrm>
+            <a:off x="4099599" y="3525320"/>
+            <a:ext cx="508473" cy="369332"/>
+          </a:xfrm>
+          <a:prstGeom prst="rect">
+            <a:avLst/>
+          </a:prstGeom>
+          <a:noFill/>
+        </p:spPr>
+        <p:txBody>
+          <a:bodyPr wrap="none" rtlCol="0">
+            <a:spAutoFit/>
+          </a:bodyPr>
+          <a:lstStyle/>
+          <a:p>
+            <a:r>
+              <a:rPr lang="de-DE" dirty="0">
+                <a:solidFill>
+                  <a:srgbClr val="0070C0"/>
+                </a:solidFill>
+              </a:rPr>
+              <a:t>1/1</a:t>
+            </a:r>
+          </a:p>
+        </p:txBody>
+      </p:sp>
+      <p:sp>
+        <p:nvSpPr>
+          <p:cNvPr id="9" name="Textfeld 8">
+            <a:extLst>
+              <a:ext uri="{FF2B5EF4-FFF2-40B4-BE49-F238E27FC236}">
+                <a16:creationId xmlns:a16="http://schemas.microsoft.com/office/drawing/2014/main" id="{E89F458B-2A81-CD89-60A0-CC133E12DD31}"/>
+              </a:ext>
+            </a:extLst>
+          </p:cNvPr>
+          <p:cNvSpPr txBox="1"/>
+          <p:nvPr/>
+        </p:nvSpPr>
+        <p:spPr>
+          <a:xfrm>
+            <a:off x="7889637" y="2773920"/>
+            <a:ext cx="845103" cy="369332"/>
+          </a:xfrm>
+          <a:prstGeom prst="rect">
+            <a:avLst/>
+          </a:prstGeom>
+          <a:noFill/>
+        </p:spPr>
+        <p:txBody>
+          <a:bodyPr wrap="none" rtlCol="0">
+            <a:spAutoFit/>
+          </a:bodyPr>
+          <a:lstStyle/>
+          <a:p>
+            <a:r>
+              <a:rPr lang="de-DE" dirty="0">
+                <a:solidFill>
+                  <a:srgbClr val="C00000"/>
+                </a:solidFill>
+              </a:rPr>
+              <a:t>4 </a:t>
+            </a:r>
+            <a:r>
+              <a:rPr lang="de-DE" dirty="0" err="1">
+                <a:solidFill>
+                  <a:srgbClr val="C00000"/>
+                </a:solidFill>
+              </a:rPr>
+              <a:t>lanes</a:t>
+            </a:r>
+            <a:endParaRPr lang="de-DE" dirty="0">
+              <a:solidFill>
+                <a:srgbClr val="C00000"/>
+              </a:solidFill>
+            </a:endParaRPr>
+          </a:p>
+        </p:txBody>
+      </p:sp>
+      <p:sp>
+        <p:nvSpPr>
+          <p:cNvPr id="10" name="Textfeld 9">
+            <a:extLst>
+              <a:ext uri="{FF2B5EF4-FFF2-40B4-BE49-F238E27FC236}">
+                <a16:creationId xmlns:a16="http://schemas.microsoft.com/office/drawing/2014/main" id="{B7F8A71D-0F52-95B8-2F77-F2F4AEFBE55A}"/>
+              </a:ext>
+            </a:extLst>
+          </p:cNvPr>
+          <p:cNvSpPr txBox="1"/>
+          <p:nvPr/>
+        </p:nvSpPr>
+        <p:spPr>
+          <a:xfrm>
+            <a:off x="7889637" y="3525320"/>
+            <a:ext cx="845103" cy="369332"/>
+          </a:xfrm>
+          <a:prstGeom prst="rect">
+            <a:avLst/>
+          </a:prstGeom>
+          <a:noFill/>
+        </p:spPr>
+        <p:txBody>
+          <a:bodyPr wrap="none" rtlCol="0">
+            <a:spAutoFit/>
+          </a:bodyPr>
+          <a:lstStyle/>
+          <a:p>
+            <a:r>
+              <a:rPr lang="de-DE" dirty="0">
+                <a:solidFill>
+                  <a:srgbClr val="0070C0"/>
+                </a:solidFill>
+              </a:rPr>
+              <a:t>3 </a:t>
+            </a:r>
+            <a:r>
+              <a:rPr lang="de-DE" dirty="0" err="1">
+                <a:solidFill>
+                  <a:srgbClr val="0070C0"/>
+                </a:solidFill>
+              </a:rPr>
+              <a:t>lanes</a:t>
+            </a:r>
+            <a:endParaRPr lang="de-DE" dirty="0">
+              <a:solidFill>
+                <a:srgbClr val="0070C0"/>
+              </a:solidFill>
+            </a:endParaRPr>
+          </a:p>
+        </p:txBody>
+      </p:sp>
+    </p:spTree>
+    <p:extLst>
+      <p:ext uri="{BB962C8B-B14F-4D97-AF65-F5344CB8AC3E}">
+        <p14:creationId xmlns:p14="http://schemas.microsoft.com/office/powerpoint/2010/main" val="695042863"/>
+      </p:ext>
+    </p:extLst>
+  </p:cSld>
+  <p:clrMapOvr>
+    <a:masterClrMapping/>
+  </p:clrMapOvr>
+</p:sld>
+</file>
+
+<file path=ppt/slides/slide3.xml><?xml version="1.0" encoding="utf-8"?>
+<p:sld xmlns:a="http://schemas.openxmlformats.org/drawingml/2006/main" xmlns:r="http://schemas.openxmlformats.org/officeDocument/2006/relationships" xmlns:p="http://schemas.openxmlformats.org/presentationml/2006/main">
+  <p:cSld>
+    <p:spTree>
+      <p:nvGrpSpPr>
+        <p:cNvPr id="1" name=""/>
+        <p:cNvGrpSpPr/>
+        <p:nvPr/>
+      </p:nvGrpSpPr>
+      <p:grpSpPr>
+        <a:xfrm>
+          <a:off x="0" y="0"/>
+          <a:ext cx="0" cy="0"/>
+          <a:chOff x="0" y="0"/>
+          <a:chExt cx="0" cy="0"/>
+        </a:xfrm>
+      </p:grpSpPr>
+      <p:pic>
+        <p:nvPicPr>
+          <p:cNvPr id="5" name="Grafik 4">
+            <a:extLst>
+              <a:ext uri="{FF2B5EF4-FFF2-40B4-BE49-F238E27FC236}">
                 <a16:creationId xmlns:a16="http://schemas.microsoft.com/office/drawing/2014/main" id="{96F0CB09-B08A-AC91-C2F1-7463C791D933}"/>
               </a:ext>
             </a:extLst>
@@ -3639,7 +4615,7 @@
 </p:sld>
 </file>
 
-<file path=ppt/slides/slide2.xml><?xml version="1.0" encoding="utf-8"?>
+<file path=ppt/slides/slide4.xml><?xml version="1.0" encoding="utf-8"?>
 <p:sld xmlns:a="http://schemas.openxmlformats.org/drawingml/2006/main" xmlns:r="http://schemas.openxmlformats.org/officeDocument/2006/relationships" xmlns:p="http://schemas.openxmlformats.org/presentationml/2006/main">
   <p:cSld>
     <p:spTree>
@@ -6208,7 +7184,7 @@
 </p:sld>
 </file>
 
-<file path=ppt/slides/slide3.xml><?xml version="1.0" encoding="utf-8"?>
+<file path=ppt/slides/slide5.xml><?xml version="1.0" encoding="utf-8"?>
 <p:sld xmlns:a="http://schemas.openxmlformats.org/drawingml/2006/main" xmlns:r="http://schemas.openxmlformats.org/officeDocument/2006/relationships" xmlns:p="http://schemas.openxmlformats.org/presentationml/2006/main">
   <p:cSld>
     <p:spTree>
@@ -7705,7 +8681,7 @@
 </p:sld>
 </file>
 
-<file path=ppt/slides/slide4.xml><?xml version="1.0" encoding="utf-8"?>
+<file path=ppt/slides/slide6.xml><?xml version="1.0" encoding="utf-8"?>
 <p:sld xmlns:a="http://schemas.openxmlformats.org/drawingml/2006/main" xmlns:r="http://schemas.openxmlformats.org/officeDocument/2006/relationships" xmlns:p="http://schemas.openxmlformats.org/presentationml/2006/main">
   <p:cSld>
     <p:spTree>
@@ -12524,7 +13500,7 @@
 </p:sld>
 </file>
 
-<file path=ppt/slides/slide5.xml><?xml version="1.0" encoding="utf-8"?>
+<file path=ppt/slides/slide7.xml><?xml version="1.0" encoding="utf-8"?>
 <p:sld xmlns:a="http://schemas.openxmlformats.org/drawingml/2006/main" xmlns:r="http://schemas.openxmlformats.org/officeDocument/2006/relationships" xmlns:p="http://schemas.openxmlformats.org/presentationml/2006/main">
   <p:cSld>
     <p:spTree>
@@ -16912,7 +17888,7 @@
 </p:sld>
 </file>
 
-<file path=ppt/slides/slide6.xml><?xml version="1.0" encoding="utf-8"?>
+<file path=ppt/slides/slide8.xml><?xml version="1.0" encoding="utf-8"?>
 <p:sld xmlns:a="http://schemas.openxmlformats.org/drawingml/2006/main" xmlns:r="http://schemas.openxmlformats.org/officeDocument/2006/relationships" xmlns:p="http://schemas.openxmlformats.org/presentationml/2006/main">
   <p:cSld>
     <p:spTree>
@@ -21502,7 +22478,7 @@
 </p:sld>
 </file>
 
-<file path=ppt/slides/slide7.xml><?xml version="1.0" encoding="utf-8"?>
+<file path=ppt/slides/slide9.xml><?xml version="1.0" encoding="utf-8"?>
 <p:sld xmlns:a="http://schemas.openxmlformats.org/drawingml/2006/main" xmlns:r="http://schemas.openxmlformats.org/officeDocument/2006/relationships" xmlns:p="http://schemas.openxmlformats.org/presentationml/2006/main">
   <p:cSld>
     <p:spTree>

</xml_diff>

<commit_message>
Coordinates re-confirmed. Also, line thickness adjusted
</commit_message>
<xml_diff>
--- a/examples/UrbanTopologies.pptx
+++ b/examples/UrbanTopologies.pptx
@@ -5,15 +5,16 @@
     <p:sldMasterId id="2147483648" r:id="rId1"/>
   </p:sldMasterIdLst>
   <p:sldIdLst>
-    <p:sldId id="264" r:id="rId2"/>
-    <p:sldId id="263" r:id="rId3"/>
-    <p:sldId id="262" r:id="rId4"/>
-    <p:sldId id="261" r:id="rId5"/>
-    <p:sldId id="260" r:id="rId6"/>
-    <p:sldId id="256" r:id="rId7"/>
-    <p:sldId id="259" r:id="rId8"/>
-    <p:sldId id="257" r:id="rId9"/>
-    <p:sldId id="258" r:id="rId10"/>
+    <p:sldId id="265" r:id="rId2"/>
+    <p:sldId id="264" r:id="rId3"/>
+    <p:sldId id="263" r:id="rId4"/>
+    <p:sldId id="262" r:id="rId5"/>
+    <p:sldId id="261" r:id="rId6"/>
+    <p:sldId id="260" r:id="rId7"/>
+    <p:sldId id="256" r:id="rId8"/>
+    <p:sldId id="259" r:id="rId9"/>
+    <p:sldId id="257" r:id="rId10"/>
+    <p:sldId id="258" r:id="rId11"/>
   </p:sldIdLst>
   <p:sldSz cx="12192000" cy="6858000"/>
   <p:notesSz cx="6858000" cy="9144000"/>
@@ -3339,6 +3340,933 @@
           <p:cNvPr id="5" name="Grafik 4">
             <a:extLst>
               <a:ext uri="{FF2B5EF4-FFF2-40B4-BE49-F238E27FC236}">
+                <a16:creationId xmlns:a16="http://schemas.microsoft.com/office/drawing/2014/main" id="{E20606DD-2019-7750-3747-4C1257DFDE76}"/>
+              </a:ext>
+            </a:extLst>
+          </p:cNvPr>
+          <p:cNvPicPr>
+            <a:picLocks noChangeAspect="1"/>
+          </p:cNvPicPr>
+          <p:nvPr/>
+        </p:nvPicPr>
+        <p:blipFill>
+          <a:blip r:embed="rId2"/>
+          <a:stretch>
+            <a:fillRect/>
+          </a:stretch>
+        </p:blipFill>
+        <p:spPr>
+          <a:xfrm>
+            <a:off x="70757" y="0"/>
+            <a:ext cx="12050486" cy="6858000"/>
+          </a:xfrm>
+          <a:prstGeom prst="rect">
+            <a:avLst/>
+          </a:prstGeom>
+        </p:spPr>
+      </p:pic>
+      <p:graphicFrame>
+        <p:nvGraphicFramePr>
+          <p:cNvPr id="6" name="Tabelle 5">
+            <a:extLst>
+              <a:ext uri="{FF2B5EF4-FFF2-40B4-BE49-F238E27FC236}">
+                <a16:creationId xmlns:a16="http://schemas.microsoft.com/office/drawing/2014/main" id="{086377FE-081A-27DD-E153-76766AA0E5DD}"/>
+              </a:ext>
+            </a:extLst>
+          </p:cNvPr>
+          <p:cNvGraphicFramePr>
+            <a:graphicFrameLocks noGrp="1"/>
+          </p:cNvGraphicFramePr>
+          <p:nvPr>
+            <p:extLst>
+              <p:ext uri="{D42A27DB-BD31-4B8C-83A1-F6EECF244321}">
+                <p14:modId xmlns:p14="http://schemas.microsoft.com/office/powerpoint/2010/main" val="2680776969"/>
+              </p:ext>
+            </p:extLst>
+          </p:nvPr>
+        </p:nvGraphicFramePr>
+        <p:xfrm>
+          <a:off x="-169069" y="709939"/>
+          <a:ext cx="8084340" cy="370840"/>
+        </p:xfrm>
+        <a:graphic>
+          <a:graphicData uri="http://schemas.openxmlformats.org/drawingml/2006/table">
+            <a:tbl>
+              <a:tblPr firstRow="1" bandRow="1">
+                <a:tableStyleId>{5C22544A-7EE6-4342-B048-85BDC9FD1C3A}</a:tableStyleId>
+              </a:tblPr>
+              <a:tblGrid>
+                <a:gridCol w="538956">
+                  <a:extLst>
+                    <a:ext uri="{9D8B030D-6E8A-4147-A177-3AD203B41FA5}">
+                      <a16:colId xmlns:a16="http://schemas.microsoft.com/office/drawing/2014/main" val="743353961"/>
+                    </a:ext>
+                  </a:extLst>
+                </a:gridCol>
+                <a:gridCol w="538956">
+                  <a:extLst>
+                    <a:ext uri="{9D8B030D-6E8A-4147-A177-3AD203B41FA5}">
+                      <a16:colId xmlns:a16="http://schemas.microsoft.com/office/drawing/2014/main" val="1980402480"/>
+                    </a:ext>
+                  </a:extLst>
+                </a:gridCol>
+                <a:gridCol w="538956">
+                  <a:extLst>
+                    <a:ext uri="{9D8B030D-6E8A-4147-A177-3AD203B41FA5}">
+                      <a16:colId xmlns:a16="http://schemas.microsoft.com/office/drawing/2014/main" val="3577183013"/>
+                    </a:ext>
+                  </a:extLst>
+                </a:gridCol>
+                <a:gridCol w="538956">
+                  <a:extLst>
+                    <a:ext uri="{9D8B030D-6E8A-4147-A177-3AD203B41FA5}">
+                      <a16:colId xmlns:a16="http://schemas.microsoft.com/office/drawing/2014/main" val="1438581439"/>
+                    </a:ext>
+                  </a:extLst>
+                </a:gridCol>
+                <a:gridCol w="538956">
+                  <a:extLst>
+                    <a:ext uri="{9D8B030D-6E8A-4147-A177-3AD203B41FA5}">
+                      <a16:colId xmlns:a16="http://schemas.microsoft.com/office/drawing/2014/main" val="477044570"/>
+                    </a:ext>
+                  </a:extLst>
+                </a:gridCol>
+                <a:gridCol w="538956">
+                  <a:extLst>
+                    <a:ext uri="{9D8B030D-6E8A-4147-A177-3AD203B41FA5}">
+                      <a16:colId xmlns:a16="http://schemas.microsoft.com/office/drawing/2014/main" val="2168728375"/>
+                    </a:ext>
+                  </a:extLst>
+                </a:gridCol>
+                <a:gridCol w="538956">
+                  <a:extLst>
+                    <a:ext uri="{9D8B030D-6E8A-4147-A177-3AD203B41FA5}">
+                      <a16:colId xmlns:a16="http://schemas.microsoft.com/office/drawing/2014/main" val="1717008001"/>
+                    </a:ext>
+                  </a:extLst>
+                </a:gridCol>
+                <a:gridCol w="538956">
+                  <a:extLst>
+                    <a:ext uri="{9D8B030D-6E8A-4147-A177-3AD203B41FA5}">
+                      <a16:colId xmlns:a16="http://schemas.microsoft.com/office/drawing/2014/main" val="2584589054"/>
+                    </a:ext>
+                  </a:extLst>
+                </a:gridCol>
+                <a:gridCol w="538956">
+                  <a:extLst>
+                    <a:ext uri="{9D8B030D-6E8A-4147-A177-3AD203B41FA5}">
+                      <a16:colId xmlns:a16="http://schemas.microsoft.com/office/drawing/2014/main" val="2106746303"/>
+                    </a:ext>
+                  </a:extLst>
+                </a:gridCol>
+                <a:gridCol w="538956">
+                  <a:extLst>
+                    <a:ext uri="{9D8B030D-6E8A-4147-A177-3AD203B41FA5}">
+                      <a16:colId xmlns:a16="http://schemas.microsoft.com/office/drawing/2014/main" val="2919671094"/>
+                    </a:ext>
+                  </a:extLst>
+                </a:gridCol>
+                <a:gridCol w="538956">
+                  <a:extLst>
+                    <a:ext uri="{9D8B030D-6E8A-4147-A177-3AD203B41FA5}">
+                      <a16:colId xmlns:a16="http://schemas.microsoft.com/office/drawing/2014/main" val="266298411"/>
+                    </a:ext>
+                  </a:extLst>
+                </a:gridCol>
+                <a:gridCol w="538956">
+                  <a:extLst>
+                    <a:ext uri="{9D8B030D-6E8A-4147-A177-3AD203B41FA5}">
+                      <a16:colId xmlns:a16="http://schemas.microsoft.com/office/drawing/2014/main" val="1872742270"/>
+                    </a:ext>
+                  </a:extLst>
+                </a:gridCol>
+                <a:gridCol w="538956">
+                  <a:extLst>
+                    <a:ext uri="{9D8B030D-6E8A-4147-A177-3AD203B41FA5}">
+                      <a16:colId xmlns:a16="http://schemas.microsoft.com/office/drawing/2014/main" val="2136611662"/>
+                    </a:ext>
+                  </a:extLst>
+                </a:gridCol>
+                <a:gridCol w="538956">
+                  <a:extLst>
+                    <a:ext uri="{9D8B030D-6E8A-4147-A177-3AD203B41FA5}">
+                      <a16:colId xmlns:a16="http://schemas.microsoft.com/office/drawing/2014/main" val="877027050"/>
+                    </a:ext>
+                  </a:extLst>
+                </a:gridCol>
+                <a:gridCol w="538956">
+                  <a:extLst>
+                    <a:ext uri="{9D8B030D-6E8A-4147-A177-3AD203B41FA5}">
+                      <a16:colId xmlns:a16="http://schemas.microsoft.com/office/drawing/2014/main" val="2606584792"/>
+                    </a:ext>
+                  </a:extLst>
+                </a:gridCol>
+              </a:tblGrid>
+              <a:tr h="370840">
+                <a:tc>
+                  <a:txBody>
+                    <a:bodyPr/>
+                    <a:lstStyle/>
+                    <a:p>
+                      <a:endParaRPr lang="de-DE"/>
+                    </a:p>
+                  </a:txBody>
+                  <a:tcPr/>
+                </a:tc>
+                <a:tc>
+                  <a:txBody>
+                    <a:bodyPr/>
+                    <a:lstStyle/>
+                    <a:p>
+                      <a:endParaRPr lang="de-DE"/>
+                    </a:p>
+                  </a:txBody>
+                  <a:tcPr/>
+                </a:tc>
+                <a:tc>
+                  <a:txBody>
+                    <a:bodyPr/>
+                    <a:lstStyle/>
+                    <a:p>
+                      <a:endParaRPr lang="de-DE"/>
+                    </a:p>
+                  </a:txBody>
+                  <a:tcPr/>
+                </a:tc>
+                <a:tc>
+                  <a:txBody>
+                    <a:bodyPr/>
+                    <a:lstStyle/>
+                    <a:p>
+                      <a:endParaRPr lang="de-DE"/>
+                    </a:p>
+                  </a:txBody>
+                  <a:tcPr/>
+                </a:tc>
+                <a:tc>
+                  <a:txBody>
+                    <a:bodyPr/>
+                    <a:lstStyle/>
+                    <a:p>
+                      <a:endParaRPr lang="de-DE"/>
+                    </a:p>
+                  </a:txBody>
+                  <a:tcPr/>
+                </a:tc>
+                <a:tc>
+                  <a:txBody>
+                    <a:bodyPr/>
+                    <a:lstStyle/>
+                    <a:p>
+                      <a:endParaRPr lang="de-DE"/>
+                    </a:p>
+                  </a:txBody>
+                  <a:tcPr/>
+                </a:tc>
+                <a:tc>
+                  <a:txBody>
+                    <a:bodyPr/>
+                    <a:lstStyle/>
+                    <a:p>
+                      <a:endParaRPr lang="de-DE" dirty="0"/>
+                    </a:p>
+                  </a:txBody>
+                  <a:tcPr/>
+                </a:tc>
+                <a:tc>
+                  <a:txBody>
+                    <a:bodyPr/>
+                    <a:lstStyle/>
+                    <a:p>
+                      <a:endParaRPr lang="de-DE" dirty="0"/>
+                    </a:p>
+                  </a:txBody>
+                  <a:tcPr/>
+                </a:tc>
+                <a:tc>
+                  <a:txBody>
+                    <a:bodyPr/>
+                    <a:lstStyle/>
+                    <a:p>
+                      <a:endParaRPr lang="de-DE" dirty="0"/>
+                    </a:p>
+                  </a:txBody>
+                  <a:tcPr/>
+                </a:tc>
+                <a:tc>
+                  <a:txBody>
+                    <a:bodyPr/>
+                    <a:lstStyle/>
+                    <a:p>
+                      <a:endParaRPr lang="de-DE" dirty="0"/>
+                    </a:p>
+                  </a:txBody>
+                  <a:tcPr/>
+                </a:tc>
+                <a:tc>
+                  <a:txBody>
+                    <a:bodyPr/>
+                    <a:lstStyle/>
+                    <a:p>
+                      <a:endParaRPr lang="de-DE" dirty="0"/>
+                    </a:p>
+                  </a:txBody>
+                  <a:tcPr/>
+                </a:tc>
+                <a:tc>
+                  <a:txBody>
+                    <a:bodyPr/>
+                    <a:lstStyle/>
+                    <a:p>
+                      <a:endParaRPr lang="de-DE" dirty="0"/>
+                    </a:p>
+                  </a:txBody>
+                  <a:tcPr/>
+                </a:tc>
+                <a:tc>
+                  <a:txBody>
+                    <a:bodyPr/>
+                    <a:lstStyle/>
+                    <a:p>
+                      <a:endParaRPr lang="de-DE" dirty="0"/>
+                    </a:p>
+                  </a:txBody>
+                  <a:tcPr/>
+                </a:tc>
+                <a:tc>
+                  <a:txBody>
+                    <a:bodyPr/>
+                    <a:lstStyle/>
+                    <a:p>
+                      <a:endParaRPr lang="de-DE" dirty="0"/>
+                    </a:p>
+                  </a:txBody>
+                  <a:tcPr/>
+                </a:tc>
+                <a:tc>
+                  <a:txBody>
+                    <a:bodyPr/>
+                    <a:lstStyle/>
+                    <a:p>
+                      <a:endParaRPr lang="de-DE" dirty="0"/>
+                    </a:p>
+                  </a:txBody>
+                  <a:tcPr/>
+                </a:tc>
+                <a:extLst>
+                  <a:ext uri="{0D108BD9-81ED-4DB2-BD59-A6C34878D82A}">
+                    <a16:rowId xmlns:a16="http://schemas.microsoft.com/office/drawing/2014/main" val="1021208655"/>
+                  </a:ext>
+                </a:extLst>
+              </a:tr>
+            </a:tbl>
+          </a:graphicData>
+        </a:graphic>
+      </p:graphicFrame>
+    </p:spTree>
+    <p:extLst>
+      <p:ext uri="{BB962C8B-B14F-4D97-AF65-F5344CB8AC3E}">
+        <p14:creationId xmlns:p14="http://schemas.microsoft.com/office/powerpoint/2010/main" val="1585009156"/>
+      </p:ext>
+    </p:extLst>
+  </p:cSld>
+  <p:clrMapOvr>
+    <a:masterClrMapping/>
+  </p:clrMapOvr>
+</p:sld>
+</file>
+
+<file path=ppt/slides/slide10.xml><?xml version="1.0" encoding="utf-8"?>
+<p:sld xmlns:a="http://schemas.openxmlformats.org/drawingml/2006/main" xmlns:r="http://schemas.openxmlformats.org/officeDocument/2006/relationships" xmlns:p="http://schemas.openxmlformats.org/presentationml/2006/main">
+  <p:cSld>
+    <p:spTree>
+      <p:nvGrpSpPr>
+        <p:cNvPr id="1" name=""/>
+        <p:cNvGrpSpPr/>
+        <p:nvPr/>
+      </p:nvGrpSpPr>
+      <p:grpSpPr>
+        <a:xfrm>
+          <a:off x="0" y="0"/>
+          <a:ext cx="0" cy="0"/>
+          <a:chOff x="0" y="0"/>
+          <a:chExt cx="0" cy="0"/>
+        </a:xfrm>
+      </p:grpSpPr>
+      <p:grpSp>
+        <p:nvGrpSpPr>
+          <p:cNvPr id="34" name="Gruppieren 33">
+            <a:extLst>
+              <a:ext uri="{FF2B5EF4-FFF2-40B4-BE49-F238E27FC236}">
+                <a16:creationId xmlns:a16="http://schemas.microsoft.com/office/drawing/2014/main" id="{0B706B9C-92B2-8E39-89A7-BAB46DFFC8A1}"/>
+              </a:ext>
+            </a:extLst>
+          </p:cNvPr>
+          <p:cNvGrpSpPr/>
+          <p:nvPr/>
+        </p:nvGrpSpPr>
+        <p:grpSpPr>
+          <a:xfrm>
+            <a:off x="739141" y="2855656"/>
+            <a:ext cx="3635585" cy="289983"/>
+            <a:chOff x="739141" y="3284008"/>
+            <a:chExt cx="3635585" cy="289983"/>
+          </a:xfrm>
+        </p:grpSpPr>
+        <p:grpSp>
+          <p:nvGrpSpPr>
+            <p:cNvPr id="35" name="Gruppieren 34">
+              <a:extLst>
+                <a:ext uri="{FF2B5EF4-FFF2-40B4-BE49-F238E27FC236}">
+                  <a16:creationId xmlns:a16="http://schemas.microsoft.com/office/drawing/2014/main" id="{30F67F38-2B70-5A80-A46F-31C332354269}"/>
+                </a:ext>
+              </a:extLst>
+            </p:cNvPr>
+            <p:cNvGrpSpPr/>
+            <p:nvPr/>
+          </p:nvGrpSpPr>
+          <p:grpSpPr>
+            <a:xfrm>
+              <a:off x="762001" y="3284008"/>
+              <a:ext cx="3589866" cy="289983"/>
+              <a:chOff x="2032000" y="2006599"/>
+              <a:chExt cx="6096000" cy="1117600"/>
+            </a:xfrm>
+          </p:grpSpPr>
+          <p:sp>
+            <p:nvSpPr>
+              <p:cNvPr id="45" name="Rechteck 44">
+                <a:extLst>
+                  <a:ext uri="{FF2B5EF4-FFF2-40B4-BE49-F238E27FC236}">
+                    <a16:creationId xmlns:a16="http://schemas.microsoft.com/office/drawing/2014/main" id="{D5B2440C-C987-A2DD-1ED9-3F1879B63FA2}"/>
+                  </a:ext>
+                </a:extLst>
+              </p:cNvPr>
+              <p:cNvSpPr/>
+              <p:nvPr/>
+            </p:nvSpPr>
+            <p:spPr>
+              <a:xfrm>
+                <a:off x="2032000" y="2006599"/>
+                <a:ext cx="6096000" cy="1117598"/>
+              </a:xfrm>
+              <a:prstGeom prst="rect">
+                <a:avLst/>
+              </a:prstGeom>
+              <a:solidFill>
+                <a:srgbClr val="D0CECE"/>
+              </a:solidFill>
+              <a:ln w="19050">
+                <a:solidFill>
+                  <a:schemeClr val="tx1"/>
+                </a:solidFill>
+                <a:prstDash val="solid"/>
+              </a:ln>
+            </p:spPr>
+            <p:style>
+              <a:lnRef idx="2">
+                <a:schemeClr val="accent1">
+                  <a:shade val="15000"/>
+                </a:schemeClr>
+              </a:lnRef>
+              <a:fillRef idx="1">
+                <a:schemeClr val="accent1"/>
+              </a:fillRef>
+              <a:effectRef idx="0">
+                <a:schemeClr val="accent1"/>
+              </a:effectRef>
+              <a:fontRef idx="minor">
+                <a:schemeClr val="lt1"/>
+              </a:fontRef>
+            </p:style>
+            <p:txBody>
+              <a:bodyPr rtlCol="0" anchor="ctr"/>
+              <a:lstStyle/>
+              <a:p>
+                <a:pPr algn="ctr"/>
+                <a:endParaRPr lang="de-DE"/>
+              </a:p>
+            </p:txBody>
+          </p:sp>
+          <p:sp>
+            <p:nvSpPr>
+              <p:cNvPr id="42" name="Rechteck 41">
+                <a:extLst>
+                  <a:ext uri="{FF2B5EF4-FFF2-40B4-BE49-F238E27FC236}">
+                    <a16:creationId xmlns:a16="http://schemas.microsoft.com/office/drawing/2014/main" id="{B2723C11-FCCF-ADB3-0897-DC89F1A018BB}"/>
+                  </a:ext>
+                </a:extLst>
+              </p:cNvPr>
+              <p:cNvSpPr/>
+              <p:nvPr/>
+            </p:nvSpPr>
+            <p:spPr>
+              <a:xfrm>
+                <a:off x="2032000" y="2006600"/>
+                <a:ext cx="6096000" cy="372533"/>
+              </a:xfrm>
+              <a:prstGeom prst="rect">
+                <a:avLst/>
+              </a:prstGeom>
+              <a:noFill/>
+              <a:ln>
+                <a:solidFill>
+                  <a:schemeClr val="tx1"/>
+                </a:solidFill>
+                <a:prstDash val="lgDash"/>
+              </a:ln>
+            </p:spPr>
+            <p:style>
+              <a:lnRef idx="2">
+                <a:schemeClr val="accent1">
+                  <a:shade val="15000"/>
+                </a:schemeClr>
+              </a:lnRef>
+              <a:fillRef idx="1">
+                <a:schemeClr val="accent1"/>
+              </a:fillRef>
+              <a:effectRef idx="0">
+                <a:schemeClr val="accent1"/>
+              </a:effectRef>
+              <a:fontRef idx="minor">
+                <a:schemeClr val="lt1"/>
+              </a:fontRef>
+            </p:style>
+            <p:txBody>
+              <a:bodyPr rtlCol="0" anchor="ctr"/>
+              <a:lstStyle/>
+              <a:p>
+                <a:pPr algn="ctr"/>
+                <a:endParaRPr lang="de-DE"/>
+              </a:p>
+            </p:txBody>
+          </p:sp>
+          <p:sp>
+            <p:nvSpPr>
+              <p:cNvPr id="43" name="Rechteck 42">
+                <a:extLst>
+                  <a:ext uri="{FF2B5EF4-FFF2-40B4-BE49-F238E27FC236}">
+                    <a16:creationId xmlns:a16="http://schemas.microsoft.com/office/drawing/2014/main" id="{5939D0D4-5103-5FF0-826C-77DE08C1CB88}"/>
+                  </a:ext>
+                </a:extLst>
+              </p:cNvPr>
+              <p:cNvSpPr/>
+              <p:nvPr/>
+            </p:nvSpPr>
+            <p:spPr>
+              <a:xfrm>
+                <a:off x="2032000" y="2379133"/>
+                <a:ext cx="6096000" cy="372533"/>
+              </a:xfrm>
+              <a:prstGeom prst="rect">
+                <a:avLst/>
+              </a:prstGeom>
+              <a:noFill/>
+              <a:ln>
+                <a:noFill/>
+                <a:prstDash val="lgDash"/>
+              </a:ln>
+            </p:spPr>
+            <p:style>
+              <a:lnRef idx="2">
+                <a:schemeClr val="accent1">
+                  <a:shade val="15000"/>
+                </a:schemeClr>
+              </a:lnRef>
+              <a:fillRef idx="1">
+                <a:schemeClr val="accent1"/>
+              </a:fillRef>
+              <a:effectRef idx="0">
+                <a:schemeClr val="accent1"/>
+              </a:effectRef>
+              <a:fontRef idx="minor">
+                <a:schemeClr val="lt1"/>
+              </a:fontRef>
+            </p:style>
+            <p:txBody>
+              <a:bodyPr rtlCol="0" anchor="ctr"/>
+              <a:lstStyle/>
+              <a:p>
+                <a:pPr algn="ctr"/>
+                <a:endParaRPr lang="de-DE"/>
+              </a:p>
+            </p:txBody>
+          </p:sp>
+          <p:sp>
+            <p:nvSpPr>
+              <p:cNvPr id="44" name="Rechteck 43">
+                <a:extLst>
+                  <a:ext uri="{FF2B5EF4-FFF2-40B4-BE49-F238E27FC236}">
+                    <a16:creationId xmlns:a16="http://schemas.microsoft.com/office/drawing/2014/main" id="{52851A60-9A18-36BD-6EA0-926F76F8371C}"/>
+                  </a:ext>
+                </a:extLst>
+              </p:cNvPr>
+              <p:cNvSpPr/>
+              <p:nvPr/>
+            </p:nvSpPr>
+            <p:spPr>
+              <a:xfrm>
+                <a:off x="2032000" y="2751666"/>
+                <a:ext cx="6096000" cy="372533"/>
+              </a:xfrm>
+              <a:prstGeom prst="rect">
+                <a:avLst/>
+              </a:prstGeom>
+              <a:noFill/>
+              <a:ln>
+                <a:solidFill>
+                  <a:schemeClr val="tx1"/>
+                </a:solidFill>
+                <a:prstDash val="lgDash"/>
+              </a:ln>
+            </p:spPr>
+            <p:style>
+              <a:lnRef idx="2">
+                <a:schemeClr val="accent1">
+                  <a:shade val="15000"/>
+                </a:schemeClr>
+              </a:lnRef>
+              <a:fillRef idx="1">
+                <a:schemeClr val="accent1"/>
+              </a:fillRef>
+              <a:effectRef idx="0">
+                <a:schemeClr val="accent1"/>
+              </a:effectRef>
+              <a:fontRef idx="minor">
+                <a:schemeClr val="lt1"/>
+              </a:fontRef>
+            </p:style>
+            <p:txBody>
+              <a:bodyPr rtlCol="0" anchor="ctr"/>
+              <a:lstStyle/>
+              <a:p>
+                <a:pPr algn="ctr"/>
+                <a:endParaRPr lang="de-DE"/>
+              </a:p>
+            </p:txBody>
+          </p:sp>
+        </p:grpSp>
+        <p:sp>
+          <p:nvSpPr>
+            <p:cNvPr id="36" name="Ellipse 35">
+              <a:extLst>
+                <a:ext uri="{FF2B5EF4-FFF2-40B4-BE49-F238E27FC236}">
+                  <a16:creationId xmlns:a16="http://schemas.microsoft.com/office/drawing/2014/main" id="{82545CBE-3C58-9DC3-95E6-EA4DD1109E43}"/>
+                </a:ext>
+              </a:extLst>
+            </p:cNvPr>
+            <p:cNvSpPr/>
+            <p:nvPr/>
+          </p:nvSpPr>
+          <p:spPr>
+            <a:xfrm>
+              <a:off x="4329007" y="3309478"/>
+              <a:ext cx="45719" cy="45719"/>
+            </a:xfrm>
+            <a:prstGeom prst="ellipse">
+              <a:avLst/>
+            </a:prstGeom>
+          </p:spPr>
+          <p:style>
+            <a:lnRef idx="2">
+              <a:schemeClr val="accent1">
+                <a:shade val="15000"/>
+              </a:schemeClr>
+            </a:lnRef>
+            <a:fillRef idx="1">
+              <a:schemeClr val="accent1"/>
+            </a:fillRef>
+            <a:effectRef idx="0">
+              <a:schemeClr val="accent1"/>
+            </a:effectRef>
+            <a:fontRef idx="minor">
+              <a:schemeClr val="lt1"/>
+            </a:fontRef>
+          </p:style>
+          <p:txBody>
+            <a:bodyPr rtlCol="0" anchor="ctr"/>
+            <a:lstStyle/>
+            <a:p>
+              <a:pPr algn="ctr"/>
+              <a:endParaRPr lang="de-DE"/>
+            </a:p>
+          </p:txBody>
+        </p:sp>
+        <p:sp>
+          <p:nvSpPr>
+            <p:cNvPr id="37" name="Ellipse 36">
+              <a:extLst>
+                <a:ext uri="{FF2B5EF4-FFF2-40B4-BE49-F238E27FC236}">
+                  <a16:creationId xmlns:a16="http://schemas.microsoft.com/office/drawing/2014/main" id="{756F5E7C-595C-BB40-D0D1-4D839BFF002A}"/>
+                </a:ext>
+              </a:extLst>
+            </p:cNvPr>
+            <p:cNvSpPr/>
+            <p:nvPr/>
+          </p:nvSpPr>
+          <p:spPr>
+            <a:xfrm>
+              <a:off x="4329007" y="3406139"/>
+              <a:ext cx="45719" cy="45719"/>
+            </a:xfrm>
+            <a:prstGeom prst="ellipse">
+              <a:avLst/>
+            </a:prstGeom>
+          </p:spPr>
+          <p:style>
+            <a:lnRef idx="2">
+              <a:schemeClr val="accent1">
+                <a:shade val="15000"/>
+              </a:schemeClr>
+            </a:lnRef>
+            <a:fillRef idx="1">
+              <a:schemeClr val="accent1"/>
+            </a:fillRef>
+            <a:effectRef idx="0">
+              <a:schemeClr val="accent1"/>
+            </a:effectRef>
+            <a:fontRef idx="minor">
+              <a:schemeClr val="lt1"/>
+            </a:fontRef>
+          </p:style>
+          <p:txBody>
+            <a:bodyPr rtlCol="0" anchor="ctr"/>
+            <a:lstStyle/>
+            <a:p>
+              <a:pPr algn="ctr"/>
+              <a:endParaRPr lang="de-DE"/>
+            </a:p>
+          </p:txBody>
+        </p:sp>
+        <p:sp>
+          <p:nvSpPr>
+            <p:cNvPr id="38" name="Ellipse 37">
+              <a:extLst>
+                <a:ext uri="{FF2B5EF4-FFF2-40B4-BE49-F238E27FC236}">
+                  <a16:creationId xmlns:a16="http://schemas.microsoft.com/office/drawing/2014/main" id="{4A6920F2-31EC-6EF8-6D7A-069B58D6F4A2}"/>
+                </a:ext>
+              </a:extLst>
+            </p:cNvPr>
+            <p:cNvSpPr/>
+            <p:nvPr/>
+          </p:nvSpPr>
+          <p:spPr>
+            <a:xfrm>
+              <a:off x="4329007" y="3502800"/>
+              <a:ext cx="45719" cy="45719"/>
+            </a:xfrm>
+            <a:prstGeom prst="ellipse">
+              <a:avLst/>
+            </a:prstGeom>
+          </p:spPr>
+          <p:style>
+            <a:lnRef idx="2">
+              <a:schemeClr val="accent1">
+                <a:shade val="15000"/>
+              </a:schemeClr>
+            </a:lnRef>
+            <a:fillRef idx="1">
+              <a:schemeClr val="accent1"/>
+            </a:fillRef>
+            <a:effectRef idx="0">
+              <a:schemeClr val="accent1"/>
+            </a:effectRef>
+            <a:fontRef idx="minor">
+              <a:schemeClr val="lt1"/>
+            </a:fontRef>
+          </p:style>
+          <p:txBody>
+            <a:bodyPr rtlCol="0" anchor="ctr"/>
+            <a:lstStyle/>
+            <a:p>
+              <a:pPr algn="ctr"/>
+              <a:endParaRPr lang="de-DE"/>
+            </a:p>
+          </p:txBody>
+        </p:sp>
+        <p:sp>
+          <p:nvSpPr>
+            <p:cNvPr id="39" name="Ellipse 38">
+              <a:extLst>
+                <a:ext uri="{FF2B5EF4-FFF2-40B4-BE49-F238E27FC236}">
+                  <a16:creationId xmlns:a16="http://schemas.microsoft.com/office/drawing/2014/main" id="{27C1C45E-FAC8-450E-B4BA-6D9B99A878B8}"/>
+                </a:ext>
+              </a:extLst>
+            </p:cNvPr>
+            <p:cNvSpPr/>
+            <p:nvPr/>
+          </p:nvSpPr>
+          <p:spPr>
+            <a:xfrm>
+              <a:off x="739141" y="3309478"/>
+              <a:ext cx="45719" cy="45719"/>
+            </a:xfrm>
+            <a:prstGeom prst="ellipse">
+              <a:avLst/>
+            </a:prstGeom>
+            <a:solidFill>
+              <a:schemeClr val="accent2"/>
+            </a:solidFill>
+          </p:spPr>
+          <p:style>
+            <a:lnRef idx="2">
+              <a:schemeClr val="accent1">
+                <a:shade val="15000"/>
+              </a:schemeClr>
+            </a:lnRef>
+            <a:fillRef idx="1">
+              <a:schemeClr val="accent1"/>
+            </a:fillRef>
+            <a:effectRef idx="0">
+              <a:schemeClr val="accent1"/>
+            </a:effectRef>
+            <a:fontRef idx="minor">
+              <a:schemeClr val="lt1"/>
+            </a:fontRef>
+          </p:style>
+          <p:txBody>
+            <a:bodyPr rtlCol="0" anchor="ctr"/>
+            <a:lstStyle/>
+            <a:p>
+              <a:pPr algn="ctr"/>
+              <a:endParaRPr lang="de-DE"/>
+            </a:p>
+          </p:txBody>
+        </p:sp>
+        <p:sp>
+          <p:nvSpPr>
+            <p:cNvPr id="40" name="Ellipse 39">
+              <a:extLst>
+                <a:ext uri="{FF2B5EF4-FFF2-40B4-BE49-F238E27FC236}">
+                  <a16:creationId xmlns:a16="http://schemas.microsoft.com/office/drawing/2014/main" id="{C2249620-BE71-87BA-C1BB-6F76542605E7}"/>
+                </a:ext>
+              </a:extLst>
+            </p:cNvPr>
+            <p:cNvSpPr/>
+            <p:nvPr/>
+          </p:nvSpPr>
+          <p:spPr>
+            <a:xfrm>
+              <a:off x="739141" y="3407921"/>
+              <a:ext cx="45719" cy="45719"/>
+            </a:xfrm>
+            <a:prstGeom prst="ellipse">
+              <a:avLst/>
+            </a:prstGeom>
+            <a:solidFill>
+              <a:schemeClr val="accent2"/>
+            </a:solidFill>
+          </p:spPr>
+          <p:style>
+            <a:lnRef idx="2">
+              <a:schemeClr val="accent1">
+                <a:shade val="15000"/>
+              </a:schemeClr>
+            </a:lnRef>
+            <a:fillRef idx="1">
+              <a:schemeClr val="accent1"/>
+            </a:fillRef>
+            <a:effectRef idx="0">
+              <a:schemeClr val="accent1"/>
+            </a:effectRef>
+            <a:fontRef idx="minor">
+              <a:schemeClr val="lt1"/>
+            </a:fontRef>
+          </p:style>
+          <p:txBody>
+            <a:bodyPr rtlCol="0" anchor="ctr"/>
+            <a:lstStyle/>
+            <a:p>
+              <a:pPr algn="ctr"/>
+              <a:endParaRPr lang="de-DE"/>
+            </a:p>
+          </p:txBody>
+        </p:sp>
+        <p:sp>
+          <p:nvSpPr>
+            <p:cNvPr id="41" name="Ellipse 40">
+              <a:extLst>
+                <a:ext uri="{FF2B5EF4-FFF2-40B4-BE49-F238E27FC236}">
+                  <a16:creationId xmlns:a16="http://schemas.microsoft.com/office/drawing/2014/main" id="{D027918D-A3CE-F74F-91E1-C7EAEC46BB23}"/>
+                </a:ext>
+              </a:extLst>
+            </p:cNvPr>
+            <p:cNvSpPr/>
+            <p:nvPr/>
+          </p:nvSpPr>
+          <p:spPr>
+            <a:xfrm>
+              <a:off x="739141" y="3498019"/>
+              <a:ext cx="45719" cy="45719"/>
+            </a:xfrm>
+            <a:prstGeom prst="ellipse">
+              <a:avLst/>
+            </a:prstGeom>
+            <a:solidFill>
+              <a:schemeClr val="accent2"/>
+            </a:solidFill>
+          </p:spPr>
+          <p:style>
+            <a:lnRef idx="2">
+              <a:schemeClr val="accent1">
+                <a:shade val="15000"/>
+              </a:schemeClr>
+            </a:lnRef>
+            <a:fillRef idx="1">
+              <a:schemeClr val="accent1"/>
+            </a:fillRef>
+            <a:effectRef idx="0">
+              <a:schemeClr val="accent1"/>
+            </a:effectRef>
+            <a:fontRef idx="minor">
+              <a:schemeClr val="lt1"/>
+            </a:fontRef>
+          </p:style>
+          <p:txBody>
+            <a:bodyPr rtlCol="0" anchor="ctr"/>
+            <a:lstStyle/>
+            <a:p>
+              <a:pPr algn="ctr"/>
+              <a:endParaRPr lang="de-DE"/>
+            </a:p>
+          </p:txBody>
+        </p:sp>
+      </p:grpSp>
+    </p:spTree>
+    <p:extLst>
+      <p:ext uri="{BB962C8B-B14F-4D97-AF65-F5344CB8AC3E}">
+        <p14:creationId xmlns:p14="http://schemas.microsoft.com/office/powerpoint/2010/main" val="3294407545"/>
+      </p:ext>
+    </p:extLst>
+  </p:cSld>
+  <p:clrMapOvr>
+    <a:masterClrMapping/>
+  </p:clrMapOvr>
+</p:sld>
+</file>
+
+<file path=ppt/slides/slide2.xml><?xml version="1.0" encoding="utf-8"?>
+<p:sld xmlns:a="http://schemas.openxmlformats.org/drawingml/2006/main" xmlns:r="http://schemas.openxmlformats.org/officeDocument/2006/relationships" xmlns:p="http://schemas.openxmlformats.org/presentationml/2006/main">
+  <p:cSld>
+    <p:spTree>
+      <p:nvGrpSpPr>
+        <p:cNvPr id="1" name=""/>
+        <p:cNvGrpSpPr/>
+        <p:nvPr/>
+      </p:nvGrpSpPr>
+      <p:grpSpPr>
+        <a:xfrm>
+          <a:off x="0" y="0"/>
+          <a:ext cx="0" cy="0"/>
+          <a:chOff x="0" y="0"/>
+          <a:chExt cx="0" cy="0"/>
+        </a:xfrm>
+      </p:grpSpPr>
+      <p:pic>
+        <p:nvPicPr>
+          <p:cNvPr id="5" name="Grafik 4">
+            <a:extLst>
+              <a:ext uri="{FF2B5EF4-FFF2-40B4-BE49-F238E27FC236}">
                 <a16:creationId xmlns:a16="http://schemas.microsoft.com/office/drawing/2014/main" id="{0ED11B5D-616D-3CC9-EC3B-C7BFEAE9FFBF}"/>
               </a:ext>
             </a:extLst>
@@ -3779,7 +4707,7 @@
 </p:sld>
 </file>
 
-<file path=ppt/slides/slide2.xml><?xml version="1.0" encoding="utf-8"?>
+<file path=ppt/slides/slide3.xml><?xml version="1.0" encoding="utf-8"?>
 <p:sld xmlns:a="http://schemas.openxmlformats.org/drawingml/2006/main" xmlns:r="http://schemas.openxmlformats.org/officeDocument/2006/relationships" xmlns:p="http://schemas.openxmlformats.org/presentationml/2006/main">
   <p:cSld>
     <p:spTree>
@@ -4291,7 +5219,7 @@
 </p:sld>
 </file>
 
-<file path=ppt/slides/slide3.xml><?xml version="1.0" encoding="utf-8"?>
+<file path=ppt/slides/slide4.xml><?xml version="1.0" encoding="utf-8"?>
 <p:sld xmlns:a="http://schemas.openxmlformats.org/drawingml/2006/main" xmlns:r="http://schemas.openxmlformats.org/officeDocument/2006/relationships" xmlns:p="http://schemas.openxmlformats.org/presentationml/2006/main">
   <p:cSld>
     <p:spTree>
@@ -4615,7 +5543,7 @@
 </p:sld>
 </file>
 
-<file path=ppt/slides/slide4.xml><?xml version="1.0" encoding="utf-8"?>
+<file path=ppt/slides/slide5.xml><?xml version="1.0" encoding="utf-8"?>
 <p:sld xmlns:a="http://schemas.openxmlformats.org/drawingml/2006/main" xmlns:r="http://schemas.openxmlformats.org/officeDocument/2006/relationships" xmlns:p="http://schemas.openxmlformats.org/presentationml/2006/main">
   <p:cSld>
     <p:spTree>
@@ -7184,7 +8112,7 @@
 </p:sld>
 </file>
 
-<file path=ppt/slides/slide5.xml><?xml version="1.0" encoding="utf-8"?>
+<file path=ppt/slides/slide6.xml><?xml version="1.0" encoding="utf-8"?>
 <p:sld xmlns:a="http://schemas.openxmlformats.org/drawingml/2006/main" xmlns:r="http://schemas.openxmlformats.org/officeDocument/2006/relationships" xmlns:p="http://schemas.openxmlformats.org/presentationml/2006/main">
   <p:cSld>
     <p:spTree>
@@ -8681,7 +9609,7 @@
 </p:sld>
 </file>
 
-<file path=ppt/slides/slide6.xml><?xml version="1.0" encoding="utf-8"?>
+<file path=ppt/slides/slide7.xml><?xml version="1.0" encoding="utf-8"?>
 <p:sld xmlns:a="http://schemas.openxmlformats.org/drawingml/2006/main" xmlns:r="http://schemas.openxmlformats.org/officeDocument/2006/relationships" xmlns:p="http://schemas.openxmlformats.org/presentationml/2006/main">
   <p:cSld>
     <p:spTree>
@@ -13500,7 +14428,7 @@
 </p:sld>
 </file>
 
-<file path=ppt/slides/slide7.xml><?xml version="1.0" encoding="utf-8"?>
+<file path=ppt/slides/slide8.xml><?xml version="1.0" encoding="utf-8"?>
 <p:sld xmlns:a="http://schemas.openxmlformats.org/drawingml/2006/main" xmlns:r="http://schemas.openxmlformats.org/officeDocument/2006/relationships" xmlns:p="http://schemas.openxmlformats.org/presentationml/2006/main">
   <p:cSld>
     <p:spTree>
@@ -17888,7 +18816,7 @@
 </p:sld>
 </file>
 
-<file path=ppt/slides/slide8.xml><?xml version="1.0" encoding="utf-8"?>
+<file path=ppt/slides/slide9.xml><?xml version="1.0" encoding="utf-8"?>
 <p:sld xmlns:a="http://schemas.openxmlformats.org/drawingml/2006/main" xmlns:r="http://schemas.openxmlformats.org/officeDocument/2006/relationships" xmlns:p="http://schemas.openxmlformats.org/presentationml/2006/main">
   <p:cSld>
     <p:spTree>
@@ -22478,575 +23406,6 @@
 </p:sld>
 </file>
 
-<file path=ppt/slides/slide9.xml><?xml version="1.0" encoding="utf-8"?>
-<p:sld xmlns:a="http://schemas.openxmlformats.org/drawingml/2006/main" xmlns:r="http://schemas.openxmlformats.org/officeDocument/2006/relationships" xmlns:p="http://schemas.openxmlformats.org/presentationml/2006/main">
-  <p:cSld>
-    <p:spTree>
-      <p:nvGrpSpPr>
-        <p:cNvPr id="1" name=""/>
-        <p:cNvGrpSpPr/>
-        <p:nvPr/>
-      </p:nvGrpSpPr>
-      <p:grpSpPr>
-        <a:xfrm>
-          <a:off x="0" y="0"/>
-          <a:ext cx="0" cy="0"/>
-          <a:chOff x="0" y="0"/>
-          <a:chExt cx="0" cy="0"/>
-        </a:xfrm>
-      </p:grpSpPr>
-      <p:grpSp>
-        <p:nvGrpSpPr>
-          <p:cNvPr id="34" name="Gruppieren 33">
-            <a:extLst>
-              <a:ext uri="{FF2B5EF4-FFF2-40B4-BE49-F238E27FC236}">
-                <a16:creationId xmlns:a16="http://schemas.microsoft.com/office/drawing/2014/main" id="{0B706B9C-92B2-8E39-89A7-BAB46DFFC8A1}"/>
-              </a:ext>
-            </a:extLst>
-          </p:cNvPr>
-          <p:cNvGrpSpPr/>
-          <p:nvPr/>
-        </p:nvGrpSpPr>
-        <p:grpSpPr>
-          <a:xfrm>
-            <a:off x="739141" y="2855656"/>
-            <a:ext cx="3635585" cy="289983"/>
-            <a:chOff x="739141" y="3284008"/>
-            <a:chExt cx="3635585" cy="289983"/>
-          </a:xfrm>
-        </p:grpSpPr>
-        <p:grpSp>
-          <p:nvGrpSpPr>
-            <p:cNvPr id="35" name="Gruppieren 34">
-              <a:extLst>
-                <a:ext uri="{FF2B5EF4-FFF2-40B4-BE49-F238E27FC236}">
-                  <a16:creationId xmlns:a16="http://schemas.microsoft.com/office/drawing/2014/main" id="{30F67F38-2B70-5A80-A46F-31C332354269}"/>
-                </a:ext>
-              </a:extLst>
-            </p:cNvPr>
-            <p:cNvGrpSpPr/>
-            <p:nvPr/>
-          </p:nvGrpSpPr>
-          <p:grpSpPr>
-            <a:xfrm>
-              <a:off x="762001" y="3284008"/>
-              <a:ext cx="3589866" cy="289983"/>
-              <a:chOff x="2032000" y="2006599"/>
-              <a:chExt cx="6096000" cy="1117600"/>
-            </a:xfrm>
-          </p:grpSpPr>
-          <p:sp>
-            <p:nvSpPr>
-              <p:cNvPr id="45" name="Rechteck 44">
-                <a:extLst>
-                  <a:ext uri="{FF2B5EF4-FFF2-40B4-BE49-F238E27FC236}">
-                    <a16:creationId xmlns:a16="http://schemas.microsoft.com/office/drawing/2014/main" id="{D5B2440C-C987-A2DD-1ED9-3F1879B63FA2}"/>
-                  </a:ext>
-                </a:extLst>
-              </p:cNvPr>
-              <p:cNvSpPr/>
-              <p:nvPr/>
-            </p:nvSpPr>
-            <p:spPr>
-              <a:xfrm>
-                <a:off x="2032000" y="2006599"/>
-                <a:ext cx="6096000" cy="1117598"/>
-              </a:xfrm>
-              <a:prstGeom prst="rect">
-                <a:avLst/>
-              </a:prstGeom>
-              <a:solidFill>
-                <a:srgbClr val="D0CECE"/>
-              </a:solidFill>
-              <a:ln w="19050">
-                <a:solidFill>
-                  <a:schemeClr val="tx1"/>
-                </a:solidFill>
-                <a:prstDash val="solid"/>
-              </a:ln>
-            </p:spPr>
-            <p:style>
-              <a:lnRef idx="2">
-                <a:schemeClr val="accent1">
-                  <a:shade val="15000"/>
-                </a:schemeClr>
-              </a:lnRef>
-              <a:fillRef idx="1">
-                <a:schemeClr val="accent1"/>
-              </a:fillRef>
-              <a:effectRef idx="0">
-                <a:schemeClr val="accent1"/>
-              </a:effectRef>
-              <a:fontRef idx="minor">
-                <a:schemeClr val="lt1"/>
-              </a:fontRef>
-            </p:style>
-            <p:txBody>
-              <a:bodyPr rtlCol="0" anchor="ctr"/>
-              <a:lstStyle/>
-              <a:p>
-                <a:pPr algn="ctr"/>
-                <a:endParaRPr lang="de-DE"/>
-              </a:p>
-            </p:txBody>
-          </p:sp>
-          <p:sp>
-            <p:nvSpPr>
-              <p:cNvPr id="42" name="Rechteck 41">
-                <a:extLst>
-                  <a:ext uri="{FF2B5EF4-FFF2-40B4-BE49-F238E27FC236}">
-                    <a16:creationId xmlns:a16="http://schemas.microsoft.com/office/drawing/2014/main" id="{B2723C11-FCCF-ADB3-0897-DC89F1A018BB}"/>
-                  </a:ext>
-                </a:extLst>
-              </p:cNvPr>
-              <p:cNvSpPr/>
-              <p:nvPr/>
-            </p:nvSpPr>
-            <p:spPr>
-              <a:xfrm>
-                <a:off x="2032000" y="2006600"/>
-                <a:ext cx="6096000" cy="372533"/>
-              </a:xfrm>
-              <a:prstGeom prst="rect">
-                <a:avLst/>
-              </a:prstGeom>
-              <a:noFill/>
-              <a:ln>
-                <a:solidFill>
-                  <a:schemeClr val="tx1"/>
-                </a:solidFill>
-                <a:prstDash val="lgDash"/>
-              </a:ln>
-            </p:spPr>
-            <p:style>
-              <a:lnRef idx="2">
-                <a:schemeClr val="accent1">
-                  <a:shade val="15000"/>
-                </a:schemeClr>
-              </a:lnRef>
-              <a:fillRef idx="1">
-                <a:schemeClr val="accent1"/>
-              </a:fillRef>
-              <a:effectRef idx="0">
-                <a:schemeClr val="accent1"/>
-              </a:effectRef>
-              <a:fontRef idx="minor">
-                <a:schemeClr val="lt1"/>
-              </a:fontRef>
-            </p:style>
-            <p:txBody>
-              <a:bodyPr rtlCol="0" anchor="ctr"/>
-              <a:lstStyle/>
-              <a:p>
-                <a:pPr algn="ctr"/>
-                <a:endParaRPr lang="de-DE"/>
-              </a:p>
-            </p:txBody>
-          </p:sp>
-          <p:sp>
-            <p:nvSpPr>
-              <p:cNvPr id="43" name="Rechteck 42">
-                <a:extLst>
-                  <a:ext uri="{FF2B5EF4-FFF2-40B4-BE49-F238E27FC236}">
-                    <a16:creationId xmlns:a16="http://schemas.microsoft.com/office/drawing/2014/main" id="{5939D0D4-5103-5FF0-826C-77DE08C1CB88}"/>
-                  </a:ext>
-                </a:extLst>
-              </p:cNvPr>
-              <p:cNvSpPr/>
-              <p:nvPr/>
-            </p:nvSpPr>
-            <p:spPr>
-              <a:xfrm>
-                <a:off x="2032000" y="2379133"/>
-                <a:ext cx="6096000" cy="372533"/>
-              </a:xfrm>
-              <a:prstGeom prst="rect">
-                <a:avLst/>
-              </a:prstGeom>
-              <a:noFill/>
-              <a:ln>
-                <a:noFill/>
-                <a:prstDash val="lgDash"/>
-              </a:ln>
-            </p:spPr>
-            <p:style>
-              <a:lnRef idx="2">
-                <a:schemeClr val="accent1">
-                  <a:shade val="15000"/>
-                </a:schemeClr>
-              </a:lnRef>
-              <a:fillRef idx="1">
-                <a:schemeClr val="accent1"/>
-              </a:fillRef>
-              <a:effectRef idx="0">
-                <a:schemeClr val="accent1"/>
-              </a:effectRef>
-              <a:fontRef idx="minor">
-                <a:schemeClr val="lt1"/>
-              </a:fontRef>
-            </p:style>
-            <p:txBody>
-              <a:bodyPr rtlCol="0" anchor="ctr"/>
-              <a:lstStyle/>
-              <a:p>
-                <a:pPr algn="ctr"/>
-                <a:endParaRPr lang="de-DE"/>
-              </a:p>
-            </p:txBody>
-          </p:sp>
-          <p:sp>
-            <p:nvSpPr>
-              <p:cNvPr id="44" name="Rechteck 43">
-                <a:extLst>
-                  <a:ext uri="{FF2B5EF4-FFF2-40B4-BE49-F238E27FC236}">
-                    <a16:creationId xmlns:a16="http://schemas.microsoft.com/office/drawing/2014/main" id="{52851A60-9A18-36BD-6EA0-926F76F8371C}"/>
-                  </a:ext>
-                </a:extLst>
-              </p:cNvPr>
-              <p:cNvSpPr/>
-              <p:nvPr/>
-            </p:nvSpPr>
-            <p:spPr>
-              <a:xfrm>
-                <a:off x="2032000" y="2751666"/>
-                <a:ext cx="6096000" cy="372533"/>
-              </a:xfrm>
-              <a:prstGeom prst="rect">
-                <a:avLst/>
-              </a:prstGeom>
-              <a:noFill/>
-              <a:ln>
-                <a:solidFill>
-                  <a:schemeClr val="tx1"/>
-                </a:solidFill>
-                <a:prstDash val="lgDash"/>
-              </a:ln>
-            </p:spPr>
-            <p:style>
-              <a:lnRef idx="2">
-                <a:schemeClr val="accent1">
-                  <a:shade val="15000"/>
-                </a:schemeClr>
-              </a:lnRef>
-              <a:fillRef idx="1">
-                <a:schemeClr val="accent1"/>
-              </a:fillRef>
-              <a:effectRef idx="0">
-                <a:schemeClr val="accent1"/>
-              </a:effectRef>
-              <a:fontRef idx="minor">
-                <a:schemeClr val="lt1"/>
-              </a:fontRef>
-            </p:style>
-            <p:txBody>
-              <a:bodyPr rtlCol="0" anchor="ctr"/>
-              <a:lstStyle/>
-              <a:p>
-                <a:pPr algn="ctr"/>
-                <a:endParaRPr lang="de-DE"/>
-              </a:p>
-            </p:txBody>
-          </p:sp>
-        </p:grpSp>
-        <p:sp>
-          <p:nvSpPr>
-            <p:cNvPr id="36" name="Ellipse 35">
-              <a:extLst>
-                <a:ext uri="{FF2B5EF4-FFF2-40B4-BE49-F238E27FC236}">
-                  <a16:creationId xmlns:a16="http://schemas.microsoft.com/office/drawing/2014/main" id="{82545CBE-3C58-9DC3-95E6-EA4DD1109E43}"/>
-                </a:ext>
-              </a:extLst>
-            </p:cNvPr>
-            <p:cNvSpPr/>
-            <p:nvPr/>
-          </p:nvSpPr>
-          <p:spPr>
-            <a:xfrm>
-              <a:off x="4329007" y="3309478"/>
-              <a:ext cx="45719" cy="45719"/>
-            </a:xfrm>
-            <a:prstGeom prst="ellipse">
-              <a:avLst/>
-            </a:prstGeom>
-          </p:spPr>
-          <p:style>
-            <a:lnRef idx="2">
-              <a:schemeClr val="accent1">
-                <a:shade val="15000"/>
-              </a:schemeClr>
-            </a:lnRef>
-            <a:fillRef idx="1">
-              <a:schemeClr val="accent1"/>
-            </a:fillRef>
-            <a:effectRef idx="0">
-              <a:schemeClr val="accent1"/>
-            </a:effectRef>
-            <a:fontRef idx="minor">
-              <a:schemeClr val="lt1"/>
-            </a:fontRef>
-          </p:style>
-          <p:txBody>
-            <a:bodyPr rtlCol="0" anchor="ctr"/>
-            <a:lstStyle/>
-            <a:p>
-              <a:pPr algn="ctr"/>
-              <a:endParaRPr lang="de-DE"/>
-            </a:p>
-          </p:txBody>
-        </p:sp>
-        <p:sp>
-          <p:nvSpPr>
-            <p:cNvPr id="37" name="Ellipse 36">
-              <a:extLst>
-                <a:ext uri="{FF2B5EF4-FFF2-40B4-BE49-F238E27FC236}">
-                  <a16:creationId xmlns:a16="http://schemas.microsoft.com/office/drawing/2014/main" id="{756F5E7C-595C-BB40-D0D1-4D839BFF002A}"/>
-                </a:ext>
-              </a:extLst>
-            </p:cNvPr>
-            <p:cNvSpPr/>
-            <p:nvPr/>
-          </p:nvSpPr>
-          <p:spPr>
-            <a:xfrm>
-              <a:off x="4329007" y="3406139"/>
-              <a:ext cx="45719" cy="45719"/>
-            </a:xfrm>
-            <a:prstGeom prst="ellipse">
-              <a:avLst/>
-            </a:prstGeom>
-          </p:spPr>
-          <p:style>
-            <a:lnRef idx="2">
-              <a:schemeClr val="accent1">
-                <a:shade val="15000"/>
-              </a:schemeClr>
-            </a:lnRef>
-            <a:fillRef idx="1">
-              <a:schemeClr val="accent1"/>
-            </a:fillRef>
-            <a:effectRef idx="0">
-              <a:schemeClr val="accent1"/>
-            </a:effectRef>
-            <a:fontRef idx="minor">
-              <a:schemeClr val="lt1"/>
-            </a:fontRef>
-          </p:style>
-          <p:txBody>
-            <a:bodyPr rtlCol="0" anchor="ctr"/>
-            <a:lstStyle/>
-            <a:p>
-              <a:pPr algn="ctr"/>
-              <a:endParaRPr lang="de-DE"/>
-            </a:p>
-          </p:txBody>
-        </p:sp>
-        <p:sp>
-          <p:nvSpPr>
-            <p:cNvPr id="38" name="Ellipse 37">
-              <a:extLst>
-                <a:ext uri="{FF2B5EF4-FFF2-40B4-BE49-F238E27FC236}">
-                  <a16:creationId xmlns:a16="http://schemas.microsoft.com/office/drawing/2014/main" id="{4A6920F2-31EC-6EF8-6D7A-069B58D6F4A2}"/>
-                </a:ext>
-              </a:extLst>
-            </p:cNvPr>
-            <p:cNvSpPr/>
-            <p:nvPr/>
-          </p:nvSpPr>
-          <p:spPr>
-            <a:xfrm>
-              <a:off x="4329007" y="3502800"/>
-              <a:ext cx="45719" cy="45719"/>
-            </a:xfrm>
-            <a:prstGeom prst="ellipse">
-              <a:avLst/>
-            </a:prstGeom>
-          </p:spPr>
-          <p:style>
-            <a:lnRef idx="2">
-              <a:schemeClr val="accent1">
-                <a:shade val="15000"/>
-              </a:schemeClr>
-            </a:lnRef>
-            <a:fillRef idx="1">
-              <a:schemeClr val="accent1"/>
-            </a:fillRef>
-            <a:effectRef idx="0">
-              <a:schemeClr val="accent1"/>
-            </a:effectRef>
-            <a:fontRef idx="minor">
-              <a:schemeClr val="lt1"/>
-            </a:fontRef>
-          </p:style>
-          <p:txBody>
-            <a:bodyPr rtlCol="0" anchor="ctr"/>
-            <a:lstStyle/>
-            <a:p>
-              <a:pPr algn="ctr"/>
-              <a:endParaRPr lang="de-DE"/>
-            </a:p>
-          </p:txBody>
-        </p:sp>
-        <p:sp>
-          <p:nvSpPr>
-            <p:cNvPr id="39" name="Ellipse 38">
-              <a:extLst>
-                <a:ext uri="{FF2B5EF4-FFF2-40B4-BE49-F238E27FC236}">
-                  <a16:creationId xmlns:a16="http://schemas.microsoft.com/office/drawing/2014/main" id="{27C1C45E-FAC8-450E-B4BA-6D9B99A878B8}"/>
-                </a:ext>
-              </a:extLst>
-            </p:cNvPr>
-            <p:cNvSpPr/>
-            <p:nvPr/>
-          </p:nvSpPr>
-          <p:spPr>
-            <a:xfrm>
-              <a:off x="739141" y="3309478"/>
-              <a:ext cx="45719" cy="45719"/>
-            </a:xfrm>
-            <a:prstGeom prst="ellipse">
-              <a:avLst/>
-            </a:prstGeom>
-            <a:solidFill>
-              <a:schemeClr val="accent2"/>
-            </a:solidFill>
-          </p:spPr>
-          <p:style>
-            <a:lnRef idx="2">
-              <a:schemeClr val="accent1">
-                <a:shade val="15000"/>
-              </a:schemeClr>
-            </a:lnRef>
-            <a:fillRef idx="1">
-              <a:schemeClr val="accent1"/>
-            </a:fillRef>
-            <a:effectRef idx="0">
-              <a:schemeClr val="accent1"/>
-            </a:effectRef>
-            <a:fontRef idx="minor">
-              <a:schemeClr val="lt1"/>
-            </a:fontRef>
-          </p:style>
-          <p:txBody>
-            <a:bodyPr rtlCol="0" anchor="ctr"/>
-            <a:lstStyle/>
-            <a:p>
-              <a:pPr algn="ctr"/>
-              <a:endParaRPr lang="de-DE"/>
-            </a:p>
-          </p:txBody>
-        </p:sp>
-        <p:sp>
-          <p:nvSpPr>
-            <p:cNvPr id="40" name="Ellipse 39">
-              <a:extLst>
-                <a:ext uri="{FF2B5EF4-FFF2-40B4-BE49-F238E27FC236}">
-                  <a16:creationId xmlns:a16="http://schemas.microsoft.com/office/drawing/2014/main" id="{C2249620-BE71-87BA-C1BB-6F76542605E7}"/>
-                </a:ext>
-              </a:extLst>
-            </p:cNvPr>
-            <p:cNvSpPr/>
-            <p:nvPr/>
-          </p:nvSpPr>
-          <p:spPr>
-            <a:xfrm>
-              <a:off x="739141" y="3407921"/>
-              <a:ext cx="45719" cy="45719"/>
-            </a:xfrm>
-            <a:prstGeom prst="ellipse">
-              <a:avLst/>
-            </a:prstGeom>
-            <a:solidFill>
-              <a:schemeClr val="accent2"/>
-            </a:solidFill>
-          </p:spPr>
-          <p:style>
-            <a:lnRef idx="2">
-              <a:schemeClr val="accent1">
-                <a:shade val="15000"/>
-              </a:schemeClr>
-            </a:lnRef>
-            <a:fillRef idx="1">
-              <a:schemeClr val="accent1"/>
-            </a:fillRef>
-            <a:effectRef idx="0">
-              <a:schemeClr val="accent1"/>
-            </a:effectRef>
-            <a:fontRef idx="minor">
-              <a:schemeClr val="lt1"/>
-            </a:fontRef>
-          </p:style>
-          <p:txBody>
-            <a:bodyPr rtlCol="0" anchor="ctr"/>
-            <a:lstStyle/>
-            <a:p>
-              <a:pPr algn="ctr"/>
-              <a:endParaRPr lang="de-DE"/>
-            </a:p>
-          </p:txBody>
-        </p:sp>
-        <p:sp>
-          <p:nvSpPr>
-            <p:cNvPr id="41" name="Ellipse 40">
-              <a:extLst>
-                <a:ext uri="{FF2B5EF4-FFF2-40B4-BE49-F238E27FC236}">
-                  <a16:creationId xmlns:a16="http://schemas.microsoft.com/office/drawing/2014/main" id="{D027918D-A3CE-F74F-91E1-C7EAEC46BB23}"/>
-                </a:ext>
-              </a:extLst>
-            </p:cNvPr>
-            <p:cNvSpPr/>
-            <p:nvPr/>
-          </p:nvSpPr>
-          <p:spPr>
-            <a:xfrm>
-              <a:off x="739141" y="3498019"/>
-              <a:ext cx="45719" cy="45719"/>
-            </a:xfrm>
-            <a:prstGeom prst="ellipse">
-              <a:avLst/>
-            </a:prstGeom>
-            <a:solidFill>
-              <a:schemeClr val="accent2"/>
-            </a:solidFill>
-          </p:spPr>
-          <p:style>
-            <a:lnRef idx="2">
-              <a:schemeClr val="accent1">
-                <a:shade val="15000"/>
-              </a:schemeClr>
-            </a:lnRef>
-            <a:fillRef idx="1">
-              <a:schemeClr val="accent1"/>
-            </a:fillRef>
-            <a:effectRef idx="0">
-              <a:schemeClr val="accent1"/>
-            </a:effectRef>
-            <a:fontRef idx="minor">
-              <a:schemeClr val="lt1"/>
-            </a:fontRef>
-          </p:style>
-          <p:txBody>
-            <a:bodyPr rtlCol="0" anchor="ctr"/>
-            <a:lstStyle/>
-            <a:p>
-              <a:pPr algn="ctr"/>
-              <a:endParaRPr lang="de-DE"/>
-            </a:p>
-          </p:txBody>
-        </p:sp>
-      </p:grpSp>
-    </p:spTree>
-    <p:extLst>
-      <p:ext uri="{BB962C8B-B14F-4D97-AF65-F5344CB8AC3E}">
-        <p14:creationId xmlns:p14="http://schemas.microsoft.com/office/powerpoint/2010/main" val="3294407545"/>
-      </p:ext>
-    </p:extLst>
-  </p:cSld>
-  <p:clrMapOvr>
-    <a:masterClrMapping/>
-  </p:clrMapOvr>
-</p:sld>
-</file>
-
 <file path=ppt/theme/theme1.xml><?xml version="1.0" encoding="utf-8"?>
 <a:theme xmlns:a="http://schemas.openxmlformats.org/drawingml/2006/main" name="Office">
   <a:themeElements>

</xml_diff>

<commit_message>
Very first logic wrt. road topologies in nuxmv.
</commit_message>
<xml_diff>
--- a/examples/UrbanTopologies.pptx
+++ b/examples/UrbanTopologies.pptx
@@ -4,6 +4,9 @@
   <p:sldMasterIdLst>
     <p:sldMasterId id="2147483648" r:id="rId1"/>
   </p:sldMasterIdLst>
+  <p:notesMasterIdLst>
+    <p:notesMasterId r:id="rId13"/>
+  </p:notesMasterIdLst>
   <p:sldIdLst>
     <p:sldId id="266" r:id="rId2"/>
     <p:sldId id="265" r:id="rId3"/>
@@ -120,6 +123,439 @@
     </p:ext>
   </p:extLst>
 </p:presentation>
+</file>
+
+<file path=ppt/notesMasters/notesMaster1.xml><?xml version="1.0" encoding="utf-8"?>
+<p:notesMaster xmlns:a="http://schemas.openxmlformats.org/drawingml/2006/main" xmlns:r="http://schemas.openxmlformats.org/officeDocument/2006/relationships" xmlns:p="http://schemas.openxmlformats.org/presentationml/2006/main">
+  <p:cSld>
+    <p:bg>
+      <p:bgRef idx="1001">
+        <a:schemeClr val="bg1"/>
+      </p:bgRef>
+    </p:bg>
+    <p:spTree>
+      <p:nvGrpSpPr>
+        <p:cNvPr id="1" name=""/>
+        <p:cNvGrpSpPr/>
+        <p:nvPr/>
+      </p:nvGrpSpPr>
+      <p:grpSpPr>
+        <a:xfrm>
+          <a:off x="0" y="0"/>
+          <a:ext cx="0" cy="0"/>
+          <a:chOff x="0" y="0"/>
+          <a:chExt cx="0" cy="0"/>
+        </a:xfrm>
+      </p:grpSpPr>
+      <p:sp>
+        <p:nvSpPr>
+          <p:cNvPr id="2" name="Kopfzeilenplatzhalter 1"/>
+          <p:cNvSpPr>
+            <a:spLocks noGrp="1"/>
+          </p:cNvSpPr>
+          <p:nvPr>
+            <p:ph type="hdr" sz="quarter"/>
+          </p:nvPr>
+        </p:nvSpPr>
+        <p:spPr>
+          <a:xfrm>
+            <a:off x="0" y="0"/>
+            <a:ext cx="2971800" cy="458788"/>
+          </a:xfrm>
+          <a:prstGeom prst="rect">
+            <a:avLst/>
+          </a:prstGeom>
+        </p:spPr>
+        <p:txBody>
+          <a:bodyPr vert="horz" lIns="91440" tIns="45720" rIns="91440" bIns="45720" rtlCol="0"/>
+          <a:lstStyle>
+            <a:lvl1pPr algn="l">
+              <a:defRPr sz="1200"/>
+            </a:lvl1pPr>
+          </a:lstStyle>
+          <a:p>
+            <a:endParaRPr lang="de-DE"/>
+          </a:p>
+        </p:txBody>
+      </p:sp>
+      <p:sp>
+        <p:nvSpPr>
+          <p:cNvPr id="3" name="Datumsplatzhalter 2"/>
+          <p:cNvSpPr>
+            <a:spLocks noGrp="1"/>
+          </p:cNvSpPr>
+          <p:nvPr>
+            <p:ph type="dt" idx="1"/>
+          </p:nvPr>
+        </p:nvSpPr>
+        <p:spPr>
+          <a:xfrm>
+            <a:off x="3884613" y="0"/>
+            <a:ext cx="2971800" cy="458788"/>
+          </a:xfrm>
+          <a:prstGeom prst="rect">
+            <a:avLst/>
+          </a:prstGeom>
+        </p:spPr>
+        <p:txBody>
+          <a:bodyPr vert="horz" lIns="91440" tIns="45720" rIns="91440" bIns="45720" rtlCol="0"/>
+          <a:lstStyle>
+            <a:lvl1pPr algn="r">
+              <a:defRPr sz="1200"/>
+            </a:lvl1pPr>
+          </a:lstStyle>
+          <a:p>
+            <a:fld id="{6C57E5E1-517F-429D-81ED-272A083D513A}" type="datetimeFigureOut">
+              <a:rPr lang="de-DE" smtClean="0"/>
+              <a:t>12.02.2025</a:t>
+            </a:fld>
+            <a:endParaRPr lang="de-DE"/>
+          </a:p>
+        </p:txBody>
+      </p:sp>
+      <p:sp>
+        <p:nvSpPr>
+          <p:cNvPr id="4" name="Folienbildplatzhalter 3"/>
+          <p:cNvSpPr>
+            <a:spLocks noGrp="1" noRot="1" noChangeAspect="1"/>
+          </p:cNvSpPr>
+          <p:nvPr>
+            <p:ph type="sldImg" idx="2"/>
+          </p:nvPr>
+        </p:nvSpPr>
+        <p:spPr>
+          <a:xfrm>
+            <a:off x="685800" y="1143000"/>
+            <a:ext cx="5486400" cy="3086100"/>
+          </a:xfrm>
+          <a:prstGeom prst="rect">
+            <a:avLst/>
+          </a:prstGeom>
+          <a:noFill/>
+          <a:ln w="12700">
+            <a:solidFill>
+              <a:prstClr val="black"/>
+            </a:solidFill>
+          </a:ln>
+        </p:spPr>
+        <p:txBody>
+          <a:bodyPr vert="horz" lIns="91440" tIns="45720" rIns="91440" bIns="45720" rtlCol="0" anchor="ctr"/>
+          <a:lstStyle/>
+          <a:p>
+            <a:endParaRPr lang="de-DE"/>
+          </a:p>
+        </p:txBody>
+      </p:sp>
+      <p:sp>
+        <p:nvSpPr>
+          <p:cNvPr id="5" name="Notizenplatzhalter 4"/>
+          <p:cNvSpPr>
+            <a:spLocks noGrp="1"/>
+          </p:cNvSpPr>
+          <p:nvPr>
+            <p:ph type="body" sz="quarter" idx="3"/>
+          </p:nvPr>
+        </p:nvSpPr>
+        <p:spPr>
+          <a:xfrm>
+            <a:off x="685800" y="4400550"/>
+            <a:ext cx="5486400" cy="3600450"/>
+          </a:xfrm>
+          <a:prstGeom prst="rect">
+            <a:avLst/>
+          </a:prstGeom>
+        </p:spPr>
+        <p:txBody>
+          <a:bodyPr vert="horz" lIns="91440" tIns="45720" rIns="91440" bIns="45720" rtlCol="0"/>
+          <a:lstStyle/>
+          <a:p>
+            <a:pPr lvl="0"/>
+            <a:r>
+              <a:rPr lang="de-DE"/>
+              <a:t>Mastertextformat bearbeiten</a:t>
+            </a:r>
+          </a:p>
+          <a:p>
+            <a:pPr lvl="1"/>
+            <a:r>
+              <a:rPr lang="de-DE"/>
+              <a:t>Zweite Ebene</a:t>
+            </a:r>
+          </a:p>
+          <a:p>
+            <a:pPr lvl="2"/>
+            <a:r>
+              <a:rPr lang="de-DE"/>
+              <a:t>Dritte Ebene</a:t>
+            </a:r>
+          </a:p>
+          <a:p>
+            <a:pPr lvl="3"/>
+            <a:r>
+              <a:rPr lang="de-DE"/>
+              <a:t>Vierte Ebene</a:t>
+            </a:r>
+          </a:p>
+          <a:p>
+            <a:pPr lvl="4"/>
+            <a:r>
+              <a:rPr lang="de-DE"/>
+              <a:t>Fünfte Ebene</a:t>
+            </a:r>
+          </a:p>
+        </p:txBody>
+      </p:sp>
+      <p:sp>
+        <p:nvSpPr>
+          <p:cNvPr id="6" name="Fußzeilenplatzhalter 5"/>
+          <p:cNvSpPr>
+            <a:spLocks noGrp="1"/>
+          </p:cNvSpPr>
+          <p:nvPr>
+            <p:ph type="ftr" sz="quarter" idx="4"/>
+          </p:nvPr>
+        </p:nvSpPr>
+        <p:spPr>
+          <a:xfrm>
+            <a:off x="0" y="8685213"/>
+            <a:ext cx="2971800" cy="458787"/>
+          </a:xfrm>
+          <a:prstGeom prst="rect">
+            <a:avLst/>
+          </a:prstGeom>
+        </p:spPr>
+        <p:txBody>
+          <a:bodyPr vert="horz" lIns="91440" tIns="45720" rIns="91440" bIns="45720" rtlCol="0" anchor="b"/>
+          <a:lstStyle>
+            <a:lvl1pPr algn="l">
+              <a:defRPr sz="1200"/>
+            </a:lvl1pPr>
+          </a:lstStyle>
+          <a:p>
+            <a:endParaRPr lang="de-DE"/>
+          </a:p>
+        </p:txBody>
+      </p:sp>
+      <p:sp>
+        <p:nvSpPr>
+          <p:cNvPr id="7" name="Foliennummernplatzhalter 6"/>
+          <p:cNvSpPr>
+            <a:spLocks noGrp="1"/>
+          </p:cNvSpPr>
+          <p:nvPr>
+            <p:ph type="sldNum" sz="quarter" idx="5"/>
+          </p:nvPr>
+        </p:nvSpPr>
+        <p:spPr>
+          <a:xfrm>
+            <a:off x="3884613" y="8685213"/>
+            <a:ext cx="2971800" cy="458787"/>
+          </a:xfrm>
+          <a:prstGeom prst="rect">
+            <a:avLst/>
+          </a:prstGeom>
+        </p:spPr>
+        <p:txBody>
+          <a:bodyPr vert="horz" lIns="91440" tIns="45720" rIns="91440" bIns="45720" rtlCol="0" anchor="b"/>
+          <a:lstStyle>
+            <a:lvl1pPr algn="r">
+              <a:defRPr sz="1200"/>
+            </a:lvl1pPr>
+          </a:lstStyle>
+          <a:p>
+            <a:fld id="{48EE41BD-4819-44BC-B5FD-3CE7342A7368}" type="slidenum">
+              <a:rPr lang="de-DE" smtClean="0"/>
+              <a:t>‹Nr.›</a:t>
+            </a:fld>
+            <a:endParaRPr lang="de-DE"/>
+          </a:p>
+        </p:txBody>
+      </p:sp>
+    </p:spTree>
+    <p:extLst>
+      <p:ext uri="{BB962C8B-B14F-4D97-AF65-F5344CB8AC3E}">
+        <p14:creationId xmlns:p14="http://schemas.microsoft.com/office/powerpoint/2010/main" val="3709288486"/>
+      </p:ext>
+    </p:extLst>
+  </p:cSld>
+  <p:clrMap bg1="lt1" tx1="dk1" bg2="lt2" tx2="dk2" accent1="accent1" accent2="accent2" accent3="accent3" accent4="accent4" accent5="accent5" accent6="accent6" hlink="hlink" folHlink="folHlink"/>
+  <p:notesStyle>
+    <a:lvl1pPr marL="0" algn="l" defTabSz="914400" rtl="0" eaLnBrk="1" latinLnBrk="0" hangingPunct="1">
+      <a:defRPr sz="1200" kern="1200">
+        <a:solidFill>
+          <a:schemeClr val="tx1"/>
+        </a:solidFill>
+        <a:latin typeface="+mn-lt"/>
+        <a:ea typeface="+mn-ea"/>
+        <a:cs typeface="+mn-cs"/>
+      </a:defRPr>
+    </a:lvl1pPr>
+    <a:lvl2pPr marL="457200" algn="l" defTabSz="914400" rtl="0" eaLnBrk="1" latinLnBrk="0" hangingPunct="1">
+      <a:defRPr sz="1200" kern="1200">
+        <a:solidFill>
+          <a:schemeClr val="tx1"/>
+        </a:solidFill>
+        <a:latin typeface="+mn-lt"/>
+        <a:ea typeface="+mn-ea"/>
+        <a:cs typeface="+mn-cs"/>
+      </a:defRPr>
+    </a:lvl2pPr>
+    <a:lvl3pPr marL="914400" algn="l" defTabSz="914400" rtl="0" eaLnBrk="1" latinLnBrk="0" hangingPunct="1">
+      <a:defRPr sz="1200" kern="1200">
+        <a:solidFill>
+          <a:schemeClr val="tx1"/>
+        </a:solidFill>
+        <a:latin typeface="+mn-lt"/>
+        <a:ea typeface="+mn-ea"/>
+        <a:cs typeface="+mn-cs"/>
+      </a:defRPr>
+    </a:lvl3pPr>
+    <a:lvl4pPr marL="1371600" algn="l" defTabSz="914400" rtl="0" eaLnBrk="1" latinLnBrk="0" hangingPunct="1">
+      <a:defRPr sz="1200" kern="1200">
+        <a:solidFill>
+          <a:schemeClr val="tx1"/>
+        </a:solidFill>
+        <a:latin typeface="+mn-lt"/>
+        <a:ea typeface="+mn-ea"/>
+        <a:cs typeface="+mn-cs"/>
+      </a:defRPr>
+    </a:lvl4pPr>
+    <a:lvl5pPr marL="1828800" algn="l" defTabSz="914400" rtl="0" eaLnBrk="1" latinLnBrk="0" hangingPunct="1">
+      <a:defRPr sz="1200" kern="1200">
+        <a:solidFill>
+          <a:schemeClr val="tx1"/>
+        </a:solidFill>
+        <a:latin typeface="+mn-lt"/>
+        <a:ea typeface="+mn-ea"/>
+        <a:cs typeface="+mn-cs"/>
+      </a:defRPr>
+    </a:lvl5pPr>
+    <a:lvl6pPr marL="2286000" algn="l" defTabSz="914400" rtl="0" eaLnBrk="1" latinLnBrk="0" hangingPunct="1">
+      <a:defRPr sz="1200" kern="1200">
+        <a:solidFill>
+          <a:schemeClr val="tx1"/>
+        </a:solidFill>
+        <a:latin typeface="+mn-lt"/>
+        <a:ea typeface="+mn-ea"/>
+        <a:cs typeface="+mn-cs"/>
+      </a:defRPr>
+    </a:lvl6pPr>
+    <a:lvl7pPr marL="2743200" algn="l" defTabSz="914400" rtl="0" eaLnBrk="1" latinLnBrk="0" hangingPunct="1">
+      <a:defRPr sz="1200" kern="1200">
+        <a:solidFill>
+          <a:schemeClr val="tx1"/>
+        </a:solidFill>
+        <a:latin typeface="+mn-lt"/>
+        <a:ea typeface="+mn-ea"/>
+        <a:cs typeface="+mn-cs"/>
+      </a:defRPr>
+    </a:lvl7pPr>
+    <a:lvl8pPr marL="3200400" algn="l" defTabSz="914400" rtl="0" eaLnBrk="1" latinLnBrk="0" hangingPunct="1">
+      <a:defRPr sz="1200" kern="1200">
+        <a:solidFill>
+          <a:schemeClr val="tx1"/>
+        </a:solidFill>
+        <a:latin typeface="+mn-lt"/>
+        <a:ea typeface="+mn-ea"/>
+        <a:cs typeface="+mn-cs"/>
+      </a:defRPr>
+    </a:lvl8pPr>
+    <a:lvl9pPr marL="3657600" algn="l" defTabSz="914400" rtl="0" eaLnBrk="1" latinLnBrk="0" hangingPunct="1">
+      <a:defRPr sz="1200" kern="1200">
+        <a:solidFill>
+          <a:schemeClr val="tx1"/>
+        </a:solidFill>
+        <a:latin typeface="+mn-lt"/>
+        <a:ea typeface="+mn-ea"/>
+        <a:cs typeface="+mn-cs"/>
+      </a:defRPr>
+    </a:lvl9pPr>
+  </p:notesStyle>
+</p:notesMaster>
+</file>
+
+<file path=ppt/notesSlides/notesSlide1.xml><?xml version="1.0" encoding="utf-8"?>
+<p:notes xmlns:a="http://schemas.openxmlformats.org/drawingml/2006/main" xmlns:r="http://schemas.openxmlformats.org/officeDocument/2006/relationships" xmlns:p="http://schemas.openxmlformats.org/presentationml/2006/main">
+  <p:cSld>
+    <p:spTree>
+      <p:nvGrpSpPr>
+        <p:cNvPr id="1" name=""/>
+        <p:cNvGrpSpPr/>
+        <p:nvPr/>
+      </p:nvGrpSpPr>
+      <p:grpSpPr>
+        <a:xfrm>
+          <a:off x="0" y="0"/>
+          <a:ext cx="0" cy="0"/>
+          <a:chOff x="0" y="0"/>
+          <a:chExt cx="0" cy="0"/>
+        </a:xfrm>
+      </p:grpSpPr>
+      <p:sp>
+        <p:nvSpPr>
+          <p:cNvPr id="2" name="Folienbildplatzhalter 1"/>
+          <p:cNvSpPr>
+            <a:spLocks noGrp="1" noRot="1" noChangeAspect="1"/>
+          </p:cNvSpPr>
+          <p:nvPr>
+            <p:ph type="sldImg"/>
+          </p:nvPr>
+        </p:nvSpPr>
+        <p:spPr/>
+      </p:sp>
+      <p:sp>
+        <p:nvSpPr>
+          <p:cNvPr id="3" name="Notizenplatzhalter 2"/>
+          <p:cNvSpPr>
+            <a:spLocks noGrp="1"/>
+          </p:cNvSpPr>
+          <p:nvPr>
+            <p:ph type="body" idx="1"/>
+          </p:nvPr>
+        </p:nvSpPr>
+        <p:spPr/>
+        <p:txBody>
+          <a:bodyPr/>
+          <a:lstStyle/>
+          <a:p>
+            <a:endParaRPr lang="de-DE" dirty="0"/>
+          </a:p>
+        </p:txBody>
+      </p:sp>
+      <p:sp>
+        <p:nvSpPr>
+          <p:cNvPr id="4" name="Foliennummernplatzhalter 3"/>
+          <p:cNvSpPr>
+            <a:spLocks noGrp="1"/>
+          </p:cNvSpPr>
+          <p:nvPr>
+            <p:ph type="sldNum" sz="quarter" idx="5"/>
+          </p:nvPr>
+        </p:nvSpPr>
+        <p:spPr/>
+        <p:txBody>
+          <a:bodyPr/>
+          <a:lstStyle/>
+          <a:p>
+            <a:fld id="{48EE41BD-4819-44BC-B5FD-3CE7342A7368}" type="slidenum">
+              <a:rPr lang="de-DE" smtClean="0"/>
+              <a:t>11</a:t>
+            </a:fld>
+            <a:endParaRPr lang="de-DE"/>
+          </a:p>
+        </p:txBody>
+      </p:sp>
+    </p:spTree>
+    <p:extLst>
+      <p:ext uri="{BB962C8B-B14F-4D97-AF65-F5344CB8AC3E}">
+        <p14:creationId xmlns:p14="http://schemas.microsoft.com/office/powerpoint/2010/main" val="2416147707"/>
+      </p:ext>
+    </p:extLst>
+  </p:cSld>
+  <p:clrMapOvr>
+    <a:masterClrMapping/>
+  </p:clrMapOvr>
+</p:notes>
 </file>
 
 <file path=ppt/slideLayouts/slideLayout1.xml><?xml version="1.0" encoding="utf-8"?>
@@ -269,7 +705,7 @@
           <a:p>
             <a:fld id="{F3EB2857-2321-4C4D-8D06-77DF79DF910F}" type="datetimeFigureOut">
               <a:rPr lang="de-DE" smtClean="0"/>
-              <a:t>29.01.2025</a:t>
+              <a:t>12.02.2025</a:t>
             </a:fld>
             <a:endParaRPr lang="de-DE"/>
           </a:p>
@@ -467,7 +903,7 @@
           <a:p>
             <a:fld id="{F3EB2857-2321-4C4D-8D06-77DF79DF910F}" type="datetimeFigureOut">
               <a:rPr lang="de-DE" smtClean="0"/>
-              <a:t>29.01.2025</a:t>
+              <a:t>12.02.2025</a:t>
             </a:fld>
             <a:endParaRPr lang="de-DE"/>
           </a:p>
@@ -675,7 +1111,7 @@
           <a:p>
             <a:fld id="{F3EB2857-2321-4C4D-8D06-77DF79DF910F}" type="datetimeFigureOut">
               <a:rPr lang="de-DE" smtClean="0"/>
-              <a:t>29.01.2025</a:t>
+              <a:t>12.02.2025</a:t>
             </a:fld>
             <a:endParaRPr lang="de-DE"/>
           </a:p>
@@ -873,7 +1309,7 @@
           <a:p>
             <a:fld id="{F3EB2857-2321-4C4D-8D06-77DF79DF910F}" type="datetimeFigureOut">
               <a:rPr lang="de-DE" smtClean="0"/>
-              <a:t>29.01.2025</a:t>
+              <a:t>12.02.2025</a:t>
             </a:fld>
             <a:endParaRPr lang="de-DE"/>
           </a:p>
@@ -1148,7 +1584,7 @@
           <a:p>
             <a:fld id="{F3EB2857-2321-4C4D-8D06-77DF79DF910F}" type="datetimeFigureOut">
               <a:rPr lang="de-DE" smtClean="0"/>
-              <a:t>29.01.2025</a:t>
+              <a:t>12.02.2025</a:t>
             </a:fld>
             <a:endParaRPr lang="de-DE"/>
           </a:p>
@@ -1413,7 +1849,7 @@
           <a:p>
             <a:fld id="{F3EB2857-2321-4C4D-8D06-77DF79DF910F}" type="datetimeFigureOut">
               <a:rPr lang="de-DE" smtClean="0"/>
-              <a:t>29.01.2025</a:t>
+              <a:t>12.02.2025</a:t>
             </a:fld>
             <a:endParaRPr lang="de-DE"/>
           </a:p>
@@ -1825,7 +2261,7 @@
           <a:p>
             <a:fld id="{F3EB2857-2321-4C4D-8D06-77DF79DF910F}" type="datetimeFigureOut">
               <a:rPr lang="de-DE" smtClean="0"/>
-              <a:t>29.01.2025</a:t>
+              <a:t>12.02.2025</a:t>
             </a:fld>
             <a:endParaRPr lang="de-DE"/>
           </a:p>
@@ -1966,7 +2402,7 @@
           <a:p>
             <a:fld id="{F3EB2857-2321-4C4D-8D06-77DF79DF910F}" type="datetimeFigureOut">
               <a:rPr lang="de-DE" smtClean="0"/>
-              <a:t>29.01.2025</a:t>
+              <a:t>12.02.2025</a:t>
             </a:fld>
             <a:endParaRPr lang="de-DE"/>
           </a:p>
@@ -2079,7 +2515,7 @@
           <a:p>
             <a:fld id="{F3EB2857-2321-4C4D-8D06-77DF79DF910F}" type="datetimeFigureOut">
               <a:rPr lang="de-DE" smtClean="0"/>
-              <a:t>29.01.2025</a:t>
+              <a:t>12.02.2025</a:t>
             </a:fld>
             <a:endParaRPr lang="de-DE"/>
           </a:p>
@@ -2390,7 +2826,7 @@
           <a:p>
             <a:fld id="{F3EB2857-2321-4C4D-8D06-77DF79DF910F}" type="datetimeFigureOut">
               <a:rPr lang="de-DE" smtClean="0"/>
-              <a:t>29.01.2025</a:t>
+              <a:t>12.02.2025</a:t>
             </a:fld>
             <a:endParaRPr lang="de-DE"/>
           </a:p>
@@ -2678,7 +3114,7 @@
           <a:p>
             <a:fld id="{F3EB2857-2321-4C4D-8D06-77DF79DF910F}" type="datetimeFigureOut">
               <a:rPr lang="de-DE" smtClean="0"/>
-              <a:t>29.01.2025</a:t>
+              <a:t>12.02.2025</a:t>
             </a:fld>
             <a:endParaRPr lang="de-DE"/>
           </a:p>
@@ -2919,7 +3355,7 @@
           <a:p>
             <a:fld id="{F3EB2857-2321-4C4D-8D06-77DF79DF910F}" type="datetimeFigureOut">
               <a:rPr lang="de-DE" smtClean="0"/>
-              <a:t>29.01.2025</a:t>
+              <a:t>12.02.2025</a:t>
             </a:fld>
             <a:endParaRPr lang="de-DE"/>
           </a:p>
@@ -8168,7 +8604,7 @@
         </p:nvGrpSpPr>
         <p:grpSpPr>
           <a:xfrm>
-            <a:off x="739141" y="2855656"/>
+            <a:off x="1454778" y="4007014"/>
             <a:ext cx="3635585" cy="289983"/>
             <a:chOff x="739141" y="3284008"/>
             <a:chExt cx="3635585" cy="289983"/>
@@ -8409,52 +8845,6 @@
         </p:grpSp>
         <p:sp>
           <p:nvSpPr>
-            <p:cNvPr id="36" name="Ellipse 35">
-              <a:extLst>
-                <a:ext uri="{FF2B5EF4-FFF2-40B4-BE49-F238E27FC236}">
-                  <a16:creationId xmlns:a16="http://schemas.microsoft.com/office/drawing/2014/main" id="{82545CBE-3C58-9DC3-95E6-EA4DD1109E43}"/>
-                </a:ext>
-              </a:extLst>
-            </p:cNvPr>
-            <p:cNvSpPr/>
-            <p:nvPr/>
-          </p:nvSpPr>
-          <p:spPr>
-            <a:xfrm>
-              <a:off x="4329007" y="3309478"/>
-              <a:ext cx="45719" cy="45719"/>
-            </a:xfrm>
-            <a:prstGeom prst="ellipse">
-              <a:avLst/>
-            </a:prstGeom>
-          </p:spPr>
-          <p:style>
-            <a:lnRef idx="2">
-              <a:schemeClr val="accent1">
-                <a:shade val="15000"/>
-              </a:schemeClr>
-            </a:lnRef>
-            <a:fillRef idx="1">
-              <a:schemeClr val="accent1"/>
-            </a:fillRef>
-            <a:effectRef idx="0">
-              <a:schemeClr val="accent1"/>
-            </a:effectRef>
-            <a:fontRef idx="minor">
-              <a:schemeClr val="lt1"/>
-            </a:fontRef>
-          </p:style>
-          <p:txBody>
-            <a:bodyPr rtlCol="0" anchor="ctr"/>
-            <a:lstStyle/>
-            <a:p>
-              <a:pPr algn="ctr"/>
-              <a:endParaRPr lang="de-DE"/>
-            </a:p>
-          </p:txBody>
-        </p:sp>
-        <p:sp>
-          <p:nvSpPr>
             <p:cNvPr id="37" name="Ellipse 36">
               <a:extLst>
                 <a:ext uri="{FF2B5EF4-FFF2-40B4-BE49-F238E27FC236}">
@@ -8473,101 +8863,6 @@
             <a:prstGeom prst="ellipse">
               <a:avLst/>
             </a:prstGeom>
-          </p:spPr>
-          <p:style>
-            <a:lnRef idx="2">
-              <a:schemeClr val="accent1">
-                <a:shade val="15000"/>
-              </a:schemeClr>
-            </a:lnRef>
-            <a:fillRef idx="1">
-              <a:schemeClr val="accent1"/>
-            </a:fillRef>
-            <a:effectRef idx="0">
-              <a:schemeClr val="accent1"/>
-            </a:effectRef>
-            <a:fontRef idx="minor">
-              <a:schemeClr val="lt1"/>
-            </a:fontRef>
-          </p:style>
-          <p:txBody>
-            <a:bodyPr rtlCol="0" anchor="ctr"/>
-            <a:lstStyle/>
-            <a:p>
-              <a:pPr algn="ctr"/>
-              <a:endParaRPr lang="de-DE"/>
-            </a:p>
-          </p:txBody>
-        </p:sp>
-        <p:sp>
-          <p:nvSpPr>
-            <p:cNvPr id="38" name="Ellipse 37">
-              <a:extLst>
-                <a:ext uri="{FF2B5EF4-FFF2-40B4-BE49-F238E27FC236}">
-                  <a16:creationId xmlns:a16="http://schemas.microsoft.com/office/drawing/2014/main" id="{4A6920F2-31EC-6EF8-6D7A-069B58D6F4A2}"/>
-                </a:ext>
-              </a:extLst>
-            </p:cNvPr>
-            <p:cNvSpPr/>
-            <p:nvPr/>
-          </p:nvSpPr>
-          <p:spPr>
-            <a:xfrm>
-              <a:off x="4329007" y="3502800"/>
-              <a:ext cx="45719" cy="45719"/>
-            </a:xfrm>
-            <a:prstGeom prst="ellipse">
-              <a:avLst/>
-            </a:prstGeom>
-          </p:spPr>
-          <p:style>
-            <a:lnRef idx="2">
-              <a:schemeClr val="accent1">
-                <a:shade val="15000"/>
-              </a:schemeClr>
-            </a:lnRef>
-            <a:fillRef idx="1">
-              <a:schemeClr val="accent1"/>
-            </a:fillRef>
-            <a:effectRef idx="0">
-              <a:schemeClr val="accent1"/>
-            </a:effectRef>
-            <a:fontRef idx="minor">
-              <a:schemeClr val="lt1"/>
-            </a:fontRef>
-          </p:style>
-          <p:txBody>
-            <a:bodyPr rtlCol="0" anchor="ctr"/>
-            <a:lstStyle/>
-            <a:p>
-              <a:pPr algn="ctr"/>
-              <a:endParaRPr lang="de-DE"/>
-            </a:p>
-          </p:txBody>
-        </p:sp>
-        <p:sp>
-          <p:nvSpPr>
-            <p:cNvPr id="39" name="Ellipse 38">
-              <a:extLst>
-                <a:ext uri="{FF2B5EF4-FFF2-40B4-BE49-F238E27FC236}">
-                  <a16:creationId xmlns:a16="http://schemas.microsoft.com/office/drawing/2014/main" id="{27C1C45E-FAC8-450E-B4BA-6D9B99A878B8}"/>
-                </a:ext>
-              </a:extLst>
-            </p:cNvPr>
-            <p:cNvSpPr/>
-            <p:nvPr/>
-          </p:nvSpPr>
-          <p:spPr>
-            <a:xfrm>
-              <a:off x="739141" y="3309478"/>
-              <a:ext cx="45719" cy="45719"/>
-            </a:xfrm>
-            <a:prstGeom prst="ellipse">
-              <a:avLst/>
-            </a:prstGeom>
-            <a:solidFill>
-              <a:schemeClr val="accent2"/>
-            </a:solidFill>
           </p:spPr>
           <p:style>
             <a:lnRef idx="2">
@@ -8643,12 +8938,266 @@
             </a:p>
           </p:txBody>
         </p:sp>
+      </p:grpSp>
+      <p:grpSp>
+        <p:nvGrpSpPr>
+          <p:cNvPr id="14" name="Gruppieren 13">
+            <a:extLst>
+              <a:ext uri="{FF2B5EF4-FFF2-40B4-BE49-F238E27FC236}">
+                <a16:creationId xmlns:a16="http://schemas.microsoft.com/office/drawing/2014/main" id="{CD57C923-D100-6AC6-B4D2-70A6FDEB9F57}"/>
+              </a:ext>
+            </a:extLst>
+          </p:cNvPr>
+          <p:cNvGrpSpPr/>
+          <p:nvPr/>
+        </p:nvGrpSpPr>
+        <p:grpSpPr>
+          <a:xfrm rot="15761263">
+            <a:off x="3647746" y="2282213"/>
+            <a:ext cx="3635585" cy="289983"/>
+            <a:chOff x="739141" y="3284008"/>
+            <a:chExt cx="3635585" cy="289983"/>
+          </a:xfrm>
+        </p:grpSpPr>
+        <p:grpSp>
+          <p:nvGrpSpPr>
+            <p:cNvPr id="15" name="Gruppieren 14">
+              <a:extLst>
+                <a:ext uri="{FF2B5EF4-FFF2-40B4-BE49-F238E27FC236}">
+                  <a16:creationId xmlns:a16="http://schemas.microsoft.com/office/drawing/2014/main" id="{B60AA5B3-6C6F-099C-EEBD-ED93C4F5E9A8}"/>
+                </a:ext>
+              </a:extLst>
+            </p:cNvPr>
+            <p:cNvGrpSpPr/>
+            <p:nvPr/>
+          </p:nvGrpSpPr>
+          <p:grpSpPr>
+            <a:xfrm>
+              <a:off x="762001" y="3284008"/>
+              <a:ext cx="3589866" cy="289983"/>
+              <a:chOff x="2032000" y="2006599"/>
+              <a:chExt cx="6096000" cy="1117600"/>
+            </a:xfrm>
+          </p:grpSpPr>
+          <p:sp>
+            <p:nvSpPr>
+              <p:cNvPr id="22" name="Rechteck 21">
+                <a:extLst>
+                  <a:ext uri="{FF2B5EF4-FFF2-40B4-BE49-F238E27FC236}">
+                    <a16:creationId xmlns:a16="http://schemas.microsoft.com/office/drawing/2014/main" id="{8A32D7E6-6A8B-4CE3-19BF-A98105FC2AB4}"/>
+                  </a:ext>
+                </a:extLst>
+              </p:cNvPr>
+              <p:cNvSpPr/>
+              <p:nvPr/>
+            </p:nvSpPr>
+            <p:spPr>
+              <a:xfrm>
+                <a:off x="2032000" y="2006599"/>
+                <a:ext cx="6096000" cy="1117598"/>
+              </a:xfrm>
+              <a:prstGeom prst="rect">
+                <a:avLst/>
+              </a:prstGeom>
+              <a:solidFill>
+                <a:srgbClr val="D0CECE"/>
+              </a:solidFill>
+              <a:ln w="19050">
+                <a:solidFill>
+                  <a:schemeClr val="tx1"/>
+                </a:solidFill>
+                <a:prstDash val="solid"/>
+              </a:ln>
+            </p:spPr>
+            <p:style>
+              <a:lnRef idx="2">
+                <a:schemeClr val="accent1">
+                  <a:shade val="15000"/>
+                </a:schemeClr>
+              </a:lnRef>
+              <a:fillRef idx="1">
+                <a:schemeClr val="accent1"/>
+              </a:fillRef>
+              <a:effectRef idx="0">
+                <a:schemeClr val="accent1"/>
+              </a:effectRef>
+              <a:fontRef idx="minor">
+                <a:schemeClr val="lt1"/>
+              </a:fontRef>
+            </p:style>
+            <p:txBody>
+              <a:bodyPr rtlCol="0" anchor="ctr"/>
+              <a:lstStyle/>
+              <a:p>
+                <a:pPr algn="ctr"/>
+                <a:endParaRPr lang="de-DE"/>
+              </a:p>
+            </p:txBody>
+          </p:sp>
+          <p:sp>
+            <p:nvSpPr>
+              <p:cNvPr id="23" name="Rechteck 22">
+                <a:extLst>
+                  <a:ext uri="{FF2B5EF4-FFF2-40B4-BE49-F238E27FC236}">
+                    <a16:creationId xmlns:a16="http://schemas.microsoft.com/office/drawing/2014/main" id="{4CACC8D0-4E07-01DC-84EA-4207EE689F84}"/>
+                  </a:ext>
+                </a:extLst>
+              </p:cNvPr>
+              <p:cNvSpPr/>
+              <p:nvPr/>
+            </p:nvSpPr>
+            <p:spPr>
+              <a:xfrm>
+                <a:off x="2032000" y="2006600"/>
+                <a:ext cx="6096000" cy="372533"/>
+              </a:xfrm>
+              <a:prstGeom prst="rect">
+                <a:avLst/>
+              </a:prstGeom>
+              <a:noFill/>
+              <a:ln>
+                <a:solidFill>
+                  <a:schemeClr val="tx1"/>
+                </a:solidFill>
+                <a:prstDash val="lgDash"/>
+              </a:ln>
+            </p:spPr>
+            <p:style>
+              <a:lnRef idx="2">
+                <a:schemeClr val="accent1">
+                  <a:shade val="15000"/>
+                </a:schemeClr>
+              </a:lnRef>
+              <a:fillRef idx="1">
+                <a:schemeClr val="accent1"/>
+              </a:fillRef>
+              <a:effectRef idx="0">
+                <a:schemeClr val="accent1"/>
+              </a:effectRef>
+              <a:fontRef idx="minor">
+                <a:schemeClr val="lt1"/>
+              </a:fontRef>
+            </p:style>
+            <p:txBody>
+              <a:bodyPr rtlCol="0" anchor="ctr"/>
+              <a:lstStyle/>
+              <a:p>
+                <a:pPr algn="ctr"/>
+                <a:endParaRPr lang="de-DE"/>
+              </a:p>
+            </p:txBody>
+          </p:sp>
+          <p:sp>
+            <p:nvSpPr>
+              <p:cNvPr id="24" name="Rechteck 23">
+                <a:extLst>
+                  <a:ext uri="{FF2B5EF4-FFF2-40B4-BE49-F238E27FC236}">
+                    <a16:creationId xmlns:a16="http://schemas.microsoft.com/office/drawing/2014/main" id="{4C5350F1-0DD7-0588-6D53-1CCADEF91AF8}"/>
+                  </a:ext>
+                </a:extLst>
+              </p:cNvPr>
+              <p:cNvSpPr/>
+              <p:nvPr/>
+            </p:nvSpPr>
+            <p:spPr>
+              <a:xfrm>
+                <a:off x="2032000" y="2379133"/>
+                <a:ext cx="6096000" cy="372533"/>
+              </a:xfrm>
+              <a:prstGeom prst="rect">
+                <a:avLst/>
+              </a:prstGeom>
+              <a:noFill/>
+              <a:ln>
+                <a:noFill/>
+                <a:prstDash val="lgDash"/>
+              </a:ln>
+            </p:spPr>
+            <p:style>
+              <a:lnRef idx="2">
+                <a:schemeClr val="accent1">
+                  <a:shade val="15000"/>
+                </a:schemeClr>
+              </a:lnRef>
+              <a:fillRef idx="1">
+                <a:schemeClr val="accent1"/>
+              </a:fillRef>
+              <a:effectRef idx="0">
+                <a:schemeClr val="accent1"/>
+              </a:effectRef>
+              <a:fontRef idx="minor">
+                <a:schemeClr val="lt1"/>
+              </a:fontRef>
+            </p:style>
+            <p:txBody>
+              <a:bodyPr rtlCol="0" anchor="ctr"/>
+              <a:lstStyle/>
+              <a:p>
+                <a:pPr algn="ctr"/>
+                <a:endParaRPr lang="de-DE"/>
+              </a:p>
+            </p:txBody>
+          </p:sp>
+          <p:sp>
+            <p:nvSpPr>
+              <p:cNvPr id="25" name="Rechteck 24">
+                <a:extLst>
+                  <a:ext uri="{FF2B5EF4-FFF2-40B4-BE49-F238E27FC236}">
+                    <a16:creationId xmlns:a16="http://schemas.microsoft.com/office/drawing/2014/main" id="{45F5F90F-4903-B13E-36D6-25B30AB35EA8}"/>
+                  </a:ext>
+                </a:extLst>
+              </p:cNvPr>
+              <p:cNvSpPr/>
+              <p:nvPr/>
+            </p:nvSpPr>
+            <p:spPr>
+              <a:xfrm>
+                <a:off x="2032000" y="2751666"/>
+                <a:ext cx="6096000" cy="372533"/>
+              </a:xfrm>
+              <a:prstGeom prst="rect">
+                <a:avLst/>
+              </a:prstGeom>
+              <a:noFill/>
+              <a:ln>
+                <a:solidFill>
+                  <a:schemeClr val="tx1"/>
+                </a:solidFill>
+                <a:prstDash val="lgDash"/>
+              </a:ln>
+            </p:spPr>
+            <p:style>
+              <a:lnRef idx="2">
+                <a:schemeClr val="accent1">
+                  <a:shade val="15000"/>
+                </a:schemeClr>
+              </a:lnRef>
+              <a:fillRef idx="1">
+                <a:schemeClr val="accent1"/>
+              </a:fillRef>
+              <a:effectRef idx="0">
+                <a:schemeClr val="accent1"/>
+              </a:effectRef>
+              <a:fontRef idx="minor">
+                <a:schemeClr val="lt1"/>
+              </a:fontRef>
+            </p:style>
+            <p:txBody>
+              <a:bodyPr rtlCol="0" anchor="ctr"/>
+              <a:lstStyle/>
+              <a:p>
+                <a:pPr algn="ctr"/>
+                <a:endParaRPr lang="de-DE"/>
+              </a:p>
+            </p:txBody>
+          </p:sp>
+        </p:grpSp>
         <p:sp>
           <p:nvSpPr>
-            <p:cNvPr id="41" name="Ellipse 40">
+            <p:cNvPr id="17" name="Ellipse 16">
               <a:extLst>
                 <a:ext uri="{FF2B5EF4-FFF2-40B4-BE49-F238E27FC236}">
-                  <a16:creationId xmlns:a16="http://schemas.microsoft.com/office/drawing/2014/main" id="{D027918D-A3CE-F74F-91E1-C7EAEC46BB23}"/>
+                  <a16:creationId xmlns:a16="http://schemas.microsoft.com/office/drawing/2014/main" id="{E14C5CB0-AF4D-6038-2046-7C2BFD2E72D5}"/>
                 </a:ext>
               </a:extLst>
             </p:cNvPr>
@@ -8657,7 +9206,1356 @@
           </p:nvSpPr>
           <p:spPr>
             <a:xfrm>
-              <a:off x="739141" y="3498019"/>
+              <a:off x="4329007" y="3406139"/>
+              <a:ext cx="45719" cy="45719"/>
+            </a:xfrm>
+            <a:prstGeom prst="ellipse">
+              <a:avLst/>
+            </a:prstGeom>
+          </p:spPr>
+          <p:style>
+            <a:lnRef idx="2">
+              <a:schemeClr val="accent1">
+                <a:shade val="15000"/>
+              </a:schemeClr>
+            </a:lnRef>
+            <a:fillRef idx="1">
+              <a:schemeClr val="accent1"/>
+            </a:fillRef>
+            <a:effectRef idx="0">
+              <a:schemeClr val="accent1"/>
+            </a:effectRef>
+            <a:fontRef idx="minor">
+              <a:schemeClr val="lt1"/>
+            </a:fontRef>
+          </p:style>
+          <p:txBody>
+            <a:bodyPr rtlCol="0" anchor="ctr"/>
+            <a:lstStyle/>
+            <a:p>
+              <a:pPr algn="ctr"/>
+              <a:endParaRPr lang="de-DE"/>
+            </a:p>
+          </p:txBody>
+        </p:sp>
+        <p:sp>
+          <p:nvSpPr>
+            <p:cNvPr id="20" name="Ellipse 19">
+              <a:extLst>
+                <a:ext uri="{FF2B5EF4-FFF2-40B4-BE49-F238E27FC236}">
+                  <a16:creationId xmlns:a16="http://schemas.microsoft.com/office/drawing/2014/main" id="{7B7BC060-F3E3-0622-94FA-7F7ADBB221DD}"/>
+                </a:ext>
+              </a:extLst>
+            </p:cNvPr>
+            <p:cNvSpPr/>
+            <p:nvPr/>
+          </p:nvSpPr>
+          <p:spPr>
+            <a:xfrm>
+              <a:off x="739141" y="3407921"/>
+              <a:ext cx="45719" cy="45719"/>
+            </a:xfrm>
+            <a:prstGeom prst="ellipse">
+              <a:avLst/>
+            </a:prstGeom>
+            <a:solidFill>
+              <a:schemeClr val="accent2"/>
+            </a:solidFill>
+          </p:spPr>
+          <p:style>
+            <a:lnRef idx="2">
+              <a:schemeClr val="accent1">
+                <a:shade val="15000"/>
+              </a:schemeClr>
+            </a:lnRef>
+            <a:fillRef idx="1">
+              <a:schemeClr val="accent1"/>
+            </a:fillRef>
+            <a:effectRef idx="0">
+              <a:schemeClr val="accent1"/>
+            </a:effectRef>
+            <a:fontRef idx="minor">
+              <a:schemeClr val="lt1"/>
+            </a:fontRef>
+          </p:style>
+          <p:txBody>
+            <a:bodyPr rtlCol="0" anchor="ctr"/>
+            <a:lstStyle/>
+            <a:p>
+              <a:pPr algn="ctr"/>
+              <a:endParaRPr lang="de-DE"/>
+            </a:p>
+          </p:txBody>
+        </p:sp>
+      </p:grpSp>
+      <p:cxnSp>
+        <p:nvCxnSpPr>
+          <p:cNvPr id="27" name="Verbinder: gekrümmt 26">
+            <a:extLst>
+              <a:ext uri="{FF2B5EF4-FFF2-40B4-BE49-F238E27FC236}">
+                <a16:creationId xmlns:a16="http://schemas.microsoft.com/office/drawing/2014/main" id="{875B0098-73D6-77C7-D3E9-2D6431033066}"/>
+              </a:ext>
+            </a:extLst>
+          </p:cNvPr>
+          <p:cNvCxnSpPr>
+            <a:cxnSpLocks/>
+            <a:stCxn id="37" idx="6"/>
+            <a:endCxn id="20" idx="2"/>
+          </p:cNvCxnSpPr>
+          <p:nvPr/>
+        </p:nvCxnSpPr>
+        <p:spPr>
+          <a:xfrm>
+            <a:off x="5090363" y="4152005"/>
+            <a:ext cx="608306" cy="77981"/>
+          </a:xfrm>
+          <a:prstGeom prst="curvedConnector4">
+            <a:avLst>
+              <a:gd name="adj1" fmla="val 47882"/>
+              <a:gd name="adj2" fmla="val 393148"/>
+            </a:avLst>
+          </a:prstGeom>
+          <a:ln>
+            <a:solidFill>
+              <a:schemeClr val="tx1"/>
+            </a:solidFill>
+            <a:tailEnd type="triangle"/>
+          </a:ln>
+        </p:spPr>
+        <p:style>
+          <a:lnRef idx="1">
+            <a:schemeClr val="accent1"/>
+          </a:lnRef>
+          <a:fillRef idx="0">
+            <a:schemeClr val="accent1"/>
+          </a:fillRef>
+          <a:effectRef idx="0">
+            <a:schemeClr val="accent1"/>
+          </a:effectRef>
+          <a:fontRef idx="minor">
+            <a:schemeClr val="tx1"/>
+          </a:fontRef>
+        </p:style>
+      </p:cxnSp>
+      <p:grpSp>
+        <p:nvGrpSpPr>
+          <p:cNvPr id="2" name="Gruppieren 1">
+            <a:extLst>
+              <a:ext uri="{FF2B5EF4-FFF2-40B4-BE49-F238E27FC236}">
+                <a16:creationId xmlns:a16="http://schemas.microsoft.com/office/drawing/2014/main" id="{760EC3E8-6C3F-4A8B-8015-C8487F9472A8}"/>
+              </a:ext>
+            </a:extLst>
+          </p:cNvPr>
+          <p:cNvGrpSpPr/>
+          <p:nvPr/>
+        </p:nvGrpSpPr>
+        <p:grpSpPr>
+          <a:xfrm rot="20119461">
+            <a:off x="2565875" y="2609334"/>
+            <a:ext cx="3635585" cy="289983"/>
+            <a:chOff x="739141" y="3284008"/>
+            <a:chExt cx="3635585" cy="289983"/>
+          </a:xfrm>
+        </p:grpSpPr>
+        <p:grpSp>
+          <p:nvGrpSpPr>
+            <p:cNvPr id="3" name="Gruppieren 2">
+              <a:extLst>
+                <a:ext uri="{FF2B5EF4-FFF2-40B4-BE49-F238E27FC236}">
+                  <a16:creationId xmlns:a16="http://schemas.microsoft.com/office/drawing/2014/main" id="{DF000084-1327-DBCB-AD05-0604580F83CA}"/>
+                </a:ext>
+              </a:extLst>
+            </p:cNvPr>
+            <p:cNvGrpSpPr/>
+            <p:nvPr/>
+          </p:nvGrpSpPr>
+          <p:grpSpPr>
+            <a:xfrm>
+              <a:off x="762001" y="3284008"/>
+              <a:ext cx="3589866" cy="289983"/>
+              <a:chOff x="2032000" y="2006599"/>
+              <a:chExt cx="6096000" cy="1117600"/>
+            </a:xfrm>
+          </p:grpSpPr>
+          <p:sp>
+            <p:nvSpPr>
+              <p:cNvPr id="10" name="Rechteck 9">
+                <a:extLst>
+                  <a:ext uri="{FF2B5EF4-FFF2-40B4-BE49-F238E27FC236}">
+                    <a16:creationId xmlns:a16="http://schemas.microsoft.com/office/drawing/2014/main" id="{2B8903AC-5D99-B357-F95F-AF3EEF33E412}"/>
+                  </a:ext>
+                </a:extLst>
+              </p:cNvPr>
+              <p:cNvSpPr/>
+              <p:nvPr/>
+            </p:nvSpPr>
+            <p:spPr>
+              <a:xfrm>
+                <a:off x="2032000" y="2006599"/>
+                <a:ext cx="6096000" cy="1117598"/>
+              </a:xfrm>
+              <a:prstGeom prst="rect">
+                <a:avLst/>
+              </a:prstGeom>
+              <a:solidFill>
+                <a:srgbClr val="D0CECE"/>
+              </a:solidFill>
+              <a:ln w="19050">
+                <a:solidFill>
+                  <a:schemeClr val="tx1"/>
+                </a:solidFill>
+                <a:prstDash val="solid"/>
+              </a:ln>
+            </p:spPr>
+            <p:style>
+              <a:lnRef idx="2">
+                <a:schemeClr val="accent1">
+                  <a:shade val="15000"/>
+                </a:schemeClr>
+              </a:lnRef>
+              <a:fillRef idx="1">
+                <a:schemeClr val="accent1"/>
+              </a:fillRef>
+              <a:effectRef idx="0">
+                <a:schemeClr val="accent1"/>
+              </a:effectRef>
+              <a:fontRef idx="minor">
+                <a:schemeClr val="lt1"/>
+              </a:fontRef>
+            </p:style>
+            <p:txBody>
+              <a:bodyPr rtlCol="0" anchor="ctr"/>
+              <a:lstStyle/>
+              <a:p>
+                <a:pPr algn="ctr"/>
+                <a:endParaRPr lang="de-DE"/>
+              </a:p>
+            </p:txBody>
+          </p:sp>
+          <p:sp>
+            <p:nvSpPr>
+              <p:cNvPr id="11" name="Rechteck 10">
+                <a:extLst>
+                  <a:ext uri="{FF2B5EF4-FFF2-40B4-BE49-F238E27FC236}">
+                    <a16:creationId xmlns:a16="http://schemas.microsoft.com/office/drawing/2014/main" id="{163CC47E-A230-95B4-4ACE-6277A6AE66F8}"/>
+                  </a:ext>
+                </a:extLst>
+              </p:cNvPr>
+              <p:cNvSpPr/>
+              <p:nvPr/>
+            </p:nvSpPr>
+            <p:spPr>
+              <a:xfrm>
+                <a:off x="2032000" y="2006600"/>
+                <a:ext cx="6096000" cy="372533"/>
+              </a:xfrm>
+              <a:prstGeom prst="rect">
+                <a:avLst/>
+              </a:prstGeom>
+              <a:noFill/>
+              <a:ln>
+                <a:solidFill>
+                  <a:schemeClr val="tx1"/>
+                </a:solidFill>
+                <a:prstDash val="lgDash"/>
+              </a:ln>
+            </p:spPr>
+            <p:style>
+              <a:lnRef idx="2">
+                <a:schemeClr val="accent1">
+                  <a:shade val="15000"/>
+                </a:schemeClr>
+              </a:lnRef>
+              <a:fillRef idx="1">
+                <a:schemeClr val="accent1"/>
+              </a:fillRef>
+              <a:effectRef idx="0">
+                <a:schemeClr val="accent1"/>
+              </a:effectRef>
+              <a:fontRef idx="minor">
+                <a:schemeClr val="lt1"/>
+              </a:fontRef>
+            </p:style>
+            <p:txBody>
+              <a:bodyPr rtlCol="0" anchor="ctr"/>
+              <a:lstStyle/>
+              <a:p>
+                <a:pPr algn="ctr"/>
+                <a:endParaRPr lang="de-DE"/>
+              </a:p>
+            </p:txBody>
+          </p:sp>
+          <p:sp>
+            <p:nvSpPr>
+              <p:cNvPr id="12" name="Rechteck 11">
+                <a:extLst>
+                  <a:ext uri="{FF2B5EF4-FFF2-40B4-BE49-F238E27FC236}">
+                    <a16:creationId xmlns:a16="http://schemas.microsoft.com/office/drawing/2014/main" id="{8B192F5D-EB0C-F4FA-5E9C-17EA4CCBE2ED}"/>
+                  </a:ext>
+                </a:extLst>
+              </p:cNvPr>
+              <p:cNvSpPr/>
+              <p:nvPr/>
+            </p:nvSpPr>
+            <p:spPr>
+              <a:xfrm>
+                <a:off x="2032000" y="2379133"/>
+                <a:ext cx="6096000" cy="372533"/>
+              </a:xfrm>
+              <a:prstGeom prst="rect">
+                <a:avLst/>
+              </a:prstGeom>
+              <a:noFill/>
+              <a:ln>
+                <a:noFill/>
+                <a:prstDash val="lgDash"/>
+              </a:ln>
+            </p:spPr>
+            <p:style>
+              <a:lnRef idx="2">
+                <a:schemeClr val="accent1">
+                  <a:shade val="15000"/>
+                </a:schemeClr>
+              </a:lnRef>
+              <a:fillRef idx="1">
+                <a:schemeClr val="accent1"/>
+              </a:fillRef>
+              <a:effectRef idx="0">
+                <a:schemeClr val="accent1"/>
+              </a:effectRef>
+              <a:fontRef idx="minor">
+                <a:schemeClr val="lt1"/>
+              </a:fontRef>
+            </p:style>
+            <p:txBody>
+              <a:bodyPr rtlCol="0" anchor="ctr"/>
+              <a:lstStyle/>
+              <a:p>
+                <a:pPr algn="ctr"/>
+                <a:endParaRPr lang="de-DE"/>
+              </a:p>
+            </p:txBody>
+          </p:sp>
+          <p:sp>
+            <p:nvSpPr>
+              <p:cNvPr id="13" name="Rechteck 12">
+                <a:extLst>
+                  <a:ext uri="{FF2B5EF4-FFF2-40B4-BE49-F238E27FC236}">
+                    <a16:creationId xmlns:a16="http://schemas.microsoft.com/office/drawing/2014/main" id="{FAD96FA4-6EDA-E4CC-6AC0-68DFBDF8C772}"/>
+                  </a:ext>
+                </a:extLst>
+              </p:cNvPr>
+              <p:cNvSpPr/>
+              <p:nvPr/>
+            </p:nvSpPr>
+            <p:spPr>
+              <a:xfrm>
+                <a:off x="2032000" y="2751666"/>
+                <a:ext cx="6096000" cy="372533"/>
+              </a:xfrm>
+              <a:prstGeom prst="rect">
+                <a:avLst/>
+              </a:prstGeom>
+              <a:noFill/>
+              <a:ln>
+                <a:solidFill>
+                  <a:schemeClr val="tx1"/>
+                </a:solidFill>
+                <a:prstDash val="lgDash"/>
+              </a:ln>
+            </p:spPr>
+            <p:style>
+              <a:lnRef idx="2">
+                <a:schemeClr val="accent1">
+                  <a:shade val="15000"/>
+                </a:schemeClr>
+              </a:lnRef>
+              <a:fillRef idx="1">
+                <a:schemeClr val="accent1"/>
+              </a:fillRef>
+              <a:effectRef idx="0">
+                <a:schemeClr val="accent1"/>
+              </a:effectRef>
+              <a:fontRef idx="minor">
+                <a:schemeClr val="lt1"/>
+              </a:fontRef>
+            </p:style>
+            <p:txBody>
+              <a:bodyPr rtlCol="0" anchor="ctr"/>
+              <a:lstStyle/>
+              <a:p>
+                <a:pPr algn="ctr"/>
+                <a:endParaRPr lang="de-DE"/>
+              </a:p>
+            </p:txBody>
+          </p:sp>
+        </p:grpSp>
+        <p:sp>
+          <p:nvSpPr>
+            <p:cNvPr id="5" name="Ellipse 4">
+              <a:extLst>
+                <a:ext uri="{FF2B5EF4-FFF2-40B4-BE49-F238E27FC236}">
+                  <a16:creationId xmlns:a16="http://schemas.microsoft.com/office/drawing/2014/main" id="{8D93CDE1-91BD-84CE-AB15-F152C967D023}"/>
+                </a:ext>
+              </a:extLst>
+            </p:cNvPr>
+            <p:cNvSpPr/>
+            <p:nvPr/>
+          </p:nvSpPr>
+          <p:spPr>
+            <a:xfrm>
+              <a:off x="4329007" y="3406139"/>
+              <a:ext cx="45719" cy="45719"/>
+            </a:xfrm>
+            <a:prstGeom prst="ellipse">
+              <a:avLst/>
+            </a:prstGeom>
+          </p:spPr>
+          <p:style>
+            <a:lnRef idx="2">
+              <a:schemeClr val="accent1">
+                <a:shade val="15000"/>
+              </a:schemeClr>
+            </a:lnRef>
+            <a:fillRef idx="1">
+              <a:schemeClr val="accent1"/>
+            </a:fillRef>
+            <a:effectRef idx="0">
+              <a:schemeClr val="accent1"/>
+            </a:effectRef>
+            <a:fontRef idx="minor">
+              <a:schemeClr val="lt1"/>
+            </a:fontRef>
+          </p:style>
+          <p:txBody>
+            <a:bodyPr rtlCol="0" anchor="ctr"/>
+            <a:lstStyle/>
+            <a:p>
+              <a:pPr algn="ctr"/>
+              <a:endParaRPr lang="de-DE"/>
+            </a:p>
+          </p:txBody>
+        </p:sp>
+        <p:sp>
+          <p:nvSpPr>
+            <p:cNvPr id="8" name="Ellipse 7">
+              <a:extLst>
+                <a:ext uri="{FF2B5EF4-FFF2-40B4-BE49-F238E27FC236}">
+                  <a16:creationId xmlns:a16="http://schemas.microsoft.com/office/drawing/2014/main" id="{6173DE96-4C6D-7213-2D26-B2467E6216E9}"/>
+                </a:ext>
+              </a:extLst>
+            </p:cNvPr>
+            <p:cNvSpPr/>
+            <p:nvPr/>
+          </p:nvSpPr>
+          <p:spPr>
+            <a:xfrm>
+              <a:off x="739141" y="3407921"/>
+              <a:ext cx="45719" cy="45719"/>
+            </a:xfrm>
+            <a:prstGeom prst="ellipse">
+              <a:avLst/>
+            </a:prstGeom>
+            <a:solidFill>
+              <a:schemeClr val="accent2"/>
+            </a:solidFill>
+          </p:spPr>
+          <p:style>
+            <a:lnRef idx="2">
+              <a:schemeClr val="accent1">
+                <a:shade val="15000"/>
+              </a:schemeClr>
+            </a:lnRef>
+            <a:fillRef idx="1">
+              <a:schemeClr val="accent1"/>
+            </a:fillRef>
+            <a:effectRef idx="0">
+              <a:schemeClr val="accent1"/>
+            </a:effectRef>
+            <a:fontRef idx="minor">
+              <a:schemeClr val="lt1"/>
+            </a:fontRef>
+          </p:style>
+          <p:txBody>
+            <a:bodyPr rtlCol="0" anchor="ctr"/>
+            <a:lstStyle/>
+            <a:p>
+              <a:pPr algn="ctr"/>
+              <a:endParaRPr lang="de-DE"/>
+            </a:p>
+          </p:txBody>
+        </p:sp>
+      </p:grpSp>
+      <p:cxnSp>
+        <p:nvCxnSpPr>
+          <p:cNvPr id="31" name="Verbinder: gekrümmt 30">
+            <a:extLst>
+              <a:ext uri="{FF2B5EF4-FFF2-40B4-BE49-F238E27FC236}">
+                <a16:creationId xmlns:a16="http://schemas.microsoft.com/office/drawing/2014/main" id="{374A6CBC-CC7B-ED79-5B4A-3D467683DC31}"/>
+              </a:ext>
+            </a:extLst>
+          </p:cNvPr>
+          <p:cNvCxnSpPr>
+            <a:cxnSpLocks/>
+            <a:stCxn id="8" idx="2"/>
+            <a:endCxn id="40" idx="2"/>
+          </p:cNvCxnSpPr>
+          <p:nvPr/>
+        </p:nvCxnSpPr>
+        <p:spPr>
+          <a:xfrm rot="10800000" flipV="1">
+            <a:off x="1454778" y="3514837"/>
+            <a:ext cx="1277832" cy="638949"/>
+          </a:xfrm>
+          <a:prstGeom prst="curvedConnector3">
+            <a:avLst>
+              <a:gd name="adj1" fmla="val 117890"/>
+            </a:avLst>
+          </a:prstGeom>
+          <a:ln>
+            <a:solidFill>
+              <a:schemeClr val="tx1"/>
+            </a:solidFill>
+            <a:tailEnd type="triangle"/>
+          </a:ln>
+        </p:spPr>
+        <p:style>
+          <a:lnRef idx="1">
+            <a:schemeClr val="accent1"/>
+          </a:lnRef>
+          <a:fillRef idx="0">
+            <a:schemeClr val="accent1"/>
+          </a:fillRef>
+          <a:effectRef idx="0">
+            <a:schemeClr val="accent1"/>
+          </a:effectRef>
+          <a:fontRef idx="minor">
+            <a:schemeClr val="tx1"/>
+          </a:fontRef>
+        </p:style>
+      </p:cxnSp>
+      <p:sp>
+        <p:nvSpPr>
+          <p:cNvPr id="33" name="Verbotsymbol 32">
+            <a:extLst>
+              <a:ext uri="{FF2B5EF4-FFF2-40B4-BE49-F238E27FC236}">
+                <a16:creationId xmlns:a16="http://schemas.microsoft.com/office/drawing/2014/main" id="{AF2D08E4-0B9F-214B-5729-0FC68735CA88}"/>
+              </a:ext>
+            </a:extLst>
+          </p:cNvPr>
+          <p:cNvSpPr/>
+          <p:nvPr/>
+        </p:nvSpPr>
+        <p:spPr>
+          <a:xfrm>
+            <a:off x="4742735" y="2340391"/>
+            <a:ext cx="326100" cy="326100"/>
+          </a:xfrm>
+          <a:prstGeom prst="noSmoking">
+            <a:avLst/>
+          </a:prstGeom>
+          <a:solidFill>
+            <a:srgbClr val="FF0000"/>
+          </a:solidFill>
+        </p:spPr>
+        <p:style>
+          <a:lnRef idx="2">
+            <a:schemeClr val="accent1">
+              <a:shade val="15000"/>
+            </a:schemeClr>
+          </a:lnRef>
+          <a:fillRef idx="1">
+            <a:schemeClr val="accent1"/>
+          </a:fillRef>
+          <a:effectRef idx="0">
+            <a:schemeClr val="accent1"/>
+          </a:effectRef>
+          <a:fontRef idx="minor">
+            <a:schemeClr val="lt1"/>
+          </a:fontRef>
+        </p:style>
+        <p:txBody>
+          <a:bodyPr rtlCol="0" anchor="ctr"/>
+          <a:lstStyle/>
+          <a:p>
+            <a:pPr algn="ctr"/>
+            <a:endParaRPr lang="de-DE">
+              <a:solidFill>
+                <a:schemeClr val="tx1"/>
+              </a:solidFill>
+            </a:endParaRPr>
+          </a:p>
+        </p:txBody>
+      </p:sp>
+      <p:sp>
+        <p:nvSpPr>
+          <p:cNvPr id="46" name="Verbotsymbol 45">
+            <a:extLst>
+              <a:ext uri="{FF2B5EF4-FFF2-40B4-BE49-F238E27FC236}">
+                <a16:creationId xmlns:a16="http://schemas.microsoft.com/office/drawing/2014/main" id="{5D7A6E2A-9664-4090-E175-170F3952A6D9}"/>
+              </a:ext>
+            </a:extLst>
+          </p:cNvPr>
+          <p:cNvSpPr/>
+          <p:nvPr/>
+        </p:nvSpPr>
+        <p:spPr>
+          <a:xfrm>
+            <a:off x="1653306" y="3423293"/>
+            <a:ext cx="326100" cy="326100"/>
+          </a:xfrm>
+          <a:prstGeom prst="noSmoking">
+            <a:avLst/>
+          </a:prstGeom>
+          <a:solidFill>
+            <a:srgbClr val="FF0000"/>
+          </a:solidFill>
+        </p:spPr>
+        <p:style>
+          <a:lnRef idx="2">
+            <a:schemeClr val="accent1">
+              <a:shade val="15000"/>
+            </a:schemeClr>
+          </a:lnRef>
+          <a:fillRef idx="1">
+            <a:schemeClr val="accent1"/>
+          </a:fillRef>
+          <a:effectRef idx="0">
+            <a:schemeClr val="accent1"/>
+          </a:effectRef>
+          <a:fontRef idx="minor">
+            <a:schemeClr val="lt1"/>
+          </a:fontRef>
+        </p:style>
+        <p:txBody>
+          <a:bodyPr rtlCol="0" anchor="ctr"/>
+          <a:lstStyle/>
+          <a:p>
+            <a:pPr algn="ctr"/>
+            <a:endParaRPr lang="de-DE">
+              <a:solidFill>
+                <a:schemeClr val="tx1"/>
+              </a:solidFill>
+            </a:endParaRPr>
+          </a:p>
+        </p:txBody>
+      </p:sp>
+      <p:sp>
+        <p:nvSpPr>
+          <p:cNvPr id="47" name="Verbotsymbol 46">
+            <a:extLst>
+              <a:ext uri="{FF2B5EF4-FFF2-40B4-BE49-F238E27FC236}">
+                <a16:creationId xmlns:a16="http://schemas.microsoft.com/office/drawing/2014/main" id="{84AE19FE-EA53-B23C-8800-6AA20DC3C231}"/>
+              </a:ext>
+            </a:extLst>
+          </p:cNvPr>
+          <p:cNvSpPr/>
+          <p:nvPr/>
+        </p:nvSpPr>
+        <p:spPr>
+          <a:xfrm>
+            <a:off x="5285021" y="4239595"/>
+            <a:ext cx="326100" cy="326100"/>
+          </a:xfrm>
+          <a:prstGeom prst="noSmoking">
+            <a:avLst/>
+          </a:prstGeom>
+          <a:solidFill>
+            <a:srgbClr val="FF0000"/>
+          </a:solidFill>
+        </p:spPr>
+        <p:style>
+          <a:lnRef idx="2">
+            <a:schemeClr val="accent1">
+              <a:shade val="15000"/>
+            </a:schemeClr>
+          </a:lnRef>
+          <a:fillRef idx="1">
+            <a:schemeClr val="accent1"/>
+          </a:fillRef>
+          <a:effectRef idx="0">
+            <a:schemeClr val="accent1"/>
+          </a:effectRef>
+          <a:fontRef idx="minor">
+            <a:schemeClr val="lt1"/>
+          </a:fontRef>
+        </p:style>
+        <p:txBody>
+          <a:bodyPr rtlCol="0" anchor="ctr"/>
+          <a:lstStyle/>
+          <a:p>
+            <a:pPr algn="ctr"/>
+            <a:endParaRPr lang="de-DE">
+              <a:solidFill>
+                <a:schemeClr val="tx1"/>
+              </a:solidFill>
+            </a:endParaRPr>
+          </a:p>
+        </p:txBody>
+      </p:sp>
+      <p:grpSp>
+        <p:nvGrpSpPr>
+          <p:cNvPr id="48" name="Gruppieren 47">
+            <a:extLst>
+              <a:ext uri="{FF2B5EF4-FFF2-40B4-BE49-F238E27FC236}">
+                <a16:creationId xmlns:a16="http://schemas.microsoft.com/office/drawing/2014/main" id="{37DBF728-D41B-7E08-2967-6922008C8798}"/>
+              </a:ext>
+            </a:extLst>
+          </p:cNvPr>
+          <p:cNvGrpSpPr/>
+          <p:nvPr/>
+        </p:nvGrpSpPr>
+        <p:grpSpPr>
+          <a:xfrm rot="20119461">
+            <a:off x="7173386" y="2358449"/>
+            <a:ext cx="3635585" cy="289983"/>
+            <a:chOff x="739141" y="3284008"/>
+            <a:chExt cx="3635585" cy="289983"/>
+          </a:xfrm>
+        </p:grpSpPr>
+        <p:grpSp>
+          <p:nvGrpSpPr>
+            <p:cNvPr id="49" name="Gruppieren 48">
+              <a:extLst>
+                <a:ext uri="{FF2B5EF4-FFF2-40B4-BE49-F238E27FC236}">
+                  <a16:creationId xmlns:a16="http://schemas.microsoft.com/office/drawing/2014/main" id="{B90CAD27-9AA5-0D72-404A-D189D1690EB0}"/>
+                </a:ext>
+              </a:extLst>
+            </p:cNvPr>
+            <p:cNvGrpSpPr/>
+            <p:nvPr/>
+          </p:nvGrpSpPr>
+          <p:grpSpPr>
+            <a:xfrm>
+              <a:off x="762001" y="3284008"/>
+              <a:ext cx="3589866" cy="289983"/>
+              <a:chOff x="2032000" y="2006599"/>
+              <a:chExt cx="6096000" cy="1117600"/>
+            </a:xfrm>
+          </p:grpSpPr>
+          <p:sp>
+            <p:nvSpPr>
+              <p:cNvPr id="52" name="Rechteck 51">
+                <a:extLst>
+                  <a:ext uri="{FF2B5EF4-FFF2-40B4-BE49-F238E27FC236}">
+                    <a16:creationId xmlns:a16="http://schemas.microsoft.com/office/drawing/2014/main" id="{28CA988F-9FB8-F63C-2DCF-8826EEF07C62}"/>
+                  </a:ext>
+                </a:extLst>
+              </p:cNvPr>
+              <p:cNvSpPr/>
+              <p:nvPr/>
+            </p:nvSpPr>
+            <p:spPr>
+              <a:xfrm>
+                <a:off x="2032000" y="2006599"/>
+                <a:ext cx="6096000" cy="1117598"/>
+              </a:xfrm>
+              <a:prstGeom prst="rect">
+                <a:avLst/>
+              </a:prstGeom>
+              <a:solidFill>
+                <a:srgbClr val="D0CECE"/>
+              </a:solidFill>
+              <a:ln w="19050">
+                <a:solidFill>
+                  <a:schemeClr val="tx1"/>
+                </a:solidFill>
+                <a:prstDash val="solid"/>
+              </a:ln>
+            </p:spPr>
+            <p:style>
+              <a:lnRef idx="2">
+                <a:schemeClr val="accent1">
+                  <a:shade val="15000"/>
+                </a:schemeClr>
+              </a:lnRef>
+              <a:fillRef idx="1">
+                <a:schemeClr val="accent1"/>
+              </a:fillRef>
+              <a:effectRef idx="0">
+                <a:schemeClr val="accent1"/>
+              </a:effectRef>
+              <a:fontRef idx="minor">
+                <a:schemeClr val="lt1"/>
+              </a:fontRef>
+            </p:style>
+            <p:txBody>
+              <a:bodyPr rtlCol="0" anchor="ctr"/>
+              <a:lstStyle/>
+              <a:p>
+                <a:pPr algn="ctr"/>
+                <a:endParaRPr lang="de-DE"/>
+              </a:p>
+            </p:txBody>
+          </p:sp>
+          <p:sp>
+            <p:nvSpPr>
+              <p:cNvPr id="53" name="Rechteck 52">
+                <a:extLst>
+                  <a:ext uri="{FF2B5EF4-FFF2-40B4-BE49-F238E27FC236}">
+                    <a16:creationId xmlns:a16="http://schemas.microsoft.com/office/drawing/2014/main" id="{7B3F20C0-6FF1-6081-C40C-BE862169923C}"/>
+                  </a:ext>
+                </a:extLst>
+              </p:cNvPr>
+              <p:cNvSpPr/>
+              <p:nvPr/>
+            </p:nvSpPr>
+            <p:spPr>
+              <a:xfrm>
+                <a:off x="2032000" y="2006600"/>
+                <a:ext cx="6096000" cy="372533"/>
+              </a:xfrm>
+              <a:prstGeom prst="rect">
+                <a:avLst/>
+              </a:prstGeom>
+              <a:noFill/>
+              <a:ln>
+                <a:solidFill>
+                  <a:schemeClr val="tx1"/>
+                </a:solidFill>
+                <a:prstDash val="lgDash"/>
+              </a:ln>
+            </p:spPr>
+            <p:style>
+              <a:lnRef idx="2">
+                <a:schemeClr val="accent1">
+                  <a:shade val="15000"/>
+                </a:schemeClr>
+              </a:lnRef>
+              <a:fillRef idx="1">
+                <a:schemeClr val="accent1"/>
+              </a:fillRef>
+              <a:effectRef idx="0">
+                <a:schemeClr val="accent1"/>
+              </a:effectRef>
+              <a:fontRef idx="minor">
+                <a:schemeClr val="lt1"/>
+              </a:fontRef>
+            </p:style>
+            <p:txBody>
+              <a:bodyPr rtlCol="0" anchor="ctr"/>
+              <a:lstStyle/>
+              <a:p>
+                <a:pPr algn="ctr"/>
+                <a:endParaRPr lang="de-DE"/>
+              </a:p>
+            </p:txBody>
+          </p:sp>
+          <p:sp>
+            <p:nvSpPr>
+              <p:cNvPr id="54" name="Rechteck 53">
+                <a:extLst>
+                  <a:ext uri="{FF2B5EF4-FFF2-40B4-BE49-F238E27FC236}">
+                    <a16:creationId xmlns:a16="http://schemas.microsoft.com/office/drawing/2014/main" id="{02E757D0-9464-3765-888E-F1F329E6877E}"/>
+                  </a:ext>
+                </a:extLst>
+              </p:cNvPr>
+              <p:cNvSpPr/>
+              <p:nvPr/>
+            </p:nvSpPr>
+            <p:spPr>
+              <a:xfrm>
+                <a:off x="2032000" y="2379133"/>
+                <a:ext cx="6096000" cy="372533"/>
+              </a:xfrm>
+              <a:prstGeom prst="rect">
+                <a:avLst/>
+              </a:prstGeom>
+              <a:noFill/>
+              <a:ln>
+                <a:noFill/>
+                <a:prstDash val="lgDash"/>
+              </a:ln>
+            </p:spPr>
+            <p:style>
+              <a:lnRef idx="2">
+                <a:schemeClr val="accent1">
+                  <a:shade val="15000"/>
+                </a:schemeClr>
+              </a:lnRef>
+              <a:fillRef idx="1">
+                <a:schemeClr val="accent1"/>
+              </a:fillRef>
+              <a:effectRef idx="0">
+                <a:schemeClr val="accent1"/>
+              </a:effectRef>
+              <a:fontRef idx="minor">
+                <a:schemeClr val="lt1"/>
+              </a:fontRef>
+            </p:style>
+            <p:txBody>
+              <a:bodyPr rtlCol="0" anchor="ctr"/>
+              <a:lstStyle/>
+              <a:p>
+                <a:pPr algn="ctr"/>
+                <a:endParaRPr lang="de-DE"/>
+              </a:p>
+            </p:txBody>
+          </p:sp>
+          <p:sp>
+            <p:nvSpPr>
+              <p:cNvPr id="55" name="Rechteck 54">
+                <a:extLst>
+                  <a:ext uri="{FF2B5EF4-FFF2-40B4-BE49-F238E27FC236}">
+                    <a16:creationId xmlns:a16="http://schemas.microsoft.com/office/drawing/2014/main" id="{CEF67E71-3564-27AA-BFBF-FDF4CB09300D}"/>
+                  </a:ext>
+                </a:extLst>
+              </p:cNvPr>
+              <p:cNvSpPr/>
+              <p:nvPr/>
+            </p:nvSpPr>
+            <p:spPr>
+              <a:xfrm>
+                <a:off x="2032000" y="2751666"/>
+                <a:ext cx="6096000" cy="372533"/>
+              </a:xfrm>
+              <a:prstGeom prst="rect">
+                <a:avLst/>
+              </a:prstGeom>
+              <a:noFill/>
+              <a:ln>
+                <a:solidFill>
+                  <a:schemeClr val="tx1"/>
+                </a:solidFill>
+                <a:prstDash val="lgDash"/>
+              </a:ln>
+            </p:spPr>
+            <p:style>
+              <a:lnRef idx="2">
+                <a:schemeClr val="accent1">
+                  <a:shade val="15000"/>
+                </a:schemeClr>
+              </a:lnRef>
+              <a:fillRef idx="1">
+                <a:schemeClr val="accent1"/>
+              </a:fillRef>
+              <a:effectRef idx="0">
+                <a:schemeClr val="accent1"/>
+              </a:effectRef>
+              <a:fontRef idx="minor">
+                <a:schemeClr val="lt1"/>
+              </a:fontRef>
+            </p:style>
+            <p:txBody>
+              <a:bodyPr rtlCol="0" anchor="ctr"/>
+              <a:lstStyle/>
+              <a:p>
+                <a:pPr algn="ctr"/>
+                <a:endParaRPr lang="de-DE"/>
+              </a:p>
+            </p:txBody>
+          </p:sp>
+        </p:grpSp>
+        <p:sp>
+          <p:nvSpPr>
+            <p:cNvPr id="50" name="Ellipse 49">
+              <a:extLst>
+                <a:ext uri="{FF2B5EF4-FFF2-40B4-BE49-F238E27FC236}">
+                  <a16:creationId xmlns:a16="http://schemas.microsoft.com/office/drawing/2014/main" id="{9391FF2F-1ADC-5C4B-F663-AA69612314FE}"/>
+                </a:ext>
+              </a:extLst>
+            </p:cNvPr>
+            <p:cNvSpPr/>
+            <p:nvPr/>
+          </p:nvSpPr>
+          <p:spPr>
+            <a:xfrm>
+              <a:off x="4329007" y="3406139"/>
+              <a:ext cx="45719" cy="45719"/>
+            </a:xfrm>
+            <a:prstGeom prst="ellipse">
+              <a:avLst/>
+            </a:prstGeom>
+          </p:spPr>
+          <p:style>
+            <a:lnRef idx="2">
+              <a:schemeClr val="accent1">
+                <a:shade val="15000"/>
+              </a:schemeClr>
+            </a:lnRef>
+            <a:fillRef idx="1">
+              <a:schemeClr val="accent1"/>
+            </a:fillRef>
+            <a:effectRef idx="0">
+              <a:schemeClr val="accent1"/>
+            </a:effectRef>
+            <a:fontRef idx="minor">
+              <a:schemeClr val="lt1"/>
+            </a:fontRef>
+          </p:style>
+          <p:txBody>
+            <a:bodyPr rtlCol="0" anchor="ctr"/>
+            <a:lstStyle/>
+            <a:p>
+              <a:pPr algn="ctr"/>
+              <a:endParaRPr lang="de-DE"/>
+            </a:p>
+          </p:txBody>
+        </p:sp>
+        <p:sp>
+          <p:nvSpPr>
+            <p:cNvPr id="51" name="Ellipse 50">
+              <a:extLst>
+                <a:ext uri="{FF2B5EF4-FFF2-40B4-BE49-F238E27FC236}">
+                  <a16:creationId xmlns:a16="http://schemas.microsoft.com/office/drawing/2014/main" id="{2F88E9EF-CB1A-884C-6915-C17B4B6A0B2C}"/>
+                </a:ext>
+              </a:extLst>
+            </p:cNvPr>
+            <p:cNvSpPr/>
+            <p:nvPr/>
+          </p:nvSpPr>
+          <p:spPr>
+            <a:xfrm>
+              <a:off x="739141" y="3407921"/>
+              <a:ext cx="45719" cy="45719"/>
+            </a:xfrm>
+            <a:prstGeom prst="ellipse">
+              <a:avLst/>
+            </a:prstGeom>
+            <a:solidFill>
+              <a:schemeClr val="accent2"/>
+            </a:solidFill>
+          </p:spPr>
+          <p:style>
+            <a:lnRef idx="2">
+              <a:schemeClr val="accent1">
+                <a:shade val="15000"/>
+              </a:schemeClr>
+            </a:lnRef>
+            <a:fillRef idx="1">
+              <a:schemeClr val="accent1"/>
+            </a:fillRef>
+            <a:effectRef idx="0">
+              <a:schemeClr val="accent1"/>
+            </a:effectRef>
+            <a:fontRef idx="minor">
+              <a:schemeClr val="lt1"/>
+            </a:fontRef>
+          </p:style>
+          <p:txBody>
+            <a:bodyPr rtlCol="0" anchor="ctr"/>
+            <a:lstStyle/>
+            <a:p>
+              <a:pPr algn="ctr"/>
+              <a:endParaRPr lang="de-DE"/>
+            </a:p>
+          </p:txBody>
+        </p:sp>
+      </p:grpSp>
+      <p:grpSp>
+        <p:nvGrpSpPr>
+          <p:cNvPr id="56" name="Gruppieren 55">
+            <a:extLst>
+              <a:ext uri="{FF2B5EF4-FFF2-40B4-BE49-F238E27FC236}">
+                <a16:creationId xmlns:a16="http://schemas.microsoft.com/office/drawing/2014/main" id="{9ACF3307-90B8-4310-CA02-392289DE27F0}"/>
+              </a:ext>
+            </a:extLst>
+          </p:cNvPr>
+          <p:cNvGrpSpPr/>
+          <p:nvPr/>
+        </p:nvGrpSpPr>
+        <p:grpSpPr>
+          <a:xfrm rot="1005941">
+            <a:off x="5710019" y="3473674"/>
+            <a:ext cx="3635585" cy="289983"/>
+            <a:chOff x="739141" y="3284008"/>
+            <a:chExt cx="3635585" cy="289983"/>
+          </a:xfrm>
+        </p:grpSpPr>
+        <p:grpSp>
+          <p:nvGrpSpPr>
+            <p:cNvPr id="57" name="Gruppieren 56">
+              <a:extLst>
+                <a:ext uri="{FF2B5EF4-FFF2-40B4-BE49-F238E27FC236}">
+                  <a16:creationId xmlns:a16="http://schemas.microsoft.com/office/drawing/2014/main" id="{4BB1986E-7C8F-C4D5-C34F-108161CEADCA}"/>
+                </a:ext>
+              </a:extLst>
+            </p:cNvPr>
+            <p:cNvGrpSpPr/>
+            <p:nvPr/>
+          </p:nvGrpSpPr>
+          <p:grpSpPr>
+            <a:xfrm>
+              <a:off x="762001" y="3284008"/>
+              <a:ext cx="3589866" cy="289983"/>
+              <a:chOff x="2032000" y="2006599"/>
+              <a:chExt cx="6096000" cy="1117600"/>
+            </a:xfrm>
+          </p:grpSpPr>
+          <p:sp>
+            <p:nvSpPr>
+              <p:cNvPr id="60" name="Rechteck 59">
+                <a:extLst>
+                  <a:ext uri="{FF2B5EF4-FFF2-40B4-BE49-F238E27FC236}">
+                    <a16:creationId xmlns:a16="http://schemas.microsoft.com/office/drawing/2014/main" id="{2121B7C9-37F3-23B8-9C8D-486E76932378}"/>
+                  </a:ext>
+                </a:extLst>
+              </p:cNvPr>
+              <p:cNvSpPr/>
+              <p:nvPr/>
+            </p:nvSpPr>
+            <p:spPr>
+              <a:xfrm>
+                <a:off x="2032000" y="2006599"/>
+                <a:ext cx="6096000" cy="1117598"/>
+              </a:xfrm>
+              <a:prstGeom prst="rect">
+                <a:avLst/>
+              </a:prstGeom>
+              <a:solidFill>
+                <a:srgbClr val="D0CECE"/>
+              </a:solidFill>
+              <a:ln w="19050">
+                <a:solidFill>
+                  <a:schemeClr val="tx1"/>
+                </a:solidFill>
+                <a:prstDash val="solid"/>
+              </a:ln>
+            </p:spPr>
+            <p:style>
+              <a:lnRef idx="2">
+                <a:schemeClr val="accent1">
+                  <a:shade val="15000"/>
+                </a:schemeClr>
+              </a:lnRef>
+              <a:fillRef idx="1">
+                <a:schemeClr val="accent1"/>
+              </a:fillRef>
+              <a:effectRef idx="0">
+                <a:schemeClr val="accent1"/>
+              </a:effectRef>
+              <a:fontRef idx="minor">
+                <a:schemeClr val="lt1"/>
+              </a:fontRef>
+            </p:style>
+            <p:txBody>
+              <a:bodyPr rtlCol="0" anchor="ctr"/>
+              <a:lstStyle/>
+              <a:p>
+                <a:pPr algn="ctr"/>
+                <a:endParaRPr lang="de-DE"/>
+              </a:p>
+            </p:txBody>
+          </p:sp>
+          <p:sp>
+            <p:nvSpPr>
+              <p:cNvPr id="61" name="Rechteck 60">
+                <a:extLst>
+                  <a:ext uri="{FF2B5EF4-FFF2-40B4-BE49-F238E27FC236}">
+                    <a16:creationId xmlns:a16="http://schemas.microsoft.com/office/drawing/2014/main" id="{DD44F19B-7319-6B6F-B2D6-1F22785A587A}"/>
+                  </a:ext>
+                </a:extLst>
+              </p:cNvPr>
+              <p:cNvSpPr/>
+              <p:nvPr/>
+            </p:nvSpPr>
+            <p:spPr>
+              <a:xfrm>
+                <a:off x="2032000" y="2006600"/>
+                <a:ext cx="6096000" cy="372533"/>
+              </a:xfrm>
+              <a:prstGeom prst="rect">
+                <a:avLst/>
+              </a:prstGeom>
+              <a:noFill/>
+              <a:ln>
+                <a:solidFill>
+                  <a:schemeClr val="tx1"/>
+                </a:solidFill>
+                <a:prstDash val="lgDash"/>
+              </a:ln>
+            </p:spPr>
+            <p:style>
+              <a:lnRef idx="2">
+                <a:schemeClr val="accent1">
+                  <a:shade val="15000"/>
+                </a:schemeClr>
+              </a:lnRef>
+              <a:fillRef idx="1">
+                <a:schemeClr val="accent1"/>
+              </a:fillRef>
+              <a:effectRef idx="0">
+                <a:schemeClr val="accent1"/>
+              </a:effectRef>
+              <a:fontRef idx="minor">
+                <a:schemeClr val="lt1"/>
+              </a:fontRef>
+            </p:style>
+            <p:txBody>
+              <a:bodyPr rtlCol="0" anchor="ctr"/>
+              <a:lstStyle/>
+              <a:p>
+                <a:pPr algn="ctr"/>
+                <a:endParaRPr lang="de-DE"/>
+              </a:p>
+            </p:txBody>
+          </p:sp>
+          <p:sp>
+            <p:nvSpPr>
+              <p:cNvPr id="62" name="Rechteck 61">
+                <a:extLst>
+                  <a:ext uri="{FF2B5EF4-FFF2-40B4-BE49-F238E27FC236}">
+                    <a16:creationId xmlns:a16="http://schemas.microsoft.com/office/drawing/2014/main" id="{B98FBEB2-66D9-F27D-E54D-1D74496FEDAB}"/>
+                  </a:ext>
+                </a:extLst>
+              </p:cNvPr>
+              <p:cNvSpPr/>
+              <p:nvPr/>
+            </p:nvSpPr>
+            <p:spPr>
+              <a:xfrm>
+                <a:off x="2032000" y="2379133"/>
+                <a:ext cx="6096000" cy="372533"/>
+              </a:xfrm>
+              <a:prstGeom prst="rect">
+                <a:avLst/>
+              </a:prstGeom>
+              <a:noFill/>
+              <a:ln>
+                <a:noFill/>
+                <a:prstDash val="lgDash"/>
+              </a:ln>
+            </p:spPr>
+            <p:style>
+              <a:lnRef idx="2">
+                <a:schemeClr val="accent1">
+                  <a:shade val="15000"/>
+                </a:schemeClr>
+              </a:lnRef>
+              <a:fillRef idx="1">
+                <a:schemeClr val="accent1"/>
+              </a:fillRef>
+              <a:effectRef idx="0">
+                <a:schemeClr val="accent1"/>
+              </a:effectRef>
+              <a:fontRef idx="minor">
+                <a:schemeClr val="lt1"/>
+              </a:fontRef>
+            </p:style>
+            <p:txBody>
+              <a:bodyPr rtlCol="0" anchor="ctr"/>
+              <a:lstStyle/>
+              <a:p>
+                <a:pPr algn="ctr"/>
+                <a:endParaRPr lang="de-DE"/>
+              </a:p>
+            </p:txBody>
+          </p:sp>
+          <p:sp>
+            <p:nvSpPr>
+              <p:cNvPr id="63" name="Rechteck 62">
+                <a:extLst>
+                  <a:ext uri="{FF2B5EF4-FFF2-40B4-BE49-F238E27FC236}">
+                    <a16:creationId xmlns:a16="http://schemas.microsoft.com/office/drawing/2014/main" id="{80699051-9CC7-C78A-BA86-171AD604C5CA}"/>
+                  </a:ext>
+                </a:extLst>
+              </p:cNvPr>
+              <p:cNvSpPr/>
+              <p:nvPr/>
+            </p:nvSpPr>
+            <p:spPr>
+              <a:xfrm>
+                <a:off x="2032000" y="2751666"/>
+                <a:ext cx="6096000" cy="372533"/>
+              </a:xfrm>
+              <a:prstGeom prst="rect">
+                <a:avLst/>
+              </a:prstGeom>
+              <a:noFill/>
+              <a:ln>
+                <a:solidFill>
+                  <a:schemeClr val="tx1"/>
+                </a:solidFill>
+                <a:prstDash val="lgDash"/>
+              </a:ln>
+            </p:spPr>
+            <p:style>
+              <a:lnRef idx="2">
+                <a:schemeClr val="accent1">
+                  <a:shade val="15000"/>
+                </a:schemeClr>
+              </a:lnRef>
+              <a:fillRef idx="1">
+                <a:schemeClr val="accent1"/>
+              </a:fillRef>
+              <a:effectRef idx="0">
+                <a:schemeClr val="accent1"/>
+              </a:effectRef>
+              <a:fontRef idx="minor">
+                <a:schemeClr val="lt1"/>
+              </a:fontRef>
+            </p:style>
+            <p:txBody>
+              <a:bodyPr rtlCol="0" anchor="ctr"/>
+              <a:lstStyle/>
+              <a:p>
+                <a:pPr algn="ctr"/>
+                <a:endParaRPr lang="de-DE"/>
+              </a:p>
+            </p:txBody>
+          </p:sp>
+        </p:grpSp>
+        <p:sp>
+          <p:nvSpPr>
+            <p:cNvPr id="58" name="Ellipse 57">
+              <a:extLst>
+                <a:ext uri="{FF2B5EF4-FFF2-40B4-BE49-F238E27FC236}">
+                  <a16:creationId xmlns:a16="http://schemas.microsoft.com/office/drawing/2014/main" id="{9E9CCE11-4582-9625-4B36-0E4763386237}"/>
+                </a:ext>
+              </a:extLst>
+            </p:cNvPr>
+            <p:cNvSpPr/>
+            <p:nvPr/>
+          </p:nvSpPr>
+          <p:spPr>
+            <a:xfrm>
+              <a:off x="4329007" y="3406139"/>
+              <a:ext cx="45719" cy="45719"/>
+            </a:xfrm>
+            <a:prstGeom prst="ellipse">
+              <a:avLst/>
+            </a:prstGeom>
+          </p:spPr>
+          <p:style>
+            <a:lnRef idx="2">
+              <a:schemeClr val="accent1">
+                <a:shade val="15000"/>
+              </a:schemeClr>
+            </a:lnRef>
+            <a:fillRef idx="1">
+              <a:schemeClr val="accent1"/>
+            </a:fillRef>
+            <a:effectRef idx="0">
+              <a:schemeClr val="accent1"/>
+            </a:effectRef>
+            <a:fontRef idx="minor">
+              <a:schemeClr val="lt1"/>
+            </a:fontRef>
+          </p:style>
+          <p:txBody>
+            <a:bodyPr rtlCol="0" anchor="ctr"/>
+            <a:lstStyle/>
+            <a:p>
+              <a:pPr algn="ctr"/>
+              <a:endParaRPr lang="de-DE"/>
+            </a:p>
+          </p:txBody>
+        </p:sp>
+        <p:sp>
+          <p:nvSpPr>
+            <p:cNvPr id="59" name="Ellipse 58">
+              <a:extLst>
+                <a:ext uri="{FF2B5EF4-FFF2-40B4-BE49-F238E27FC236}">
+                  <a16:creationId xmlns:a16="http://schemas.microsoft.com/office/drawing/2014/main" id="{3845585E-8E70-FEAC-96F4-F24DC2F3D7BC}"/>
+                </a:ext>
+              </a:extLst>
+            </p:cNvPr>
+            <p:cNvSpPr/>
+            <p:nvPr/>
+          </p:nvSpPr>
+          <p:spPr>
+            <a:xfrm>
+              <a:off x="739141" y="3407921"/>
               <a:ext cx="45719" cy="45719"/>
             </a:xfrm>
             <a:prstGeom prst="ellipse">
@@ -23709,4 +25607,299 @@
     </a:ext>
   </a:extLst>
 </a:theme>
+</file>
+
+<file path=ppt/theme/theme2.xml><?xml version="1.0" encoding="utf-8"?>
+<a:theme xmlns:a="http://schemas.openxmlformats.org/drawingml/2006/main" name="Office">
+  <a:themeElements>
+    <a:clrScheme name="Office">
+      <a:dk1>
+        <a:sysClr val="windowText" lastClr="000000"/>
+      </a:dk1>
+      <a:lt1>
+        <a:sysClr val="window" lastClr="FFFFFF"/>
+      </a:lt1>
+      <a:dk2>
+        <a:srgbClr val="44546A"/>
+      </a:dk2>
+      <a:lt2>
+        <a:srgbClr val="E7E6E6"/>
+      </a:lt2>
+      <a:accent1>
+        <a:srgbClr val="4472C4"/>
+      </a:accent1>
+      <a:accent2>
+        <a:srgbClr val="ED7D31"/>
+      </a:accent2>
+      <a:accent3>
+        <a:srgbClr val="A5A5A5"/>
+      </a:accent3>
+      <a:accent4>
+        <a:srgbClr val="FFC000"/>
+      </a:accent4>
+      <a:accent5>
+        <a:srgbClr val="5B9BD5"/>
+      </a:accent5>
+      <a:accent6>
+        <a:srgbClr val="70AD47"/>
+      </a:accent6>
+      <a:hlink>
+        <a:srgbClr val="0563C1"/>
+      </a:hlink>
+      <a:folHlink>
+        <a:srgbClr val="954F72"/>
+      </a:folHlink>
+    </a:clrScheme>
+    <a:fontScheme name="Office">
+      <a:majorFont>
+        <a:latin typeface="Calibri Light" panose="020F0302020204030204"/>
+        <a:ea typeface=""/>
+        <a:cs typeface=""/>
+        <a:font script="Jpan" typeface="游ゴシック Light"/>
+        <a:font script="Hang" typeface="맑은 고딕"/>
+        <a:font script="Hans" typeface="等线 Light"/>
+        <a:font script="Hant" typeface="新細明體"/>
+        <a:font script="Arab" typeface="Times New Roman"/>
+        <a:font script="Hebr" typeface="Times New Roman"/>
+        <a:font script="Thai" typeface="Angsana New"/>
+        <a:font script="Ethi" typeface="Nyala"/>
+        <a:font script="Beng" typeface="Vrinda"/>
+        <a:font script="Gujr" typeface="Shruti"/>
+        <a:font script="Khmr" typeface="MoolBoran"/>
+        <a:font script="Knda" typeface="Tunga"/>
+        <a:font script="Guru" typeface="Raavi"/>
+        <a:font script="Cans" typeface="Euphemia"/>
+        <a:font script="Cher" typeface="Plantagenet Cherokee"/>
+        <a:font script="Yiii" typeface="Microsoft Yi Baiti"/>
+        <a:font script="Tibt" typeface="Microsoft Himalaya"/>
+        <a:font script="Thaa" typeface="MV Boli"/>
+        <a:font script="Deva" typeface="Mangal"/>
+        <a:font script="Telu" typeface="Gautami"/>
+        <a:font script="Taml" typeface="Latha"/>
+        <a:font script="Syrc" typeface="Estrangelo Edessa"/>
+        <a:font script="Orya" typeface="Kalinga"/>
+        <a:font script="Mlym" typeface="Kartika"/>
+        <a:font script="Laoo" typeface="DokChampa"/>
+        <a:font script="Sinh" typeface="Iskoola Pota"/>
+        <a:font script="Mong" typeface="Mongolian Baiti"/>
+        <a:font script="Viet" typeface="Times New Roman"/>
+        <a:font script="Uigh" typeface="Microsoft Uighur"/>
+        <a:font script="Geor" typeface="Sylfaen"/>
+        <a:font script="Armn" typeface="Arial"/>
+        <a:font script="Bugi" typeface="Leelawadee UI"/>
+        <a:font script="Bopo" typeface="Microsoft JhengHei"/>
+        <a:font script="Java" typeface="Javanese Text"/>
+        <a:font script="Lisu" typeface="Segoe UI"/>
+        <a:font script="Mymr" typeface="Myanmar Text"/>
+        <a:font script="Nkoo" typeface="Ebrima"/>
+        <a:font script="Olck" typeface="Nirmala UI"/>
+        <a:font script="Osma" typeface="Ebrima"/>
+        <a:font script="Phag" typeface="Phagspa"/>
+        <a:font script="Syrn" typeface="Estrangelo Edessa"/>
+        <a:font script="Syrj" typeface="Estrangelo Edessa"/>
+        <a:font script="Syre" typeface="Estrangelo Edessa"/>
+        <a:font script="Sora" typeface="Nirmala UI"/>
+        <a:font script="Tale" typeface="Microsoft Tai Le"/>
+        <a:font script="Talu" typeface="Microsoft New Tai Lue"/>
+        <a:font script="Tfng" typeface="Ebrima"/>
+      </a:majorFont>
+      <a:minorFont>
+        <a:latin typeface="Calibri" panose="020F0502020204030204"/>
+        <a:ea typeface=""/>
+        <a:cs typeface=""/>
+        <a:font script="Jpan" typeface="游ゴシック"/>
+        <a:font script="Hang" typeface="맑은 고딕"/>
+        <a:font script="Hans" typeface="等线"/>
+        <a:font script="Hant" typeface="新細明體"/>
+        <a:font script="Arab" typeface="Arial"/>
+        <a:font script="Hebr" typeface="Arial"/>
+        <a:font script="Thai" typeface="Cordia New"/>
+        <a:font script="Ethi" typeface="Nyala"/>
+        <a:font script="Beng" typeface="Vrinda"/>
+        <a:font script="Gujr" typeface="Shruti"/>
+        <a:font script="Khmr" typeface="DaunPenh"/>
+        <a:font script="Knda" typeface="Tunga"/>
+        <a:font script="Guru" typeface="Raavi"/>
+        <a:font script="Cans" typeface="Euphemia"/>
+        <a:font script="Cher" typeface="Plantagenet Cherokee"/>
+        <a:font script="Yiii" typeface="Microsoft Yi Baiti"/>
+        <a:font script="Tibt" typeface="Microsoft Himalaya"/>
+        <a:font script="Thaa" typeface="MV Boli"/>
+        <a:font script="Deva" typeface="Mangal"/>
+        <a:font script="Telu" typeface="Gautami"/>
+        <a:font script="Taml" typeface="Latha"/>
+        <a:font script="Syrc" typeface="Estrangelo Edessa"/>
+        <a:font script="Orya" typeface="Kalinga"/>
+        <a:font script="Mlym" typeface="Kartika"/>
+        <a:font script="Laoo" typeface="DokChampa"/>
+        <a:font script="Sinh" typeface="Iskoola Pota"/>
+        <a:font script="Mong" typeface="Mongolian Baiti"/>
+        <a:font script="Viet" typeface="Arial"/>
+        <a:font script="Uigh" typeface="Microsoft Uighur"/>
+        <a:font script="Geor" typeface="Sylfaen"/>
+        <a:font script="Armn" typeface="Arial"/>
+        <a:font script="Bugi" typeface="Leelawadee UI"/>
+        <a:font script="Bopo" typeface="Microsoft JhengHei"/>
+        <a:font script="Java" typeface="Javanese Text"/>
+        <a:font script="Lisu" typeface="Segoe UI"/>
+        <a:font script="Mymr" typeface="Myanmar Text"/>
+        <a:font script="Nkoo" typeface="Ebrima"/>
+        <a:font script="Olck" typeface="Nirmala UI"/>
+        <a:font script="Osma" typeface="Ebrima"/>
+        <a:font script="Phag" typeface="Phagspa"/>
+        <a:font script="Syrn" typeface="Estrangelo Edessa"/>
+        <a:font script="Syrj" typeface="Estrangelo Edessa"/>
+        <a:font script="Syre" typeface="Estrangelo Edessa"/>
+        <a:font script="Sora" typeface="Nirmala UI"/>
+        <a:font script="Tale" typeface="Microsoft Tai Le"/>
+        <a:font script="Talu" typeface="Microsoft New Tai Lue"/>
+        <a:font script="Tfng" typeface="Ebrima"/>
+      </a:minorFont>
+    </a:fontScheme>
+    <a:fmtScheme name="Office">
+      <a:fillStyleLst>
+        <a:solidFill>
+          <a:schemeClr val="phClr"/>
+        </a:solidFill>
+        <a:gradFill rotWithShape="1">
+          <a:gsLst>
+            <a:gs pos="0">
+              <a:schemeClr val="phClr">
+                <a:lumMod val="110000"/>
+                <a:satMod val="105000"/>
+                <a:tint val="67000"/>
+              </a:schemeClr>
+            </a:gs>
+            <a:gs pos="50000">
+              <a:schemeClr val="phClr">
+                <a:lumMod val="105000"/>
+                <a:satMod val="103000"/>
+                <a:tint val="73000"/>
+              </a:schemeClr>
+            </a:gs>
+            <a:gs pos="100000">
+              <a:schemeClr val="phClr">
+                <a:lumMod val="105000"/>
+                <a:satMod val="109000"/>
+                <a:tint val="81000"/>
+              </a:schemeClr>
+            </a:gs>
+          </a:gsLst>
+          <a:lin ang="5400000" scaled="0"/>
+        </a:gradFill>
+        <a:gradFill rotWithShape="1">
+          <a:gsLst>
+            <a:gs pos="0">
+              <a:schemeClr val="phClr">
+                <a:satMod val="103000"/>
+                <a:lumMod val="102000"/>
+                <a:tint val="94000"/>
+              </a:schemeClr>
+            </a:gs>
+            <a:gs pos="50000">
+              <a:schemeClr val="phClr">
+                <a:satMod val="110000"/>
+                <a:lumMod val="100000"/>
+                <a:shade val="100000"/>
+              </a:schemeClr>
+            </a:gs>
+            <a:gs pos="100000">
+              <a:schemeClr val="phClr">
+                <a:lumMod val="99000"/>
+                <a:satMod val="120000"/>
+                <a:shade val="78000"/>
+              </a:schemeClr>
+            </a:gs>
+          </a:gsLst>
+          <a:lin ang="5400000" scaled="0"/>
+        </a:gradFill>
+      </a:fillStyleLst>
+      <a:lnStyleLst>
+        <a:ln w="6350" cap="flat" cmpd="sng" algn="ctr">
+          <a:solidFill>
+            <a:schemeClr val="phClr"/>
+          </a:solidFill>
+          <a:prstDash val="solid"/>
+          <a:miter lim="800000"/>
+        </a:ln>
+        <a:ln w="12700" cap="flat" cmpd="sng" algn="ctr">
+          <a:solidFill>
+            <a:schemeClr val="phClr"/>
+          </a:solidFill>
+          <a:prstDash val="solid"/>
+          <a:miter lim="800000"/>
+        </a:ln>
+        <a:ln w="19050" cap="flat" cmpd="sng" algn="ctr">
+          <a:solidFill>
+            <a:schemeClr val="phClr"/>
+          </a:solidFill>
+          <a:prstDash val="solid"/>
+          <a:miter lim="800000"/>
+        </a:ln>
+      </a:lnStyleLst>
+      <a:effectStyleLst>
+        <a:effectStyle>
+          <a:effectLst/>
+        </a:effectStyle>
+        <a:effectStyle>
+          <a:effectLst/>
+        </a:effectStyle>
+        <a:effectStyle>
+          <a:effectLst>
+            <a:outerShdw blurRad="57150" dist="19050" dir="5400000" algn="ctr" rotWithShape="0">
+              <a:srgbClr val="000000">
+                <a:alpha val="63000"/>
+              </a:srgbClr>
+            </a:outerShdw>
+          </a:effectLst>
+        </a:effectStyle>
+      </a:effectStyleLst>
+      <a:bgFillStyleLst>
+        <a:solidFill>
+          <a:schemeClr val="phClr"/>
+        </a:solidFill>
+        <a:solidFill>
+          <a:schemeClr val="phClr">
+            <a:tint val="95000"/>
+            <a:satMod val="170000"/>
+          </a:schemeClr>
+        </a:solidFill>
+        <a:gradFill rotWithShape="1">
+          <a:gsLst>
+            <a:gs pos="0">
+              <a:schemeClr val="phClr">
+                <a:tint val="93000"/>
+                <a:satMod val="150000"/>
+                <a:shade val="98000"/>
+                <a:lumMod val="102000"/>
+              </a:schemeClr>
+            </a:gs>
+            <a:gs pos="50000">
+              <a:schemeClr val="phClr">
+                <a:tint val="98000"/>
+                <a:satMod val="130000"/>
+                <a:shade val="90000"/>
+                <a:lumMod val="103000"/>
+              </a:schemeClr>
+            </a:gs>
+            <a:gs pos="100000">
+              <a:schemeClr val="phClr">
+                <a:shade val="63000"/>
+                <a:satMod val="120000"/>
+              </a:schemeClr>
+            </a:gs>
+          </a:gsLst>
+          <a:lin ang="5400000" scaled="0"/>
+        </a:gradFill>
+      </a:bgFillStyleLst>
+    </a:fmtScheme>
+  </a:themeElements>
+  <a:objectDefaults/>
+  <a:extraClrSchemeLst/>
+  <a:extLst>
+    <a:ext uri="{05A4C25C-085E-4340-85A3-A5531E510DB2}">
+      <thm15:themeFamily xmlns:thm15="http://schemas.microsoft.com/office/thememl/2012/main" name="Office Theme" id="{62F939B6-93AF-4DB8-9C6B-D6C7DFDC589F}" vid="{4A3C46E8-61CC-4603-A589-7422A47A8E4A}"/>
+    </a:ext>
+  </a:extLst>
+</a:theme>
 </file>
</xml_diff>

<commit_message>
Added lane center lines to crossings
</commit_message>
<xml_diff>
--- a/examples/UrbanTopologies.pptx
+++ b/examples/UrbanTopologies.pptx
@@ -6,7 +6,7 @@
     <p:sldMasterId id="2147483660" r:id="rId2"/>
   </p:sldMasterIdLst>
   <p:notesMasterIdLst>
-    <p:notesMasterId r:id="rId17"/>
+    <p:notesMasterId r:id="rId18"/>
   </p:notesMasterIdLst>
   <p:sldIdLst>
     <p:sldId id="268" r:id="rId3"/>
@@ -23,6 +23,7 @@
     <p:sldId id="258" r:id="rId14"/>
     <p:sldId id="269" r:id="rId15"/>
     <p:sldId id="270" r:id="rId16"/>
+    <p:sldId id="271" r:id="rId17"/>
   </p:sldIdLst>
   <p:sldSz cx="12192000" cy="6858000"/>
   <p:notesSz cx="6858000" cy="9144000"/>
@@ -211,7 +212,7 @@
           <a:p>
             <a:fld id="{6C57E5E1-517F-429D-81ED-272A083D513A}" type="datetimeFigureOut">
               <a:rPr lang="de-DE" smtClean="0"/>
-              <a:t>28.04.2025</a:t>
+              <a:t>12.05.2025</a:t>
             </a:fld>
             <a:endParaRPr lang="de-DE"/>
           </a:p>
@@ -709,7 +710,7 @@
           <a:p>
             <a:fld id="{F3EB2857-2321-4C4D-8D06-77DF79DF910F}" type="datetimeFigureOut">
               <a:rPr lang="de-DE" smtClean="0"/>
-              <a:t>28.04.2025</a:t>
+              <a:t>12.05.2025</a:t>
             </a:fld>
             <a:endParaRPr lang="de-DE"/>
           </a:p>
@@ -907,7 +908,7 @@
           <a:p>
             <a:fld id="{F3EB2857-2321-4C4D-8D06-77DF79DF910F}" type="datetimeFigureOut">
               <a:rPr lang="de-DE" smtClean="0"/>
-              <a:t>28.04.2025</a:t>
+              <a:t>12.05.2025</a:t>
             </a:fld>
             <a:endParaRPr lang="de-DE"/>
           </a:p>
@@ -1115,7 +1116,7 @@
           <a:p>
             <a:fld id="{F3EB2857-2321-4C4D-8D06-77DF79DF910F}" type="datetimeFigureOut">
               <a:rPr lang="de-DE" smtClean="0"/>
-              <a:t>28.04.2025</a:t>
+              <a:t>12.05.2025</a:t>
             </a:fld>
             <a:endParaRPr lang="de-DE"/>
           </a:p>
@@ -1335,7 +1336,7 @@
           <a:p>
             <a:fld id="{93318F87-FAB0-47FE-97DA-44085A772572}" type="datetimeFigureOut">
               <a:rPr lang="de-DE" smtClean="0"/>
-              <a:t>28.04.2025</a:t>
+              <a:t>12.05.2025</a:t>
             </a:fld>
             <a:endParaRPr lang="de-DE"/>
           </a:p>
@@ -1533,7 +1534,7 @@
           <a:p>
             <a:fld id="{93318F87-FAB0-47FE-97DA-44085A772572}" type="datetimeFigureOut">
               <a:rPr lang="de-DE" smtClean="0"/>
-              <a:t>28.04.2025</a:t>
+              <a:t>12.05.2025</a:t>
             </a:fld>
             <a:endParaRPr lang="de-DE"/>
           </a:p>
@@ -1808,7 +1809,7 @@
           <a:p>
             <a:fld id="{93318F87-FAB0-47FE-97DA-44085A772572}" type="datetimeFigureOut">
               <a:rPr lang="de-DE" smtClean="0"/>
-              <a:t>28.04.2025</a:t>
+              <a:t>12.05.2025</a:t>
             </a:fld>
             <a:endParaRPr lang="de-DE"/>
           </a:p>
@@ -2073,7 +2074,7 @@
           <a:p>
             <a:fld id="{93318F87-FAB0-47FE-97DA-44085A772572}" type="datetimeFigureOut">
               <a:rPr lang="de-DE" smtClean="0"/>
-              <a:t>28.04.2025</a:t>
+              <a:t>12.05.2025</a:t>
             </a:fld>
             <a:endParaRPr lang="de-DE"/>
           </a:p>
@@ -2485,7 +2486,7 @@
           <a:p>
             <a:fld id="{93318F87-FAB0-47FE-97DA-44085A772572}" type="datetimeFigureOut">
               <a:rPr lang="de-DE" smtClean="0"/>
-              <a:t>28.04.2025</a:t>
+              <a:t>12.05.2025</a:t>
             </a:fld>
             <a:endParaRPr lang="de-DE"/>
           </a:p>
@@ -2626,7 +2627,7 @@
           <a:p>
             <a:fld id="{93318F87-FAB0-47FE-97DA-44085A772572}" type="datetimeFigureOut">
               <a:rPr lang="de-DE" smtClean="0"/>
-              <a:t>28.04.2025</a:t>
+              <a:t>12.05.2025</a:t>
             </a:fld>
             <a:endParaRPr lang="de-DE"/>
           </a:p>
@@ -2739,7 +2740,7 @@
           <a:p>
             <a:fld id="{93318F87-FAB0-47FE-97DA-44085A772572}" type="datetimeFigureOut">
               <a:rPr lang="de-DE" smtClean="0"/>
-              <a:t>28.04.2025</a:t>
+              <a:t>12.05.2025</a:t>
             </a:fld>
             <a:endParaRPr lang="de-DE"/>
           </a:p>
@@ -3050,7 +3051,7 @@
           <a:p>
             <a:fld id="{93318F87-FAB0-47FE-97DA-44085A772572}" type="datetimeFigureOut">
               <a:rPr lang="de-DE" smtClean="0"/>
-              <a:t>28.04.2025</a:t>
+              <a:t>12.05.2025</a:t>
             </a:fld>
             <a:endParaRPr lang="de-DE"/>
           </a:p>
@@ -3248,7 +3249,7 @@
           <a:p>
             <a:fld id="{F3EB2857-2321-4C4D-8D06-77DF79DF910F}" type="datetimeFigureOut">
               <a:rPr lang="de-DE" smtClean="0"/>
-              <a:t>28.04.2025</a:t>
+              <a:t>12.05.2025</a:t>
             </a:fld>
             <a:endParaRPr lang="de-DE"/>
           </a:p>
@@ -3536,7 +3537,7 @@
           <a:p>
             <a:fld id="{93318F87-FAB0-47FE-97DA-44085A772572}" type="datetimeFigureOut">
               <a:rPr lang="de-DE" smtClean="0"/>
-              <a:t>28.04.2025</a:t>
+              <a:t>12.05.2025</a:t>
             </a:fld>
             <a:endParaRPr lang="de-DE"/>
           </a:p>
@@ -3734,7 +3735,7 @@
           <a:p>
             <a:fld id="{93318F87-FAB0-47FE-97DA-44085A772572}" type="datetimeFigureOut">
               <a:rPr lang="de-DE" smtClean="0"/>
-              <a:t>28.04.2025</a:t>
+              <a:t>12.05.2025</a:t>
             </a:fld>
             <a:endParaRPr lang="de-DE"/>
           </a:p>
@@ -3942,7 +3943,7 @@
           <a:p>
             <a:fld id="{93318F87-FAB0-47FE-97DA-44085A772572}" type="datetimeFigureOut">
               <a:rPr lang="de-DE" smtClean="0"/>
-              <a:t>28.04.2025</a:t>
+              <a:t>12.05.2025</a:t>
             </a:fld>
             <a:endParaRPr lang="de-DE"/>
           </a:p>
@@ -4217,7 +4218,7 @@
           <a:p>
             <a:fld id="{F3EB2857-2321-4C4D-8D06-77DF79DF910F}" type="datetimeFigureOut">
               <a:rPr lang="de-DE" smtClean="0"/>
-              <a:t>28.04.2025</a:t>
+              <a:t>12.05.2025</a:t>
             </a:fld>
             <a:endParaRPr lang="de-DE"/>
           </a:p>
@@ -4482,7 +4483,7 @@
           <a:p>
             <a:fld id="{F3EB2857-2321-4C4D-8D06-77DF79DF910F}" type="datetimeFigureOut">
               <a:rPr lang="de-DE" smtClean="0"/>
-              <a:t>28.04.2025</a:t>
+              <a:t>12.05.2025</a:t>
             </a:fld>
             <a:endParaRPr lang="de-DE"/>
           </a:p>
@@ -4894,7 +4895,7 @@
           <a:p>
             <a:fld id="{F3EB2857-2321-4C4D-8D06-77DF79DF910F}" type="datetimeFigureOut">
               <a:rPr lang="de-DE" smtClean="0"/>
-              <a:t>28.04.2025</a:t>
+              <a:t>12.05.2025</a:t>
             </a:fld>
             <a:endParaRPr lang="de-DE"/>
           </a:p>
@@ -5035,7 +5036,7 @@
           <a:p>
             <a:fld id="{F3EB2857-2321-4C4D-8D06-77DF79DF910F}" type="datetimeFigureOut">
               <a:rPr lang="de-DE" smtClean="0"/>
-              <a:t>28.04.2025</a:t>
+              <a:t>12.05.2025</a:t>
             </a:fld>
             <a:endParaRPr lang="de-DE"/>
           </a:p>
@@ -5148,7 +5149,7 @@
           <a:p>
             <a:fld id="{F3EB2857-2321-4C4D-8D06-77DF79DF910F}" type="datetimeFigureOut">
               <a:rPr lang="de-DE" smtClean="0"/>
-              <a:t>28.04.2025</a:t>
+              <a:t>12.05.2025</a:t>
             </a:fld>
             <a:endParaRPr lang="de-DE"/>
           </a:p>
@@ -5459,7 +5460,7 @@
           <a:p>
             <a:fld id="{F3EB2857-2321-4C4D-8D06-77DF79DF910F}" type="datetimeFigureOut">
               <a:rPr lang="de-DE" smtClean="0"/>
-              <a:t>28.04.2025</a:t>
+              <a:t>12.05.2025</a:t>
             </a:fld>
             <a:endParaRPr lang="de-DE"/>
           </a:p>
@@ -5747,7 +5748,7 @@
           <a:p>
             <a:fld id="{F3EB2857-2321-4C4D-8D06-77DF79DF910F}" type="datetimeFigureOut">
               <a:rPr lang="de-DE" smtClean="0"/>
-              <a:t>28.04.2025</a:t>
+              <a:t>12.05.2025</a:t>
             </a:fld>
             <a:endParaRPr lang="de-DE"/>
           </a:p>
@@ -5988,7 +5989,7 @@
           <a:p>
             <a:fld id="{F3EB2857-2321-4C4D-8D06-77DF79DF910F}" type="datetimeFigureOut">
               <a:rPr lang="de-DE" smtClean="0"/>
-              <a:t>28.04.2025</a:t>
+              <a:t>12.05.2025</a:t>
             </a:fld>
             <a:endParaRPr lang="de-DE"/>
           </a:p>
@@ -6556,7 +6557,7 @@
           <a:p>
             <a:fld id="{93318F87-FAB0-47FE-97DA-44085A772572}" type="datetimeFigureOut">
               <a:rPr lang="de-DE" smtClean="0"/>
-              <a:t>28.04.2025</a:t>
+              <a:t>12.05.2025</a:t>
             </a:fld>
             <a:endParaRPr lang="de-DE"/>
           </a:p>
@@ -20924,6 +20925,405 @@
 </p:sld>
 </file>
 
+<file path=ppt/slides/slide15.xml><?xml version="1.0" encoding="utf-8"?>
+<p:sld xmlns:a="http://schemas.openxmlformats.org/drawingml/2006/main" xmlns:r="http://schemas.openxmlformats.org/officeDocument/2006/relationships" xmlns:p="http://schemas.openxmlformats.org/presentationml/2006/main">
+  <p:cSld>
+    <p:spTree>
+      <p:nvGrpSpPr>
+        <p:cNvPr id="1" name=""/>
+        <p:cNvGrpSpPr/>
+        <p:nvPr/>
+      </p:nvGrpSpPr>
+      <p:grpSpPr>
+        <a:xfrm>
+          <a:off x="0" y="0"/>
+          <a:ext cx="0" cy="0"/>
+          <a:chOff x="0" y="0"/>
+          <a:chExt cx="0" cy="0"/>
+        </a:xfrm>
+      </p:grpSpPr>
+      <p:pic>
+        <p:nvPicPr>
+          <p:cNvPr id="5" name="Grafik 4">
+            <a:extLst>
+              <a:ext uri="{FF2B5EF4-FFF2-40B4-BE49-F238E27FC236}">
+                <a16:creationId xmlns:a16="http://schemas.microsoft.com/office/drawing/2014/main" id="{E20606DD-2019-7750-3747-4C1257DFDE76}"/>
+              </a:ext>
+            </a:extLst>
+          </p:cNvPr>
+          <p:cNvPicPr>
+            <a:picLocks noChangeAspect="1"/>
+          </p:cNvPicPr>
+          <p:nvPr/>
+        </p:nvPicPr>
+        <p:blipFill>
+          <a:blip r:embed="rId2"/>
+          <a:stretch>
+            <a:fillRect/>
+          </a:stretch>
+        </p:blipFill>
+        <p:spPr>
+          <a:xfrm>
+            <a:off x="70757" y="0"/>
+            <a:ext cx="12050486" cy="6858000"/>
+          </a:xfrm>
+          <a:prstGeom prst="rect">
+            <a:avLst/>
+          </a:prstGeom>
+        </p:spPr>
+      </p:pic>
+      <p:grpSp>
+        <p:nvGrpSpPr>
+          <p:cNvPr id="10" name="Gruppieren 9">
+            <a:extLst>
+              <a:ext uri="{FF2B5EF4-FFF2-40B4-BE49-F238E27FC236}">
+                <a16:creationId xmlns:a16="http://schemas.microsoft.com/office/drawing/2014/main" id="{B90A9061-EDE2-DA49-BF02-F4308151E04E}"/>
+              </a:ext>
+            </a:extLst>
+          </p:cNvPr>
+          <p:cNvGrpSpPr/>
+          <p:nvPr/>
+        </p:nvGrpSpPr>
+        <p:grpSpPr>
+          <a:xfrm>
+            <a:off x="5833354" y="587931"/>
+            <a:ext cx="5947416" cy="5939328"/>
+            <a:chOff x="2568102" y="335012"/>
+            <a:chExt cx="5947416" cy="5939328"/>
+          </a:xfrm>
+        </p:grpSpPr>
+        <p:pic>
+          <p:nvPicPr>
+            <p:cNvPr id="8" name="Grafik 7">
+              <a:extLst>
+                <a:ext uri="{FF2B5EF4-FFF2-40B4-BE49-F238E27FC236}">
+                  <a16:creationId xmlns:a16="http://schemas.microsoft.com/office/drawing/2014/main" id="{11A470F5-3C8C-2547-CFB6-87F1801F91C0}"/>
+                </a:ext>
+              </a:extLst>
+            </p:cNvPr>
+            <p:cNvPicPr>
+              <a:picLocks noChangeAspect="1"/>
+            </p:cNvPicPr>
+            <p:nvPr/>
+          </p:nvPicPr>
+          <p:blipFill>
+            <a:blip r:embed="rId3"/>
+            <a:srcRect l="6556" r="20205" b="4018"/>
+            <a:stretch/>
+          </p:blipFill>
+          <p:spPr>
+            <a:xfrm>
+              <a:off x="2568102" y="335012"/>
+              <a:ext cx="5947416" cy="5939328"/>
+            </a:xfrm>
+            <a:prstGeom prst="rect">
+              <a:avLst/>
+            </a:prstGeom>
+          </p:spPr>
+        </p:pic>
+        <p:pic>
+          <p:nvPicPr>
+            <p:cNvPr id="9" name="Grafik 8">
+              <a:extLst>
+                <a:ext uri="{FF2B5EF4-FFF2-40B4-BE49-F238E27FC236}">
+                  <a16:creationId xmlns:a16="http://schemas.microsoft.com/office/drawing/2014/main" id="{D5B369CE-198A-78A0-4231-DB6E3EAC8879}"/>
+                </a:ext>
+              </a:extLst>
+            </p:cNvPr>
+            <p:cNvPicPr>
+              <a:picLocks noChangeAspect="1"/>
+            </p:cNvPicPr>
+            <p:nvPr/>
+          </p:nvPicPr>
+          <p:blipFill>
+            <a:blip r:embed="rId3"/>
+            <a:srcRect r="26861" b="3887"/>
+            <a:stretch/>
+          </p:blipFill>
+          <p:spPr>
+            <a:xfrm rot="5400000">
+              <a:off x="2572146" y="330968"/>
+              <a:ext cx="5939328" cy="5947416"/>
+            </a:xfrm>
+            <a:prstGeom prst="rect">
+              <a:avLst/>
+            </a:prstGeom>
+          </p:spPr>
+        </p:pic>
+      </p:grpSp>
+      <p:sp>
+        <p:nvSpPr>
+          <p:cNvPr id="2" name="Rechteck 1">
+            <a:extLst>
+              <a:ext uri="{FF2B5EF4-FFF2-40B4-BE49-F238E27FC236}">
+                <a16:creationId xmlns:a16="http://schemas.microsoft.com/office/drawing/2014/main" id="{4EE024C5-3871-A345-7089-287FB034D6FE}"/>
+              </a:ext>
+            </a:extLst>
+          </p:cNvPr>
+          <p:cNvSpPr/>
+          <p:nvPr/>
+        </p:nvSpPr>
+        <p:spPr>
+          <a:xfrm>
+            <a:off x="9678838" y="4217707"/>
+            <a:ext cx="319177" cy="120770"/>
+          </a:xfrm>
+          <a:prstGeom prst="rect">
+            <a:avLst/>
+          </a:prstGeom>
+          <a:solidFill>
+            <a:srgbClr val="FF0000"/>
+          </a:solidFill>
+        </p:spPr>
+        <p:style>
+          <a:lnRef idx="2">
+            <a:schemeClr val="accent1">
+              <a:shade val="15000"/>
+            </a:schemeClr>
+          </a:lnRef>
+          <a:fillRef idx="1">
+            <a:schemeClr val="accent1"/>
+          </a:fillRef>
+          <a:effectRef idx="0">
+            <a:schemeClr val="accent1"/>
+          </a:effectRef>
+          <a:fontRef idx="minor">
+            <a:schemeClr val="lt1"/>
+          </a:fontRef>
+        </p:style>
+        <p:txBody>
+          <a:bodyPr rtlCol="0" anchor="ctr"/>
+          <a:lstStyle/>
+          <a:p>
+            <a:pPr algn="ctr"/>
+            <a:endParaRPr lang="de-DE"/>
+          </a:p>
+        </p:txBody>
+      </p:sp>
+      <p:sp>
+        <p:nvSpPr>
+          <p:cNvPr id="4" name="Freihandform: Form 3">
+            <a:extLst>
+              <a:ext uri="{FF2B5EF4-FFF2-40B4-BE49-F238E27FC236}">
+                <a16:creationId xmlns:a16="http://schemas.microsoft.com/office/drawing/2014/main" id="{D4C67D9E-9EE8-D064-687F-FE0A238D6F6E}"/>
+              </a:ext>
+            </a:extLst>
+          </p:cNvPr>
+          <p:cNvSpPr/>
+          <p:nvPr/>
+        </p:nvSpPr>
+        <p:spPr>
+          <a:xfrm>
+            <a:off x="7168551" y="3483647"/>
+            <a:ext cx="2501660" cy="795350"/>
+          </a:xfrm>
+          <a:custGeom>
+            <a:avLst/>
+            <a:gdLst>
+              <a:gd name="connsiteX0" fmla="*/ 2501660 w 2501660"/>
+              <a:gd name="connsiteY0" fmla="*/ 725720 h 726065"/>
+              <a:gd name="connsiteX1" fmla="*/ 1932317 w 2501660"/>
+              <a:gd name="connsiteY1" fmla="*/ 630829 h 726065"/>
+              <a:gd name="connsiteX2" fmla="*/ 1017917 w 2501660"/>
+              <a:gd name="connsiteY2" fmla="*/ 139124 h 726065"/>
+              <a:gd name="connsiteX3" fmla="*/ 250166 w 2501660"/>
+              <a:gd name="connsiteY3" fmla="*/ 1101 h 726065"/>
+              <a:gd name="connsiteX4" fmla="*/ 0 w 2501660"/>
+              <a:gd name="connsiteY4" fmla="*/ 190882 h 726065"/>
+              <a:gd name="connsiteX0" fmla="*/ 2501660 w 2501660"/>
+              <a:gd name="connsiteY0" fmla="*/ 785563 h 785908"/>
+              <a:gd name="connsiteX1" fmla="*/ 1932317 w 2501660"/>
+              <a:gd name="connsiteY1" fmla="*/ 690672 h 785908"/>
+              <a:gd name="connsiteX2" fmla="*/ 1017917 w 2501660"/>
+              <a:gd name="connsiteY2" fmla="*/ 198967 h 785908"/>
+              <a:gd name="connsiteX3" fmla="*/ 362309 w 2501660"/>
+              <a:gd name="connsiteY3" fmla="*/ 560 h 785908"/>
+              <a:gd name="connsiteX4" fmla="*/ 0 w 2501660"/>
+              <a:gd name="connsiteY4" fmla="*/ 250725 h 785908"/>
+              <a:gd name="connsiteX0" fmla="*/ 2501660 w 2501660"/>
+              <a:gd name="connsiteY0" fmla="*/ 786096 h 786441"/>
+              <a:gd name="connsiteX1" fmla="*/ 1932317 w 2501660"/>
+              <a:gd name="connsiteY1" fmla="*/ 691205 h 786441"/>
+              <a:gd name="connsiteX2" fmla="*/ 1017917 w 2501660"/>
+              <a:gd name="connsiteY2" fmla="*/ 199500 h 786441"/>
+              <a:gd name="connsiteX3" fmla="*/ 362309 w 2501660"/>
+              <a:gd name="connsiteY3" fmla="*/ 1093 h 786441"/>
+              <a:gd name="connsiteX4" fmla="*/ 0 w 2501660"/>
+              <a:gd name="connsiteY4" fmla="*/ 251258 h 786441"/>
+              <a:gd name="connsiteX0" fmla="*/ 2501660 w 2501660"/>
+              <a:gd name="connsiteY0" fmla="*/ 786920 h 787481"/>
+              <a:gd name="connsiteX1" fmla="*/ 1932317 w 2501660"/>
+              <a:gd name="connsiteY1" fmla="*/ 692029 h 787481"/>
+              <a:gd name="connsiteX2" fmla="*/ 1061049 w 2501660"/>
+              <a:gd name="connsiteY2" fmla="*/ 174445 h 787481"/>
+              <a:gd name="connsiteX3" fmla="*/ 362309 w 2501660"/>
+              <a:gd name="connsiteY3" fmla="*/ 1917 h 787481"/>
+              <a:gd name="connsiteX4" fmla="*/ 0 w 2501660"/>
+              <a:gd name="connsiteY4" fmla="*/ 252082 h 787481"/>
+              <a:gd name="connsiteX0" fmla="*/ 2501660 w 2501660"/>
+              <a:gd name="connsiteY0" fmla="*/ 796376 h 796937"/>
+              <a:gd name="connsiteX1" fmla="*/ 1932317 w 2501660"/>
+              <a:gd name="connsiteY1" fmla="*/ 701485 h 796937"/>
+              <a:gd name="connsiteX2" fmla="*/ 1061049 w 2501660"/>
+              <a:gd name="connsiteY2" fmla="*/ 183901 h 796937"/>
+              <a:gd name="connsiteX3" fmla="*/ 362309 w 2501660"/>
+              <a:gd name="connsiteY3" fmla="*/ 11373 h 796937"/>
+              <a:gd name="connsiteX4" fmla="*/ 0 w 2501660"/>
+              <a:gd name="connsiteY4" fmla="*/ 261538 h 796937"/>
+              <a:gd name="connsiteX0" fmla="*/ 2501660 w 2501660"/>
+              <a:gd name="connsiteY0" fmla="*/ 796376 h 796937"/>
+              <a:gd name="connsiteX1" fmla="*/ 1932317 w 2501660"/>
+              <a:gd name="connsiteY1" fmla="*/ 701485 h 796937"/>
+              <a:gd name="connsiteX2" fmla="*/ 1061049 w 2501660"/>
+              <a:gd name="connsiteY2" fmla="*/ 183901 h 796937"/>
+              <a:gd name="connsiteX3" fmla="*/ 362309 w 2501660"/>
+              <a:gd name="connsiteY3" fmla="*/ 11373 h 796937"/>
+              <a:gd name="connsiteX4" fmla="*/ 0 w 2501660"/>
+              <a:gd name="connsiteY4" fmla="*/ 261538 h 796937"/>
+              <a:gd name="connsiteX0" fmla="*/ 2501660 w 2501660"/>
+              <a:gd name="connsiteY0" fmla="*/ 796376 h 796937"/>
+              <a:gd name="connsiteX1" fmla="*/ 1932317 w 2501660"/>
+              <a:gd name="connsiteY1" fmla="*/ 701485 h 796937"/>
+              <a:gd name="connsiteX2" fmla="*/ 1061049 w 2501660"/>
+              <a:gd name="connsiteY2" fmla="*/ 183901 h 796937"/>
+              <a:gd name="connsiteX3" fmla="*/ 362309 w 2501660"/>
+              <a:gd name="connsiteY3" fmla="*/ 11373 h 796937"/>
+              <a:gd name="connsiteX4" fmla="*/ 0 w 2501660"/>
+              <a:gd name="connsiteY4" fmla="*/ 261538 h 796937"/>
+              <a:gd name="connsiteX0" fmla="*/ 2501660 w 2501660"/>
+              <a:gd name="connsiteY0" fmla="*/ 785323 h 785884"/>
+              <a:gd name="connsiteX1" fmla="*/ 1932317 w 2501660"/>
+              <a:gd name="connsiteY1" fmla="*/ 690432 h 785884"/>
+              <a:gd name="connsiteX2" fmla="*/ 1061049 w 2501660"/>
+              <a:gd name="connsiteY2" fmla="*/ 172848 h 785884"/>
+              <a:gd name="connsiteX3" fmla="*/ 362309 w 2501660"/>
+              <a:gd name="connsiteY3" fmla="*/ 320 h 785884"/>
+              <a:gd name="connsiteX4" fmla="*/ 0 w 2501660"/>
+              <a:gd name="connsiteY4" fmla="*/ 250485 h 785884"/>
+              <a:gd name="connsiteX0" fmla="*/ 2501660 w 2501660"/>
+              <a:gd name="connsiteY0" fmla="*/ 799848 h 800409"/>
+              <a:gd name="connsiteX1" fmla="*/ 1932317 w 2501660"/>
+              <a:gd name="connsiteY1" fmla="*/ 704957 h 800409"/>
+              <a:gd name="connsiteX2" fmla="*/ 1061049 w 2501660"/>
+              <a:gd name="connsiteY2" fmla="*/ 187373 h 800409"/>
+              <a:gd name="connsiteX3" fmla="*/ 362309 w 2501660"/>
+              <a:gd name="connsiteY3" fmla="*/ 14845 h 800409"/>
+              <a:gd name="connsiteX4" fmla="*/ 0 w 2501660"/>
+              <a:gd name="connsiteY4" fmla="*/ 265010 h 800409"/>
+              <a:gd name="connsiteX0" fmla="*/ 2501660 w 2501660"/>
+              <a:gd name="connsiteY0" fmla="*/ 796255 h 796550"/>
+              <a:gd name="connsiteX1" fmla="*/ 1932317 w 2501660"/>
+              <a:gd name="connsiteY1" fmla="*/ 701364 h 796550"/>
+              <a:gd name="connsiteX2" fmla="*/ 1017917 w 2501660"/>
+              <a:gd name="connsiteY2" fmla="*/ 218286 h 796550"/>
+              <a:gd name="connsiteX3" fmla="*/ 362309 w 2501660"/>
+              <a:gd name="connsiteY3" fmla="*/ 11252 h 796550"/>
+              <a:gd name="connsiteX4" fmla="*/ 0 w 2501660"/>
+              <a:gd name="connsiteY4" fmla="*/ 261417 h 796550"/>
+              <a:gd name="connsiteX0" fmla="*/ 2501660 w 2501660"/>
+              <a:gd name="connsiteY0" fmla="*/ 795055 h 795350"/>
+              <a:gd name="connsiteX1" fmla="*/ 1932317 w 2501660"/>
+              <a:gd name="connsiteY1" fmla="*/ 700164 h 795350"/>
+              <a:gd name="connsiteX2" fmla="*/ 1017917 w 2501660"/>
+              <a:gd name="connsiteY2" fmla="*/ 217086 h 795350"/>
+              <a:gd name="connsiteX3" fmla="*/ 362309 w 2501660"/>
+              <a:gd name="connsiteY3" fmla="*/ 10052 h 795350"/>
+              <a:gd name="connsiteX4" fmla="*/ 0 w 2501660"/>
+              <a:gd name="connsiteY4" fmla="*/ 260217 h 795350"/>
+            </a:gdLst>
+            <a:ahLst/>
+            <a:cxnLst>
+              <a:cxn ang="0">
+                <a:pos x="connsiteX0" y="connsiteY0"/>
+              </a:cxn>
+              <a:cxn ang="0">
+                <a:pos x="connsiteX1" y="connsiteY1"/>
+              </a:cxn>
+              <a:cxn ang="0">
+                <a:pos x="connsiteX2" y="connsiteY2"/>
+              </a:cxn>
+              <a:cxn ang="0">
+                <a:pos x="connsiteX3" y="connsiteY3"/>
+              </a:cxn>
+              <a:cxn ang="0">
+                <a:pos x="connsiteX4" y="connsiteY4"/>
+              </a:cxn>
+            </a:cxnLst>
+            <a:rect l="l" t="t" r="r" b="b"/>
+            <a:pathLst>
+              <a:path w="2501660" h="795350">
+                <a:moveTo>
+                  <a:pt x="2501660" y="795055"/>
+                </a:moveTo>
+                <a:cubicBezTo>
+                  <a:pt x="2340633" y="796492"/>
+                  <a:pt x="2179607" y="796492"/>
+                  <a:pt x="1932317" y="700164"/>
+                </a:cubicBezTo>
+                <a:cubicBezTo>
+                  <a:pt x="1685027" y="603836"/>
+                  <a:pt x="1288211" y="366610"/>
+                  <a:pt x="1017917" y="217086"/>
+                </a:cubicBezTo>
+                <a:cubicBezTo>
+                  <a:pt x="747623" y="67562"/>
+                  <a:pt x="557841" y="-33080"/>
+                  <a:pt x="362309" y="10052"/>
+                </a:cubicBezTo>
+                <a:cubicBezTo>
+                  <a:pt x="201282" y="1425"/>
+                  <a:pt x="40256" y="169639"/>
+                  <a:pt x="0" y="260217"/>
+                </a:cubicBezTo>
+              </a:path>
+            </a:pathLst>
+          </a:custGeom>
+          <a:noFill/>
+          <a:ln w="76200">
+            <a:solidFill>
+              <a:srgbClr val="FF0000"/>
+            </a:solidFill>
+            <a:tailEnd type="stealth"/>
+          </a:ln>
+        </p:spPr>
+        <p:style>
+          <a:lnRef idx="2">
+            <a:schemeClr val="accent1">
+              <a:shade val="15000"/>
+            </a:schemeClr>
+          </a:lnRef>
+          <a:fillRef idx="1">
+            <a:schemeClr val="accent1"/>
+          </a:fillRef>
+          <a:effectRef idx="0">
+            <a:schemeClr val="accent1"/>
+          </a:effectRef>
+          <a:fontRef idx="minor">
+            <a:schemeClr val="lt1"/>
+          </a:fontRef>
+        </p:style>
+        <p:txBody>
+          <a:bodyPr rtlCol="0" anchor="ctr"/>
+          <a:lstStyle/>
+          <a:p>
+            <a:pPr algn="ctr"/>
+            <a:endParaRPr lang="de-DE"/>
+          </a:p>
+        </p:txBody>
+      </p:sp>
+    </p:spTree>
+    <p:extLst>
+      <p:ext uri="{BB962C8B-B14F-4D97-AF65-F5344CB8AC3E}">
+        <p14:creationId xmlns:p14="http://schemas.microsoft.com/office/powerpoint/2010/main" val="2171465657"/>
+      </p:ext>
+    </p:extLst>
+  </p:cSld>
+  <p:clrMapOvr>
+    <a:masterClrMapping/>
+  </p:clrMapOvr>
+</p:sld>
+</file>
+
 <file path=ppt/slides/slide2.xml><?xml version="1.0" encoding="utf-8"?>
 <p:sld xmlns:a="http://schemas.openxmlformats.org/drawingml/2006/main" xmlns:r="http://schemas.openxmlformats.org/officeDocument/2006/relationships" xmlns:p="http://schemas.openxmlformats.org/presentationml/2006/main">
   <p:cSld>

</xml_diff>

<commit_message>
Math for arc length calculation works
</commit_message>
<xml_diff>
--- a/examples/UrbanTopologies.pptx
+++ b/examples/UrbanTopologies.pptx
@@ -6,7 +6,7 @@
     <p:sldMasterId id="2147483660" r:id="rId2"/>
   </p:sldMasterIdLst>
   <p:notesMasterIdLst>
-    <p:notesMasterId r:id="rId18"/>
+    <p:notesMasterId r:id="rId19"/>
   </p:notesMasterIdLst>
   <p:sldIdLst>
     <p:sldId id="268" r:id="rId3"/>
@@ -24,6 +24,7 @@
     <p:sldId id="269" r:id="rId15"/>
     <p:sldId id="270" r:id="rId16"/>
     <p:sldId id="271" r:id="rId17"/>
+    <p:sldId id="272" r:id="rId18"/>
   </p:sldIdLst>
   <p:sldSz cx="12192000" cy="6858000"/>
   <p:notesSz cx="6858000" cy="9144000"/>
@@ -212,7 +213,7 @@
           <a:p>
             <a:fld id="{6C57E5E1-517F-429D-81ED-272A083D513A}" type="datetimeFigureOut">
               <a:rPr lang="de-DE" smtClean="0"/>
-              <a:t>12.05.2025</a:t>
+              <a:t>18.05.2025</a:t>
             </a:fld>
             <a:endParaRPr lang="de-DE"/>
           </a:p>
@@ -710,7 +711,7 @@
           <a:p>
             <a:fld id="{F3EB2857-2321-4C4D-8D06-77DF79DF910F}" type="datetimeFigureOut">
               <a:rPr lang="de-DE" smtClean="0"/>
-              <a:t>12.05.2025</a:t>
+              <a:t>18.05.2025</a:t>
             </a:fld>
             <a:endParaRPr lang="de-DE"/>
           </a:p>
@@ -908,7 +909,7 @@
           <a:p>
             <a:fld id="{F3EB2857-2321-4C4D-8D06-77DF79DF910F}" type="datetimeFigureOut">
               <a:rPr lang="de-DE" smtClean="0"/>
-              <a:t>12.05.2025</a:t>
+              <a:t>18.05.2025</a:t>
             </a:fld>
             <a:endParaRPr lang="de-DE"/>
           </a:p>
@@ -1116,7 +1117,7 @@
           <a:p>
             <a:fld id="{F3EB2857-2321-4C4D-8D06-77DF79DF910F}" type="datetimeFigureOut">
               <a:rPr lang="de-DE" smtClean="0"/>
-              <a:t>12.05.2025</a:t>
+              <a:t>18.05.2025</a:t>
             </a:fld>
             <a:endParaRPr lang="de-DE"/>
           </a:p>
@@ -1336,7 +1337,7 @@
           <a:p>
             <a:fld id="{93318F87-FAB0-47FE-97DA-44085A772572}" type="datetimeFigureOut">
               <a:rPr lang="de-DE" smtClean="0"/>
-              <a:t>12.05.2025</a:t>
+              <a:t>18.05.2025</a:t>
             </a:fld>
             <a:endParaRPr lang="de-DE"/>
           </a:p>
@@ -1534,7 +1535,7 @@
           <a:p>
             <a:fld id="{93318F87-FAB0-47FE-97DA-44085A772572}" type="datetimeFigureOut">
               <a:rPr lang="de-DE" smtClean="0"/>
-              <a:t>12.05.2025</a:t>
+              <a:t>18.05.2025</a:t>
             </a:fld>
             <a:endParaRPr lang="de-DE"/>
           </a:p>
@@ -1809,7 +1810,7 @@
           <a:p>
             <a:fld id="{93318F87-FAB0-47FE-97DA-44085A772572}" type="datetimeFigureOut">
               <a:rPr lang="de-DE" smtClean="0"/>
-              <a:t>12.05.2025</a:t>
+              <a:t>18.05.2025</a:t>
             </a:fld>
             <a:endParaRPr lang="de-DE"/>
           </a:p>
@@ -2074,7 +2075,7 @@
           <a:p>
             <a:fld id="{93318F87-FAB0-47FE-97DA-44085A772572}" type="datetimeFigureOut">
               <a:rPr lang="de-DE" smtClean="0"/>
-              <a:t>12.05.2025</a:t>
+              <a:t>18.05.2025</a:t>
             </a:fld>
             <a:endParaRPr lang="de-DE"/>
           </a:p>
@@ -2486,7 +2487,7 @@
           <a:p>
             <a:fld id="{93318F87-FAB0-47FE-97DA-44085A772572}" type="datetimeFigureOut">
               <a:rPr lang="de-DE" smtClean="0"/>
-              <a:t>12.05.2025</a:t>
+              <a:t>18.05.2025</a:t>
             </a:fld>
             <a:endParaRPr lang="de-DE"/>
           </a:p>
@@ -2627,7 +2628,7 @@
           <a:p>
             <a:fld id="{93318F87-FAB0-47FE-97DA-44085A772572}" type="datetimeFigureOut">
               <a:rPr lang="de-DE" smtClean="0"/>
-              <a:t>12.05.2025</a:t>
+              <a:t>18.05.2025</a:t>
             </a:fld>
             <a:endParaRPr lang="de-DE"/>
           </a:p>
@@ -2740,7 +2741,7 @@
           <a:p>
             <a:fld id="{93318F87-FAB0-47FE-97DA-44085A772572}" type="datetimeFigureOut">
               <a:rPr lang="de-DE" smtClean="0"/>
-              <a:t>12.05.2025</a:t>
+              <a:t>18.05.2025</a:t>
             </a:fld>
             <a:endParaRPr lang="de-DE"/>
           </a:p>
@@ -3051,7 +3052,7 @@
           <a:p>
             <a:fld id="{93318F87-FAB0-47FE-97DA-44085A772572}" type="datetimeFigureOut">
               <a:rPr lang="de-DE" smtClean="0"/>
-              <a:t>12.05.2025</a:t>
+              <a:t>18.05.2025</a:t>
             </a:fld>
             <a:endParaRPr lang="de-DE"/>
           </a:p>
@@ -3249,7 +3250,7 @@
           <a:p>
             <a:fld id="{F3EB2857-2321-4C4D-8D06-77DF79DF910F}" type="datetimeFigureOut">
               <a:rPr lang="de-DE" smtClean="0"/>
-              <a:t>12.05.2025</a:t>
+              <a:t>18.05.2025</a:t>
             </a:fld>
             <a:endParaRPr lang="de-DE"/>
           </a:p>
@@ -3537,7 +3538,7 @@
           <a:p>
             <a:fld id="{93318F87-FAB0-47FE-97DA-44085A772572}" type="datetimeFigureOut">
               <a:rPr lang="de-DE" smtClean="0"/>
-              <a:t>12.05.2025</a:t>
+              <a:t>18.05.2025</a:t>
             </a:fld>
             <a:endParaRPr lang="de-DE"/>
           </a:p>
@@ -3735,7 +3736,7 @@
           <a:p>
             <a:fld id="{93318F87-FAB0-47FE-97DA-44085A772572}" type="datetimeFigureOut">
               <a:rPr lang="de-DE" smtClean="0"/>
-              <a:t>12.05.2025</a:t>
+              <a:t>18.05.2025</a:t>
             </a:fld>
             <a:endParaRPr lang="de-DE"/>
           </a:p>
@@ -3943,7 +3944,7 @@
           <a:p>
             <a:fld id="{93318F87-FAB0-47FE-97DA-44085A772572}" type="datetimeFigureOut">
               <a:rPr lang="de-DE" smtClean="0"/>
-              <a:t>12.05.2025</a:t>
+              <a:t>18.05.2025</a:t>
             </a:fld>
             <a:endParaRPr lang="de-DE"/>
           </a:p>
@@ -4218,7 +4219,7 @@
           <a:p>
             <a:fld id="{F3EB2857-2321-4C4D-8D06-77DF79DF910F}" type="datetimeFigureOut">
               <a:rPr lang="de-DE" smtClean="0"/>
-              <a:t>12.05.2025</a:t>
+              <a:t>18.05.2025</a:t>
             </a:fld>
             <a:endParaRPr lang="de-DE"/>
           </a:p>
@@ -4483,7 +4484,7 @@
           <a:p>
             <a:fld id="{F3EB2857-2321-4C4D-8D06-77DF79DF910F}" type="datetimeFigureOut">
               <a:rPr lang="de-DE" smtClean="0"/>
-              <a:t>12.05.2025</a:t>
+              <a:t>18.05.2025</a:t>
             </a:fld>
             <a:endParaRPr lang="de-DE"/>
           </a:p>
@@ -4895,7 +4896,7 @@
           <a:p>
             <a:fld id="{F3EB2857-2321-4C4D-8D06-77DF79DF910F}" type="datetimeFigureOut">
               <a:rPr lang="de-DE" smtClean="0"/>
-              <a:t>12.05.2025</a:t>
+              <a:t>18.05.2025</a:t>
             </a:fld>
             <a:endParaRPr lang="de-DE"/>
           </a:p>
@@ -5036,7 +5037,7 @@
           <a:p>
             <a:fld id="{F3EB2857-2321-4C4D-8D06-77DF79DF910F}" type="datetimeFigureOut">
               <a:rPr lang="de-DE" smtClean="0"/>
-              <a:t>12.05.2025</a:t>
+              <a:t>18.05.2025</a:t>
             </a:fld>
             <a:endParaRPr lang="de-DE"/>
           </a:p>
@@ -5149,7 +5150,7 @@
           <a:p>
             <a:fld id="{F3EB2857-2321-4C4D-8D06-77DF79DF910F}" type="datetimeFigureOut">
               <a:rPr lang="de-DE" smtClean="0"/>
-              <a:t>12.05.2025</a:t>
+              <a:t>18.05.2025</a:t>
             </a:fld>
             <a:endParaRPr lang="de-DE"/>
           </a:p>
@@ -5460,7 +5461,7 @@
           <a:p>
             <a:fld id="{F3EB2857-2321-4C4D-8D06-77DF79DF910F}" type="datetimeFigureOut">
               <a:rPr lang="de-DE" smtClean="0"/>
-              <a:t>12.05.2025</a:t>
+              <a:t>18.05.2025</a:t>
             </a:fld>
             <a:endParaRPr lang="de-DE"/>
           </a:p>
@@ -5748,7 +5749,7 @@
           <a:p>
             <a:fld id="{F3EB2857-2321-4C4D-8D06-77DF79DF910F}" type="datetimeFigureOut">
               <a:rPr lang="de-DE" smtClean="0"/>
-              <a:t>12.05.2025</a:t>
+              <a:t>18.05.2025</a:t>
             </a:fld>
             <a:endParaRPr lang="de-DE"/>
           </a:p>
@@ -5989,7 +5990,7 @@
           <a:p>
             <a:fld id="{F3EB2857-2321-4C4D-8D06-77DF79DF910F}" type="datetimeFigureOut">
               <a:rPr lang="de-DE" smtClean="0"/>
-              <a:t>12.05.2025</a:t>
+              <a:t>18.05.2025</a:t>
             </a:fld>
             <a:endParaRPr lang="de-DE"/>
           </a:p>
@@ -6557,7 +6558,7 @@
           <a:p>
             <a:fld id="{93318F87-FAB0-47FE-97DA-44085A772572}" type="datetimeFigureOut">
               <a:rPr lang="de-DE" smtClean="0"/>
-              <a:t>12.05.2025</a:t>
+              <a:t>18.05.2025</a:t>
             </a:fld>
             <a:endParaRPr lang="de-DE"/>
           </a:p>
@@ -21324,6 +21325,72 @@
 </p:sld>
 </file>
 
+<file path=ppt/slides/slide16.xml><?xml version="1.0" encoding="utf-8"?>
+<p:sld xmlns:a="http://schemas.openxmlformats.org/drawingml/2006/main" xmlns:r="http://schemas.openxmlformats.org/officeDocument/2006/relationships" xmlns:p="http://schemas.openxmlformats.org/presentationml/2006/main">
+  <p:cSld>
+    <p:spTree>
+      <p:nvGrpSpPr>
+        <p:cNvPr id="1" name=""/>
+        <p:cNvGrpSpPr/>
+        <p:nvPr/>
+      </p:nvGrpSpPr>
+      <p:grpSpPr>
+        <a:xfrm>
+          <a:off x="0" y="0"/>
+          <a:ext cx="0" cy="0"/>
+          <a:chOff x="0" y="0"/>
+          <a:chExt cx="0" cy="0"/>
+        </a:xfrm>
+      </p:grpSpPr>
+      <p:pic>
+        <p:nvPicPr>
+          <p:cNvPr id="6" name="Grafik 5">
+            <a:extLst>
+              <a:ext uri="{FF2B5EF4-FFF2-40B4-BE49-F238E27FC236}">
+                <a16:creationId xmlns:a16="http://schemas.microsoft.com/office/drawing/2014/main" id="{EE698878-7648-6DAF-FF68-DA887D2BC825}"/>
+              </a:ext>
+            </a:extLst>
+          </p:cNvPr>
+          <p:cNvPicPr>
+            <a:picLocks noChangeAspect="1"/>
+          </p:cNvPicPr>
+          <p:nvPr/>
+        </p:nvPicPr>
+        <p:blipFill>
+          <a:blip r:embed="rId2">
+            <a:extLst>
+              <a:ext uri="{28A0092B-C50C-407E-A947-70E740481C1C}">
+                <a14:useLocalDpi xmlns:a14="http://schemas.microsoft.com/office/drawing/2010/main" val="0"/>
+              </a:ext>
+            </a:extLst>
+          </a:blip>
+          <a:stretch>
+            <a:fillRect/>
+          </a:stretch>
+        </p:blipFill>
+        <p:spPr>
+          <a:xfrm>
+            <a:off x="3215996" y="0"/>
+            <a:ext cx="4880113" cy="6858000"/>
+          </a:xfrm>
+          <a:prstGeom prst="rect">
+            <a:avLst/>
+          </a:prstGeom>
+        </p:spPr>
+      </p:pic>
+    </p:spTree>
+    <p:extLst>
+      <p:ext uri="{BB962C8B-B14F-4D97-AF65-F5344CB8AC3E}">
+        <p14:creationId xmlns:p14="http://schemas.microsoft.com/office/powerpoint/2010/main" val="4222765054"/>
+      </p:ext>
+    </p:extLst>
+  </p:cSld>
+  <p:clrMapOvr>
+    <a:masterClrMapping/>
+  </p:clrMapOvr>
+</p:sld>
+</file>
+
 <file path=ppt/slides/slide2.xml><?xml version="1.0" encoding="utf-8"?>
 <p:sld xmlns:a="http://schemas.openxmlformats.org/drawingml/2006/main" xmlns:r="http://schemas.openxmlformats.org/officeDocument/2006/relationships" xmlns:p="http://schemas.openxmlformats.org/presentationml/2006/main">
   <p:cSld>

</xml_diff>